<commit_message>
J'ai fini un premier jet de ma partie de la présentation
</commit_message>
<xml_diff>
--- a/Soutenance/Soutenance - Présentation.pptx
+++ b/Soutenance/Soutenance - Présentation.pptx
@@ -5,7 +5,7 @@
     <p:sldMasterId id="2147483714" r:id="rId1"/>
   </p:sldMasterIdLst>
   <p:notesMasterIdLst>
-    <p:notesMasterId r:id="rId19"/>
+    <p:notesMasterId r:id="rId22"/>
   </p:notesMasterIdLst>
   <p:sldIdLst>
     <p:sldId id="256" r:id="rId2"/>
@@ -23,8 +23,11 @@
     <p:sldId id="265" r:id="rId14"/>
     <p:sldId id="269" r:id="rId15"/>
     <p:sldId id="271" r:id="rId16"/>
-    <p:sldId id="270" r:id="rId17"/>
-    <p:sldId id="263" r:id="rId18"/>
+    <p:sldId id="278" r:id="rId17"/>
+    <p:sldId id="280" r:id="rId18"/>
+    <p:sldId id="279" r:id="rId19"/>
+    <p:sldId id="270" r:id="rId20"/>
+    <p:sldId id="263" r:id="rId21"/>
   </p:sldIdLst>
   <p:sldSz cx="12192000" cy="6858000"/>
   <p:notesSz cx="6858000" cy="9144000"/>
@@ -123,6 +126,11 @@
       </a:defRPr>
     </a:lvl9pPr>
   </p:defaultTextStyle>
+  <p:extLst>
+    <p:ext uri="{EFAFB233-063F-42B5-8137-9DF3F51BA10A}">
+      <p15:sldGuideLst xmlns:p15="http://schemas.microsoft.com/office/powerpoint/2012/main"/>
+    </p:ext>
+  </p:extLst>
 </p:presentation>
 </file>
 
@@ -4640,8 +4648,8 @@
           </a:p>
         </p:txBody>
       </p:sp>
-      <mc:AlternateContent xmlns:mc="http://schemas.openxmlformats.org/markup-compatibility/2006">
-        <mc:Choice xmlns:a14="http://schemas.microsoft.com/office/drawing/2010/main" Requires="a14">
+      <mc:AlternateContent xmlns:mc="http://schemas.openxmlformats.org/markup-compatibility/2006" xmlns:a14="http://schemas.microsoft.com/office/drawing/2010/main">
+        <mc:Choice Requires="a14">
           <p:sp>
             <p:nvSpPr>
               <p:cNvPr id="3" name="Espace réservé du contenu 2">
@@ -4785,7 +4793,7 @@
             </p:txBody>
           </p:sp>
         </mc:Choice>
-        <mc:Fallback>
+        <mc:Fallback xmlns="">
           <p:sp>
             <p:nvSpPr>
               <p:cNvPr id="3" name="Espace réservé du contenu 2">
@@ -6111,45 +6119,435 @@
             </a:r>
             <a:r>
               <a:rPr lang="fr-FR" dirty="0" err="1"/>
-              <a:t>Random</a:t>
-            </a:r>
-            <a:r>
-              <a:rPr lang="fr-FR" dirty="0"/>
-              <a:t> Forest</a:t>
-            </a:r>
-          </a:p>
-        </p:txBody>
-      </p:sp>
-      <p:sp>
-        <p:nvSpPr>
-          <p:cNvPr id="3" name="Espace réservé du contenu 2">
-            <a:extLst>
-              <a:ext uri="{FF2B5EF4-FFF2-40B4-BE49-F238E27FC236}">
-                <a16:creationId xmlns:a16="http://schemas.microsoft.com/office/drawing/2014/main" id="{FD768049-343D-9EB5-B2D9-091FDD70AC44}"/>
-              </a:ext>
-            </a:extLst>
-          </p:cNvPr>
-          <p:cNvSpPr>
-            <a:spLocks noGrp="1"/>
-          </p:cNvSpPr>
-          <p:nvPr>
-            <p:ph idx="1"/>
-          </p:nvPr>
-        </p:nvSpPr>
-        <p:spPr>
-          <a:xfrm>
-            <a:off x="1202878" y="2241755"/>
-            <a:ext cx="8595360" cy="4351337"/>
-          </a:xfrm>
-        </p:spPr>
-        <p:txBody>
-          <a:bodyPr/>
-          <a:lstStyle/>
-          <a:p>
+              <a:t>XGBoost</a:t>
+            </a:r>
             <a:endParaRPr lang="fr-FR" dirty="0"/>
           </a:p>
         </p:txBody>
       </p:sp>
+      <mc:AlternateContent xmlns:mc="http://schemas.openxmlformats.org/markup-compatibility/2006" xmlns:a14="http://schemas.microsoft.com/office/drawing/2010/main">
+        <mc:Choice Requires="a14">
+          <p:sp>
+            <p:nvSpPr>
+              <p:cNvPr id="3" name="Espace réservé du contenu 2">
+                <a:extLst>
+                  <a:ext uri="{FF2B5EF4-FFF2-40B4-BE49-F238E27FC236}">
+                    <a16:creationId xmlns:a16="http://schemas.microsoft.com/office/drawing/2014/main" id="{FD768049-343D-9EB5-B2D9-091FDD70AC44}"/>
+                  </a:ext>
+                </a:extLst>
+              </p:cNvPr>
+              <p:cNvSpPr>
+                <a:spLocks noGrp="1"/>
+              </p:cNvSpPr>
+              <p:nvPr>
+                <p:ph idx="1"/>
+              </p:nvPr>
+            </p:nvSpPr>
+            <p:spPr>
+              <a:xfrm>
+                <a:off x="1202878" y="2241755"/>
+                <a:ext cx="8595360" cy="4351337"/>
+              </a:xfrm>
+            </p:spPr>
+            <p:txBody>
+              <a:bodyPr/>
+              <a:lstStyle/>
+              <a:p>
+                <a:r>
+                  <a:rPr lang="fr-FR" b="1" dirty="0"/>
+                  <a:t>Fragile Family Challenge: </a:t>
+                </a:r>
+                <a:r>
+                  <a:rPr lang="fr-FR" dirty="0" err="1"/>
+                  <a:t>XGBoost</a:t>
+                </a:r>
+                <a:r>
+                  <a:rPr lang="fr-FR" dirty="0"/>
+                  <a:t> </a:t>
+                </a:r>
+                <a:r>
+                  <a:rPr lang="fr-FR" dirty="0" err="1"/>
+                  <a:t>provided</a:t>
+                </a:r>
+                <a:r>
+                  <a:rPr lang="fr-FR" dirty="0"/>
+                  <a:t> </a:t>
+                </a:r>
+                <a:r>
+                  <a:rPr lang="fr-FR" dirty="0" err="1"/>
+                  <a:t>powerful</a:t>
+                </a:r>
+                <a:r>
+                  <a:rPr lang="fr-FR" dirty="0"/>
+                  <a:t> </a:t>
+                </a:r>
+                <a:r>
+                  <a:rPr lang="fr-FR" dirty="0" err="1"/>
+                  <a:t>results</a:t>
+                </a:r>
+                <a:endParaRPr lang="fr-FR" dirty="0"/>
+              </a:p>
+              <a:p>
+                <a:pPr lvl="1"/>
+                <a:r>
+                  <a:rPr lang="fr-FR" dirty="0" err="1"/>
+                  <a:t>Let’s</a:t>
+                </a:r>
+                <a:r>
+                  <a:rPr lang="fr-FR" dirty="0"/>
+                  <a:t> </a:t>
+                </a:r>
+                <a:r>
+                  <a:rPr lang="fr-FR" dirty="0" err="1"/>
+                  <a:t>give</a:t>
+                </a:r>
+                <a:r>
+                  <a:rPr lang="fr-FR" dirty="0"/>
+                  <a:t> </a:t>
+                </a:r>
+                <a:r>
+                  <a:rPr lang="fr-FR" dirty="0" err="1"/>
+                  <a:t>it</a:t>
+                </a:r>
+                <a:r>
+                  <a:rPr lang="fr-FR" dirty="0"/>
+                  <a:t> a </a:t>
+                </a:r>
+                <a:r>
+                  <a:rPr lang="fr-FR" dirty="0" err="1"/>
+                  <a:t>try</a:t>
+                </a:r>
+                <a:r>
+                  <a:rPr lang="fr-FR" dirty="0"/>
+                  <a:t>!</a:t>
+                </a:r>
+              </a:p>
+              <a:p>
+                <a:r>
+                  <a:rPr lang="fr-FR" b="1" dirty="0" err="1"/>
+                  <a:t>What</a:t>
+                </a:r>
+                <a:r>
+                  <a:rPr lang="fr-FR" b="1" dirty="0"/>
+                  <a:t> </a:t>
+                </a:r>
+                <a:r>
+                  <a:rPr lang="fr-FR" b="1" dirty="0" err="1"/>
+                  <a:t>is</a:t>
+                </a:r>
+                <a:r>
+                  <a:rPr lang="fr-FR" b="1" dirty="0"/>
+                  <a:t> </a:t>
+                </a:r>
+                <a:r>
+                  <a:rPr lang="fr-FR" b="1" dirty="0" err="1"/>
+                  <a:t>it</a:t>
+                </a:r>
+                <a:r>
+                  <a:rPr lang="fr-FR" b="1" dirty="0"/>
+                  <a:t>?</a:t>
+                </a:r>
+              </a:p>
+              <a:p>
+                <a:pPr lvl="1"/>
+                <a:r>
+                  <a:rPr lang="fr-FR" dirty="0"/>
+                  <a:t>Gradient </a:t>
+                </a:r>
+                <a:r>
+                  <a:rPr lang="fr-FR" dirty="0" err="1"/>
+                  <a:t>Boosting</a:t>
+                </a:r>
+                <a:r>
+                  <a:rPr lang="fr-FR" dirty="0"/>
+                  <a:t> Method</a:t>
+                </a:r>
+              </a:p>
+              <a:p>
+                <a:pPr lvl="1"/>
+                <a:r>
+                  <a:rPr lang="fr-FR" b="1" dirty="0" err="1"/>
+                  <a:t>Idea</a:t>
+                </a:r>
+                <a:r>
+                  <a:rPr lang="fr-FR" dirty="0"/>
+                  <a:t>: </a:t>
+                </a:r>
+                <a:r>
+                  <a:rPr lang="fr-FR" dirty="0" err="1"/>
+                  <a:t>greedily</a:t>
+                </a:r>
+                <a:r>
+                  <a:rPr lang="fr-FR" dirty="0"/>
+                  <a:t> </a:t>
+                </a:r>
+                <a:r>
+                  <a:rPr lang="fr-FR" dirty="0" err="1"/>
+                  <a:t>construct</a:t>
+                </a:r>
+                <a:endParaRPr lang="fr-FR" dirty="0"/>
+              </a:p>
+              <a:p>
+                <a:pPr marL="0" indent="0">
+                  <a:buNone/>
+                </a:pPr>
+                <a:r>
+                  <a:rPr lang="fr-FR" b="0" dirty="0"/>
+                  <a:t>	</a:t>
+                </a:r>
+                <a14:m>
+                  <m:oMath xmlns:m="http://schemas.openxmlformats.org/officeDocument/2006/math">
+                    <m:r>
+                      <a:rPr lang="fr-FR" b="0" i="1" smtClean="0">
+                        <a:latin typeface="Cambria Math" panose="02040503050406030204" pitchFamily="18" charset="0"/>
+                      </a:rPr>
+                      <m:t>𝑓</m:t>
+                    </m:r>
+                    <m:d>
+                      <m:dPr>
+                        <m:ctrlPr>
+                          <a:rPr lang="fr-FR" b="0" i="1" smtClean="0">
+                            <a:latin typeface="Cambria Math" panose="02040503050406030204" pitchFamily="18" charset="0"/>
+                          </a:rPr>
+                        </m:ctrlPr>
+                      </m:dPr>
+                      <m:e>
+                        <m:r>
+                          <a:rPr lang="fr-FR" b="0" i="1" smtClean="0">
+                            <a:latin typeface="Cambria Math" panose="02040503050406030204" pitchFamily="18" charset="0"/>
+                          </a:rPr>
+                          <m:t>𝑥</m:t>
+                        </m:r>
+                      </m:e>
+                    </m:d>
+                    <m:r>
+                      <a:rPr lang="fr-FR" b="0" i="1" smtClean="0">
+                        <a:latin typeface="Cambria Math" panose="02040503050406030204" pitchFamily="18" charset="0"/>
+                      </a:rPr>
+                      <m:t>=</m:t>
+                    </m:r>
+                    <m:nary>
+                      <m:naryPr>
+                        <m:chr m:val="∑"/>
+                        <m:supHide m:val="on"/>
+                        <m:ctrlPr>
+                          <a:rPr lang="fr-FR" b="0" i="1" smtClean="0">
+                            <a:latin typeface="Cambria Math" panose="02040503050406030204" pitchFamily="18" charset="0"/>
+                          </a:rPr>
+                        </m:ctrlPr>
+                      </m:naryPr>
+                      <m:sub>
+                        <m:r>
+                          <a:rPr lang="fr-FR" b="0" i="1" smtClean="0">
+                            <a:latin typeface="Cambria Math" panose="02040503050406030204" pitchFamily="18" charset="0"/>
+                          </a:rPr>
+                          <m:t>𝑖</m:t>
+                        </m:r>
+                        <m:r>
+                          <a:rPr lang="fr-FR" b="0" i="1" smtClean="0">
+                            <a:latin typeface="Cambria Math" panose="02040503050406030204" pitchFamily="18" charset="0"/>
+                          </a:rPr>
+                          <m:t>≤</m:t>
+                        </m:r>
+                        <m:r>
+                          <a:rPr lang="fr-FR" b="0" i="1" smtClean="0">
+                            <a:latin typeface="Cambria Math" panose="02040503050406030204" pitchFamily="18" charset="0"/>
+                          </a:rPr>
+                          <m:t>𝑁</m:t>
+                        </m:r>
+                      </m:sub>
+                      <m:sup/>
+                      <m:e>
+                        <m:sSub>
+                          <m:sSubPr>
+                            <m:ctrlPr>
+                              <a:rPr lang="fr-FR" b="0" i="1" smtClean="0">
+                                <a:latin typeface="Cambria Math" panose="02040503050406030204" pitchFamily="18" charset="0"/>
+                              </a:rPr>
+                            </m:ctrlPr>
+                          </m:sSubPr>
+                          <m:e>
+                            <m:r>
+                              <a:rPr lang="fr-FR" b="0" i="1" smtClean="0">
+                                <a:latin typeface="Cambria Math" panose="02040503050406030204" pitchFamily="18" charset="0"/>
+                              </a:rPr>
+                              <m:t>𝑇𝑟𝑒𝑒</m:t>
+                            </m:r>
+                          </m:e>
+                          <m:sub>
+                            <m:r>
+                              <a:rPr lang="fr-FR" b="0" i="1" smtClean="0">
+                                <a:latin typeface="Cambria Math" panose="02040503050406030204" pitchFamily="18" charset="0"/>
+                              </a:rPr>
+                              <m:t>𝑖</m:t>
+                            </m:r>
+                          </m:sub>
+                        </m:sSub>
+                        <m:d>
+                          <m:dPr>
+                            <m:ctrlPr>
+                              <a:rPr lang="fr-FR" b="0" i="1" smtClean="0">
+                                <a:latin typeface="Cambria Math" panose="02040503050406030204" pitchFamily="18" charset="0"/>
+                              </a:rPr>
+                            </m:ctrlPr>
+                          </m:dPr>
+                          <m:e>
+                            <m:r>
+                              <a:rPr lang="fr-FR" b="0" i="1" smtClean="0">
+                                <a:latin typeface="Cambria Math" panose="02040503050406030204" pitchFamily="18" charset="0"/>
+                              </a:rPr>
+                              <m:t>𝑥</m:t>
+                            </m:r>
+                          </m:e>
+                        </m:d>
+                      </m:e>
+                    </m:nary>
+                  </m:oMath>
+                </a14:m>
+                <a:endParaRPr lang="fr-FR" dirty="0"/>
+              </a:p>
+              <a:p>
+                <a:pPr lvl="1"/>
+                <a:endParaRPr lang="fr-FR" dirty="0"/>
+              </a:p>
+              <a:p>
+                <a:pPr lvl="1"/>
+                <a:r>
+                  <a:rPr lang="fr-FR" b="1" dirty="0" err="1"/>
+                  <a:t>XGBoost</a:t>
+                </a:r>
+                <a:r>
+                  <a:rPr lang="fr-FR" b="1" dirty="0"/>
+                  <a:t>: </a:t>
+                </a:r>
+                <a:r>
+                  <a:rPr lang="fr-FR" dirty="0" err="1"/>
+                  <a:t>algorithm</a:t>
+                </a:r>
+                <a:r>
+                  <a:rPr lang="fr-FR" dirty="0"/>
+                  <a:t> of</a:t>
+                </a:r>
+              </a:p>
+              <a:p>
+                <a:pPr marL="274320" lvl="1" indent="0">
+                  <a:buNone/>
+                </a:pPr>
+                <a:r>
+                  <a:rPr lang="fr-FR" dirty="0"/>
+                  <a:t>Gradient </a:t>
+                </a:r>
+                <a:r>
+                  <a:rPr lang="fr-FR" dirty="0" err="1"/>
+                  <a:t>Boosting</a:t>
+                </a:r>
+                <a:r>
+                  <a:rPr lang="fr-FR" dirty="0"/>
+                  <a:t> </a:t>
+                </a:r>
+                <a:r>
+                  <a:rPr lang="fr-FR" dirty="0" err="1"/>
+                  <a:t>that</a:t>
+                </a:r>
+                <a:r>
+                  <a:rPr lang="fr-FR" dirty="0"/>
+                  <a:t> </a:t>
+                </a:r>
+                <a:r>
+                  <a:rPr lang="fr-FR" dirty="0" err="1"/>
+                  <a:t>handle</a:t>
+                </a:r>
+                <a:endParaRPr lang="fr-FR" dirty="0"/>
+              </a:p>
+              <a:p>
+                <a:pPr marL="274320" lvl="1" indent="0">
+                  <a:buNone/>
+                </a:pPr>
+                <a:r>
+                  <a:rPr lang="fr-FR" dirty="0" err="1"/>
+                  <a:t>missing</a:t>
+                </a:r>
+                <a:r>
+                  <a:rPr lang="fr-FR" dirty="0"/>
+                  <a:t> values</a:t>
+                </a:r>
+              </a:p>
+              <a:p>
+                <a:pPr marL="274320" lvl="1" indent="0">
+                  <a:buNone/>
+                </a:pPr>
+                <a:endParaRPr lang="fr-FR" dirty="0"/>
+              </a:p>
+              <a:p>
+                <a:pPr lvl="1"/>
+                <a:r>
+                  <a:rPr lang="fr-FR" b="1" dirty="0"/>
+                  <a:t>Run </a:t>
+                </a:r>
+                <a:r>
+                  <a:rPr lang="fr-FR" b="1" dirty="0" err="1"/>
+                  <a:t>extremely</a:t>
+                </a:r>
+                <a:r>
+                  <a:rPr lang="fr-FR" b="1" dirty="0"/>
+                  <a:t> </a:t>
+                </a:r>
+                <a:r>
+                  <a:rPr lang="fr-FR" b="1" dirty="0" err="1"/>
+                  <a:t>fastly</a:t>
+                </a:r>
+                <a:r>
+                  <a:rPr lang="fr-FR" b="1" dirty="0"/>
+                  <a:t>!</a:t>
+                </a:r>
+              </a:p>
+            </p:txBody>
+          </p:sp>
+        </mc:Choice>
+        <mc:Fallback xmlns="">
+          <p:sp>
+            <p:nvSpPr>
+              <p:cNvPr id="3" name="Espace réservé du contenu 2">
+                <a:extLst>
+                  <a:ext uri="{FF2B5EF4-FFF2-40B4-BE49-F238E27FC236}">
+                    <a16:creationId xmlns:a16="http://schemas.microsoft.com/office/drawing/2014/main" id="{FD768049-343D-9EB5-B2D9-091FDD70AC44}"/>
+                  </a:ext>
+                </a:extLst>
+              </p:cNvPr>
+              <p:cNvSpPr>
+                <a:spLocks noGrp="1" noRot="1" noChangeAspect="1" noMove="1" noResize="1" noEditPoints="1" noAdjustHandles="1" noChangeArrowheads="1" noChangeShapeType="1" noTextEdit="1"/>
+              </p:cNvSpPr>
+              <p:nvPr>
+                <p:ph idx="1"/>
+              </p:nvPr>
+            </p:nvSpPr>
+            <p:spPr>
+              <a:xfrm>
+                <a:off x="1202878" y="2241755"/>
+                <a:ext cx="8595360" cy="4351337"/>
+              </a:xfrm>
+              <a:blipFill>
+                <a:blip r:embed="rId2"/>
+                <a:stretch>
+                  <a:fillRect l="-142" t="-1120"/>
+                </a:stretch>
+              </a:blipFill>
+            </p:spPr>
+            <p:txBody>
+              <a:bodyPr/>
+              <a:lstStyle/>
+              <a:p>
+                <a:r>
+                  <a:rPr lang="fr-FR">
+                    <a:noFill/>
+                  </a:rPr>
+                  <a:t> </a:t>
+                </a:r>
+              </a:p>
+            </p:txBody>
+          </p:sp>
+        </mc:Fallback>
+      </mc:AlternateContent>
       <p:sp>
         <p:nvSpPr>
           <p:cNvPr id="4" name="Espace réservé du numéro de diapositive 3">
@@ -6181,10 +6579,102 @@
           </a:p>
         </p:txBody>
       </p:sp>
+      <p:grpSp>
+        <p:nvGrpSpPr>
+          <p:cNvPr id="8" name="Groupe 7">
+            <a:extLst>
+              <a:ext uri="{FF2B5EF4-FFF2-40B4-BE49-F238E27FC236}">
+                <a16:creationId xmlns:a16="http://schemas.microsoft.com/office/drawing/2014/main" id="{50595793-200F-1E07-E1E6-9ADCB0FD44F1}"/>
+              </a:ext>
+            </a:extLst>
+          </p:cNvPr>
+          <p:cNvGrpSpPr/>
+          <p:nvPr/>
+        </p:nvGrpSpPr>
+        <p:grpSpPr>
+          <a:xfrm>
+            <a:off x="4888274" y="2815421"/>
+            <a:ext cx="5876925" cy="3356779"/>
+            <a:chOff x="4848080" y="2812460"/>
+            <a:chExt cx="5876925" cy="3356779"/>
+          </a:xfrm>
+        </p:grpSpPr>
+        <p:pic>
+          <p:nvPicPr>
+            <p:cNvPr id="6" name="Image 5" descr="Schéma explicatif du gradient boosting">
+              <a:extLst>
+                <a:ext uri="{FF2B5EF4-FFF2-40B4-BE49-F238E27FC236}">
+                  <a16:creationId xmlns:a16="http://schemas.microsoft.com/office/drawing/2014/main" id="{88FB0389-9AF8-5E6B-7AEF-3AEAFBCB340A}"/>
+                </a:ext>
+              </a:extLst>
+            </p:cNvPr>
+            <p:cNvPicPr>
+              <a:picLocks noChangeAspect="1"/>
+            </p:cNvPicPr>
+            <p:nvPr/>
+          </p:nvPicPr>
+          <p:blipFill>
+            <a:blip r:embed="rId3">
+              <a:extLst>
+                <a:ext uri="{28A0092B-C50C-407E-A947-70E740481C1C}">
+                  <a14:useLocalDpi xmlns:a14="http://schemas.microsoft.com/office/drawing/2010/main" val="0"/>
+                </a:ext>
+              </a:extLst>
+            </a:blip>
+            <a:stretch>
+              <a:fillRect/>
+            </a:stretch>
+          </p:blipFill>
+          <p:spPr>
+            <a:xfrm>
+              <a:off x="4848080" y="2812460"/>
+              <a:ext cx="5876925" cy="3209925"/>
+            </a:xfrm>
+            <a:prstGeom prst="rect">
+              <a:avLst/>
+            </a:prstGeom>
+          </p:spPr>
+        </p:pic>
+        <p:sp>
+          <p:nvSpPr>
+            <p:cNvPr id="7" name="ZoneTexte 6">
+              <a:extLst>
+                <a:ext uri="{FF2B5EF4-FFF2-40B4-BE49-F238E27FC236}">
+                  <a16:creationId xmlns:a16="http://schemas.microsoft.com/office/drawing/2014/main" id="{4CE9210C-3BA5-5E71-5D9D-EE64BA3207A3}"/>
+                </a:ext>
+              </a:extLst>
+            </p:cNvPr>
+            <p:cNvSpPr txBox="1"/>
+            <p:nvPr/>
+          </p:nvSpPr>
+          <p:spPr>
+            <a:xfrm>
+              <a:off x="5005159" y="5892240"/>
+              <a:ext cx="4499950" cy="276999"/>
+            </a:xfrm>
+            <a:prstGeom prst="rect">
+              <a:avLst/>
+            </a:prstGeom>
+            <a:noFill/>
+          </p:spPr>
+          <p:txBody>
+            <a:bodyPr wrap="none" rtlCol="0">
+              <a:spAutoFit/>
+            </a:bodyPr>
+            <a:lstStyle/>
+            <a:p>
+              <a:r>
+                <a:rPr lang="fr-FR" sz="1200" dirty="0"/>
+                <a:t>Source: https://www.geeksforgeeks.org/ml-gradient-boosting/</a:t>
+              </a:r>
+            </a:p>
+          </p:txBody>
+        </p:sp>
+      </p:grpSp>
     </p:spTree>
     <p:extLst>
       <p:ext uri="{BB962C8B-B14F-4D97-AF65-F5344CB8AC3E}">
-        <p14:creationId xmlns:p14="http://schemas.microsoft.com/office/powerpoint/2010/main" val="247627698"/>
+        <p14:creationId xmlns:p14="http://schemas.microsoft.com/office/powerpoint/2010/main" val="3693720662"/>
       </p:ext>
     </p:extLst>
   </p:cSld>
@@ -6216,7 +6706,7 @@
           <p:cNvPr id="2" name="Titre 1">
             <a:extLst>
               <a:ext uri="{FF2B5EF4-FFF2-40B4-BE49-F238E27FC236}">
-                <a16:creationId xmlns:a16="http://schemas.microsoft.com/office/drawing/2014/main" id="{6E083F9C-0465-A00D-5493-1BB6D273FFD2}"/>
+                <a16:creationId xmlns:a16="http://schemas.microsoft.com/office/drawing/2014/main" id="{0241FDBA-865B-2B8B-35F8-270B89A5484F}"/>
               </a:ext>
             </a:extLst>
           </p:cNvPr>
@@ -6229,18 +6719,64 @@
         </p:nvSpPr>
         <p:spPr>
           <a:xfrm>
-            <a:off x="1141413" y="609600"/>
-            <a:ext cx="9905998" cy="983226"/>
+            <a:off x="1143884" y="729553"/>
+            <a:ext cx="10605663" cy="1325562"/>
           </a:xfrm>
         </p:spPr>
         <p:txBody>
-          <a:bodyPr/>
+          <a:bodyPr>
+            <a:normAutofit fontScale="90000"/>
+          </a:bodyPr>
           <a:lstStyle/>
           <a:p>
             <a:r>
               <a:rPr lang="fr-FR" b="1" dirty="0"/>
-              <a:t>VI - Conclusion</a:t>
-            </a:r>
+              <a:t>V – Second machine </a:t>
+            </a:r>
+            <a:r>
+              <a:rPr lang="fr-FR" b="1" dirty="0" err="1"/>
+              <a:t>learning</a:t>
+            </a:r>
+            <a:r>
+              <a:rPr lang="fr-FR" b="1" dirty="0"/>
+              <a:t> </a:t>
+            </a:r>
+            <a:r>
+              <a:rPr lang="fr-FR" b="1" dirty="0" err="1"/>
+              <a:t>procedures</a:t>
+            </a:r>
+            <a:br>
+              <a:rPr lang="fr-FR" b="1" dirty="0"/>
+            </a:br>
+            <a:r>
+              <a:rPr lang="fr-FR" dirty="0" err="1"/>
+              <a:t>Tree</a:t>
+            </a:r>
+            <a:r>
+              <a:rPr lang="fr-FR" dirty="0"/>
+              <a:t> </a:t>
+            </a:r>
+            <a:r>
+              <a:rPr lang="fr-FR" dirty="0" err="1"/>
+              <a:t>Based</a:t>
+            </a:r>
+            <a:r>
+              <a:rPr lang="fr-FR" dirty="0"/>
+              <a:t> </a:t>
+            </a:r>
+            <a:r>
+              <a:rPr lang="fr-FR" dirty="0" err="1"/>
+              <a:t>methods</a:t>
+            </a:r>
+            <a:r>
+              <a:rPr lang="fr-FR" dirty="0"/>
+              <a:t> – </a:t>
+            </a:r>
+            <a:r>
+              <a:rPr lang="fr-FR" dirty="0" err="1"/>
+              <a:t>XGBoost</a:t>
+            </a:r>
+            <a:endParaRPr lang="fr-FR" dirty="0"/>
           </a:p>
         </p:txBody>
       </p:sp>
@@ -6249,7 +6785,7 @@
           <p:cNvPr id="3" name="Espace réservé du contenu 2">
             <a:extLst>
               <a:ext uri="{FF2B5EF4-FFF2-40B4-BE49-F238E27FC236}">
-                <a16:creationId xmlns:a16="http://schemas.microsoft.com/office/drawing/2014/main" id="{2B532F68-EF4E-2C33-FB15-EA643FA46D2B}"/>
+                <a16:creationId xmlns:a16="http://schemas.microsoft.com/office/drawing/2014/main" id="{FD768049-343D-9EB5-B2D9-091FDD70AC44}"/>
               </a:ext>
             </a:extLst>
           </p:cNvPr>
@@ -6260,12 +6796,83 @@
             <p:ph idx="1"/>
           </p:nvPr>
         </p:nvSpPr>
-        <p:spPr/>
+        <p:spPr>
+          <a:xfrm>
+            <a:off x="1202878" y="2241755"/>
+            <a:ext cx="8595360" cy="4351337"/>
+          </a:xfrm>
+        </p:spPr>
         <p:txBody>
           <a:bodyPr/>
           <a:lstStyle/>
           <a:p>
-            <a:endParaRPr lang="fr-FR"/>
+            <a:r>
+              <a:rPr lang="fr-FR" b="1" dirty="0"/>
+              <a:t>On </a:t>
+            </a:r>
+            <a:r>
+              <a:rPr lang="fr-FR" b="1" dirty="0" err="1"/>
+              <a:t>our</a:t>
+            </a:r>
+            <a:r>
+              <a:rPr lang="fr-FR" b="1" dirty="0"/>
+              <a:t> data</a:t>
+            </a:r>
+          </a:p>
+          <a:p>
+            <a:pPr lvl="1"/>
+            <a:r>
+              <a:rPr lang="fr-FR" dirty="0" err="1"/>
+              <a:t>Regression</a:t>
+            </a:r>
+            <a:endParaRPr lang="fr-FR" dirty="0"/>
+          </a:p>
+          <a:p>
+            <a:pPr lvl="1"/>
+            <a:r>
+              <a:rPr lang="fr-FR" dirty="0" err="1"/>
+              <a:t>Optimized</a:t>
+            </a:r>
+            <a:r>
+              <a:rPr lang="fr-FR" dirty="0"/>
+              <a:t> </a:t>
+            </a:r>
+            <a:r>
+              <a:rPr lang="fr-FR" dirty="0" err="1"/>
+              <a:t>hyperparameters</a:t>
+            </a:r>
+            <a:r>
+              <a:rPr lang="fr-FR" dirty="0"/>
+              <a:t> </a:t>
+            </a:r>
+            <a:r>
+              <a:rPr lang="fr-FR" dirty="0" err="1"/>
+              <a:t>using</a:t>
+            </a:r>
+            <a:r>
+              <a:rPr lang="fr-FR" dirty="0"/>
+              <a:t> cross-validation</a:t>
+            </a:r>
+          </a:p>
+          <a:p>
+            <a:pPr lvl="1"/>
+            <a:r>
+              <a:rPr lang="fr-FR" b="1" dirty="0" err="1"/>
+              <a:t>Results</a:t>
+            </a:r>
+            <a:r>
+              <a:rPr lang="fr-FR" b="1" dirty="0"/>
+              <a:t>:</a:t>
+            </a:r>
+          </a:p>
+          <a:p>
+            <a:endParaRPr lang="fr-FR" b="1" dirty="0"/>
+          </a:p>
+          <a:p>
+            <a:endParaRPr lang="fr-FR" b="1" dirty="0"/>
+          </a:p>
+          <a:p>
+            <a:endParaRPr lang="fr-FR" b="1" dirty="0"/>
           </a:p>
         </p:txBody>
       </p:sp>
@@ -6274,7 +6881,7 @@
           <p:cNvPr id="4" name="Espace réservé du numéro de diapositive 3">
             <a:extLst>
               <a:ext uri="{FF2B5EF4-FFF2-40B4-BE49-F238E27FC236}">
-                <a16:creationId xmlns:a16="http://schemas.microsoft.com/office/drawing/2014/main" id="{FE7C4907-2A3C-6DD8-27C9-1A003A70920B}"/>
+                <a16:creationId xmlns:a16="http://schemas.microsoft.com/office/drawing/2014/main" id="{C2328755-8715-B3C4-ADDD-1AA048EC231E}"/>
               </a:ext>
             </a:extLst>
           </p:cNvPr>
@@ -6300,10 +6907,983 @@
           </a:p>
         </p:txBody>
       </p:sp>
+      <p:pic>
+        <p:nvPicPr>
+          <p:cNvPr id="6" name="Image 5">
+            <a:extLst>
+              <a:ext uri="{FF2B5EF4-FFF2-40B4-BE49-F238E27FC236}">
+                <a16:creationId xmlns:a16="http://schemas.microsoft.com/office/drawing/2014/main" id="{D1DB1694-D5CB-B1D2-D1A5-E320E8F600D7}"/>
+              </a:ext>
+            </a:extLst>
+          </p:cNvPr>
+          <p:cNvPicPr>
+            <a:picLocks noChangeAspect="1"/>
+          </p:cNvPicPr>
+          <p:nvPr/>
+        </p:nvPicPr>
+        <p:blipFill>
+          <a:blip r:embed="rId2"/>
+          <a:stretch>
+            <a:fillRect/>
+          </a:stretch>
+        </p:blipFill>
+        <p:spPr>
+          <a:xfrm>
+            <a:off x="1440528" y="3739050"/>
+            <a:ext cx="9105011" cy="2127672"/>
+          </a:xfrm>
+          <a:prstGeom prst="rect">
+            <a:avLst/>
+          </a:prstGeom>
+        </p:spPr>
+      </p:pic>
+      <p:sp>
+        <p:nvSpPr>
+          <p:cNvPr id="7" name="Ellipse 6">
+            <a:extLst>
+              <a:ext uri="{FF2B5EF4-FFF2-40B4-BE49-F238E27FC236}">
+                <a16:creationId xmlns:a16="http://schemas.microsoft.com/office/drawing/2014/main" id="{4D1CFF9C-A8AA-0C0F-1651-D09BF082A804}"/>
+              </a:ext>
+            </a:extLst>
+          </p:cNvPr>
+          <p:cNvSpPr/>
+          <p:nvPr/>
+        </p:nvSpPr>
+        <p:spPr>
+          <a:xfrm>
+            <a:off x="5614491" y="4102790"/>
+            <a:ext cx="757083" cy="314633"/>
+          </a:xfrm>
+          <a:prstGeom prst="ellipse">
+            <a:avLst/>
+          </a:prstGeom>
+          <a:noFill/>
+          <a:ln>
+            <a:solidFill>
+              <a:srgbClr val="FF0000"/>
+            </a:solidFill>
+          </a:ln>
+        </p:spPr>
+        <p:style>
+          <a:lnRef idx="2">
+            <a:schemeClr val="accent6"/>
+          </a:lnRef>
+          <a:fillRef idx="1">
+            <a:schemeClr val="lt1"/>
+          </a:fillRef>
+          <a:effectRef idx="0">
+            <a:schemeClr val="accent6"/>
+          </a:effectRef>
+          <a:fontRef idx="minor">
+            <a:schemeClr val="dk1"/>
+          </a:fontRef>
+        </p:style>
+        <p:txBody>
+          <a:bodyPr rtlCol="0" anchor="ctr"/>
+          <a:lstStyle/>
+          <a:p>
+            <a:pPr algn="ctr"/>
+            <a:endParaRPr lang="fr-FR"/>
+          </a:p>
+        </p:txBody>
+      </p:sp>
+      <p:sp>
+        <p:nvSpPr>
+          <p:cNvPr id="8" name="ZoneTexte 7">
+            <a:extLst>
+              <a:ext uri="{FF2B5EF4-FFF2-40B4-BE49-F238E27FC236}">
+                <a16:creationId xmlns:a16="http://schemas.microsoft.com/office/drawing/2014/main" id="{B47857DA-ECA4-2E15-2359-3BE187DD49D9}"/>
+              </a:ext>
+            </a:extLst>
+          </p:cNvPr>
+          <p:cNvSpPr txBox="1"/>
+          <p:nvPr/>
+        </p:nvSpPr>
+        <p:spPr>
+          <a:xfrm>
+            <a:off x="7516835" y="3244334"/>
+            <a:ext cx="1770036" cy="369332"/>
+          </a:xfrm>
+          <a:prstGeom prst="rect">
+            <a:avLst/>
+          </a:prstGeom>
+          <a:noFill/>
+        </p:spPr>
+        <p:txBody>
+          <a:bodyPr wrap="none" rtlCol="0">
+            <a:spAutoFit/>
+          </a:bodyPr>
+          <a:lstStyle/>
+          <a:p>
+            <a:r>
+              <a:rPr lang="fr-FR" b="1" dirty="0"/>
+              <a:t>Good </a:t>
+            </a:r>
+            <a:r>
+              <a:rPr lang="fr-FR" b="1" dirty="0" err="1"/>
+              <a:t>results</a:t>
+            </a:r>
+            <a:r>
+              <a:rPr lang="fr-FR" b="1" dirty="0"/>
+              <a:t>!</a:t>
+            </a:r>
+          </a:p>
+        </p:txBody>
+      </p:sp>
+      <p:cxnSp>
+        <p:nvCxnSpPr>
+          <p:cNvPr id="11" name="Connecteur droit avec flèche 10">
+            <a:extLst>
+              <a:ext uri="{FF2B5EF4-FFF2-40B4-BE49-F238E27FC236}">
+                <a16:creationId xmlns:a16="http://schemas.microsoft.com/office/drawing/2014/main" id="{A07891CF-4971-2057-6F0C-58E9BE016B39}"/>
+              </a:ext>
+            </a:extLst>
+          </p:cNvPr>
+          <p:cNvCxnSpPr>
+            <a:cxnSpLocks/>
+            <a:stCxn id="8" idx="1"/>
+            <a:endCxn id="7" idx="7"/>
+          </p:cNvCxnSpPr>
+          <p:nvPr/>
+        </p:nvCxnSpPr>
+        <p:spPr>
+          <a:xfrm flipH="1">
+            <a:off x="6260702" y="3429000"/>
+            <a:ext cx="1256133" cy="719867"/>
+          </a:xfrm>
+          <a:prstGeom prst="straightConnector1">
+            <a:avLst/>
+          </a:prstGeom>
+          <a:ln w="12700">
+            <a:tailEnd type="triangle"/>
+          </a:ln>
+        </p:spPr>
+        <p:style>
+          <a:lnRef idx="1">
+            <a:schemeClr val="dk1"/>
+          </a:lnRef>
+          <a:fillRef idx="0">
+            <a:schemeClr val="dk1"/>
+          </a:fillRef>
+          <a:effectRef idx="0">
+            <a:schemeClr val="dk1"/>
+          </a:effectRef>
+          <a:fontRef idx="minor">
+            <a:schemeClr val="tx1"/>
+          </a:fontRef>
+        </p:style>
+      </p:cxnSp>
+      <p:sp>
+        <p:nvSpPr>
+          <p:cNvPr id="13" name="Ellipse 12">
+            <a:extLst>
+              <a:ext uri="{FF2B5EF4-FFF2-40B4-BE49-F238E27FC236}">
+                <a16:creationId xmlns:a16="http://schemas.microsoft.com/office/drawing/2014/main" id="{8001D076-8BF3-37F2-0299-70626067370D}"/>
+              </a:ext>
+            </a:extLst>
+          </p:cNvPr>
+          <p:cNvSpPr/>
+          <p:nvPr/>
+        </p:nvSpPr>
+        <p:spPr>
+          <a:xfrm>
+            <a:off x="5641541" y="5090608"/>
+            <a:ext cx="757083" cy="314633"/>
+          </a:xfrm>
+          <a:prstGeom prst="ellipse">
+            <a:avLst/>
+          </a:prstGeom>
+          <a:noFill/>
+          <a:ln>
+            <a:solidFill>
+              <a:srgbClr val="FF0000"/>
+            </a:solidFill>
+          </a:ln>
+        </p:spPr>
+        <p:style>
+          <a:lnRef idx="2">
+            <a:schemeClr val="accent6"/>
+          </a:lnRef>
+          <a:fillRef idx="1">
+            <a:schemeClr val="lt1"/>
+          </a:fillRef>
+          <a:effectRef idx="0">
+            <a:schemeClr val="accent6"/>
+          </a:effectRef>
+          <a:fontRef idx="minor">
+            <a:schemeClr val="dk1"/>
+          </a:fontRef>
+        </p:style>
+        <p:txBody>
+          <a:bodyPr rtlCol="0" anchor="ctr"/>
+          <a:lstStyle/>
+          <a:p>
+            <a:pPr algn="ctr"/>
+            <a:endParaRPr lang="fr-FR"/>
+          </a:p>
+        </p:txBody>
+      </p:sp>
+      <p:sp>
+        <p:nvSpPr>
+          <p:cNvPr id="14" name="ZoneTexte 13">
+            <a:extLst>
+              <a:ext uri="{FF2B5EF4-FFF2-40B4-BE49-F238E27FC236}">
+                <a16:creationId xmlns:a16="http://schemas.microsoft.com/office/drawing/2014/main" id="{C9189CB8-3084-0DF7-9A09-38FD41EBCE30}"/>
+              </a:ext>
+            </a:extLst>
+          </p:cNvPr>
+          <p:cNvSpPr txBox="1"/>
+          <p:nvPr/>
+        </p:nvSpPr>
+        <p:spPr>
+          <a:xfrm>
+            <a:off x="7310998" y="5906741"/>
+            <a:ext cx="3234541" cy="646331"/>
+          </a:xfrm>
+          <a:prstGeom prst="rect">
+            <a:avLst/>
+          </a:prstGeom>
+          <a:noFill/>
+        </p:spPr>
+        <p:txBody>
+          <a:bodyPr wrap="square" rtlCol="0">
+            <a:spAutoFit/>
+          </a:bodyPr>
+          <a:lstStyle/>
+          <a:p>
+            <a:r>
+              <a:rPr lang="fr-FR" dirty="0" err="1"/>
+              <a:t>Unable</a:t>
+            </a:r>
+            <a:r>
+              <a:rPr lang="fr-FR" dirty="0"/>
+              <a:t> to </a:t>
+            </a:r>
+            <a:r>
+              <a:rPr lang="fr-FR" dirty="0" err="1"/>
+              <a:t>identify</a:t>
+            </a:r>
+            <a:r>
+              <a:rPr lang="fr-FR" dirty="0"/>
+              <a:t> the </a:t>
+            </a:r>
+            <a:r>
+              <a:rPr lang="fr-FR" dirty="0" err="1"/>
+              <a:t>effect</a:t>
+            </a:r>
+            <a:r>
+              <a:rPr lang="fr-FR" dirty="0"/>
+              <a:t> of </a:t>
+            </a:r>
+            <a:r>
+              <a:rPr lang="fr-FR" dirty="0" err="1"/>
+              <a:t>genetic</a:t>
+            </a:r>
+            <a:r>
+              <a:rPr lang="fr-FR" dirty="0"/>
+              <a:t> variables</a:t>
+            </a:r>
+          </a:p>
+        </p:txBody>
+      </p:sp>
+      <p:cxnSp>
+        <p:nvCxnSpPr>
+          <p:cNvPr id="16" name="Connecteur droit avec flèche 15">
+            <a:extLst>
+              <a:ext uri="{FF2B5EF4-FFF2-40B4-BE49-F238E27FC236}">
+                <a16:creationId xmlns:a16="http://schemas.microsoft.com/office/drawing/2014/main" id="{DF4971D1-101F-B14D-3B53-C33069BBFA06}"/>
+              </a:ext>
+            </a:extLst>
+          </p:cNvPr>
+          <p:cNvCxnSpPr>
+            <a:cxnSpLocks/>
+            <a:stCxn id="14" idx="1"/>
+            <a:endCxn id="13" idx="5"/>
+          </p:cNvCxnSpPr>
+          <p:nvPr/>
+        </p:nvCxnSpPr>
+        <p:spPr>
+          <a:xfrm flipH="1" flipV="1">
+            <a:off x="6287752" y="5359164"/>
+            <a:ext cx="1023246" cy="870743"/>
+          </a:xfrm>
+          <a:prstGeom prst="straightConnector1">
+            <a:avLst/>
+          </a:prstGeom>
+          <a:ln w="12700">
+            <a:tailEnd type="triangle"/>
+          </a:ln>
+        </p:spPr>
+        <p:style>
+          <a:lnRef idx="1">
+            <a:schemeClr val="dk1"/>
+          </a:lnRef>
+          <a:fillRef idx="0">
+            <a:schemeClr val="dk1"/>
+          </a:fillRef>
+          <a:effectRef idx="0">
+            <a:schemeClr val="dk1"/>
+          </a:effectRef>
+          <a:fontRef idx="minor">
+            <a:schemeClr val="tx1"/>
+          </a:fontRef>
+        </p:style>
+      </p:cxnSp>
     </p:spTree>
     <p:extLst>
       <p:ext uri="{BB962C8B-B14F-4D97-AF65-F5344CB8AC3E}">
-        <p14:creationId xmlns:p14="http://schemas.microsoft.com/office/powerpoint/2010/main" val="1363480817"/>
+        <p14:creationId xmlns:p14="http://schemas.microsoft.com/office/powerpoint/2010/main" val="501047713"/>
+      </p:ext>
+    </p:extLst>
+  </p:cSld>
+  <p:clrMapOvr>
+    <a:masterClrMapping/>
+  </p:clrMapOvr>
+</p:sld>
+</file>
+
+<file path=ppt/slides/slide18.xml><?xml version="1.0" encoding="utf-8"?>
+<p:sld xmlns:a="http://schemas.openxmlformats.org/drawingml/2006/main" xmlns:r="http://schemas.openxmlformats.org/officeDocument/2006/relationships" xmlns:p="http://schemas.openxmlformats.org/presentationml/2006/main">
+  <p:cSld>
+    <p:spTree>
+      <p:nvGrpSpPr>
+        <p:cNvPr id="1" name=""/>
+        <p:cNvGrpSpPr/>
+        <p:nvPr/>
+      </p:nvGrpSpPr>
+      <p:grpSpPr>
+        <a:xfrm>
+          <a:off x="0" y="0"/>
+          <a:ext cx="0" cy="0"/>
+          <a:chOff x="0" y="0"/>
+          <a:chExt cx="0" cy="0"/>
+        </a:xfrm>
+      </p:grpSpPr>
+      <p:sp>
+        <p:nvSpPr>
+          <p:cNvPr id="2" name="Titre 1">
+            <a:extLst>
+              <a:ext uri="{FF2B5EF4-FFF2-40B4-BE49-F238E27FC236}">
+                <a16:creationId xmlns:a16="http://schemas.microsoft.com/office/drawing/2014/main" id="{0241FDBA-865B-2B8B-35F8-270B89A5484F}"/>
+              </a:ext>
+            </a:extLst>
+          </p:cNvPr>
+          <p:cNvSpPr>
+            <a:spLocks noGrp="1"/>
+          </p:cNvSpPr>
+          <p:nvPr>
+            <p:ph type="title"/>
+          </p:nvPr>
+        </p:nvSpPr>
+        <p:spPr>
+          <a:xfrm>
+            <a:off x="1143884" y="729553"/>
+            <a:ext cx="10605663" cy="1325562"/>
+          </a:xfrm>
+        </p:spPr>
+        <p:txBody>
+          <a:bodyPr>
+            <a:normAutofit fontScale="90000"/>
+          </a:bodyPr>
+          <a:lstStyle/>
+          <a:p>
+            <a:r>
+              <a:rPr lang="fr-FR" b="1" dirty="0"/>
+              <a:t>V – Second machine </a:t>
+            </a:r>
+            <a:r>
+              <a:rPr lang="fr-FR" b="1" dirty="0" err="1"/>
+              <a:t>learning</a:t>
+            </a:r>
+            <a:r>
+              <a:rPr lang="fr-FR" b="1" dirty="0"/>
+              <a:t> </a:t>
+            </a:r>
+            <a:r>
+              <a:rPr lang="fr-FR" b="1" dirty="0" err="1"/>
+              <a:t>procedures</a:t>
+            </a:r>
+            <a:br>
+              <a:rPr lang="fr-FR" b="1" dirty="0"/>
+            </a:br>
+            <a:r>
+              <a:rPr lang="fr-FR" dirty="0" err="1"/>
+              <a:t>Tree</a:t>
+            </a:r>
+            <a:r>
+              <a:rPr lang="fr-FR" dirty="0"/>
+              <a:t> </a:t>
+            </a:r>
+            <a:r>
+              <a:rPr lang="fr-FR" dirty="0" err="1"/>
+              <a:t>Based</a:t>
+            </a:r>
+            <a:r>
+              <a:rPr lang="fr-FR" dirty="0"/>
+              <a:t> </a:t>
+            </a:r>
+            <a:r>
+              <a:rPr lang="fr-FR" dirty="0" err="1"/>
+              <a:t>methods</a:t>
+            </a:r>
+            <a:r>
+              <a:rPr lang="fr-FR" dirty="0"/>
+              <a:t> – </a:t>
+            </a:r>
+            <a:r>
+              <a:rPr lang="fr-FR" dirty="0" err="1"/>
+              <a:t>XGBoost</a:t>
+            </a:r>
+            <a:endParaRPr lang="fr-FR" dirty="0"/>
+          </a:p>
+        </p:txBody>
+      </p:sp>
+      <mc:AlternateContent xmlns:mc="http://schemas.openxmlformats.org/markup-compatibility/2006" xmlns:a14="http://schemas.microsoft.com/office/drawing/2010/main">
+        <mc:Choice Requires="a14">
+          <p:sp>
+            <p:nvSpPr>
+              <p:cNvPr id="3" name="Espace réservé du contenu 2">
+                <a:extLst>
+                  <a:ext uri="{FF2B5EF4-FFF2-40B4-BE49-F238E27FC236}">
+                    <a16:creationId xmlns:a16="http://schemas.microsoft.com/office/drawing/2014/main" id="{FD768049-343D-9EB5-B2D9-091FDD70AC44}"/>
+                  </a:ext>
+                </a:extLst>
+              </p:cNvPr>
+              <p:cNvSpPr>
+                <a:spLocks noGrp="1"/>
+              </p:cNvSpPr>
+              <p:nvPr>
+                <p:ph idx="1"/>
+              </p:nvPr>
+            </p:nvSpPr>
+            <p:spPr>
+              <a:xfrm>
+                <a:off x="1202878" y="2241755"/>
+                <a:ext cx="8595360" cy="4351337"/>
+              </a:xfrm>
+            </p:spPr>
+            <p:txBody>
+              <a:bodyPr/>
+              <a:lstStyle/>
+              <a:p>
+                <a:r>
+                  <a:rPr lang="fr-FR" b="1" dirty="0"/>
+                  <a:t>On </a:t>
+                </a:r>
+                <a:r>
+                  <a:rPr lang="fr-FR" b="1" dirty="0" err="1"/>
+                  <a:t>our</a:t>
+                </a:r>
+                <a:r>
+                  <a:rPr lang="fr-FR" b="1" dirty="0"/>
+                  <a:t> data</a:t>
+                </a:r>
+              </a:p>
+              <a:p>
+                <a:pPr lvl="1"/>
+                <a:r>
+                  <a:rPr lang="fr-FR" dirty="0" err="1"/>
+                  <a:t>Regression</a:t>
+                </a:r>
+                <a:r>
+                  <a:rPr lang="fr-FR" dirty="0"/>
+                  <a:t> </a:t>
+                </a:r>
+                <a14:m>
+                  <m:oMath xmlns:m="http://schemas.openxmlformats.org/officeDocument/2006/math">
+                    <m:r>
+                      <a:rPr lang="fr-FR" b="0" i="1" smtClean="0">
+                        <a:latin typeface="Cambria Math" panose="02040503050406030204" pitchFamily="18" charset="0"/>
+                      </a:rPr>
+                      <m:t>⇒</m:t>
+                    </m:r>
+                  </m:oMath>
+                </a14:m>
+                <a:r>
+                  <a:rPr lang="fr-FR" dirty="0"/>
+                  <a:t> </a:t>
+                </a:r>
+                <a:r>
+                  <a:rPr lang="fr-FR" b="1" dirty="0" err="1"/>
+                  <a:t>what</a:t>
+                </a:r>
+                <a:r>
+                  <a:rPr lang="fr-FR" b="1" dirty="0"/>
+                  <a:t> about classification?</a:t>
+                </a:r>
+              </a:p>
+              <a:p>
+                <a:pPr lvl="1"/>
+                <a:r>
+                  <a:rPr lang="fr-FR" dirty="0"/>
+                  <a:t>Is GHI = 99 </a:t>
+                </a:r>
+                <a:r>
+                  <a:rPr lang="fr-FR" dirty="0" err="1"/>
+                  <a:t>really</a:t>
+                </a:r>
+                <a:r>
+                  <a:rPr lang="fr-FR" dirty="0"/>
+                  <a:t> </a:t>
+                </a:r>
+                <a:r>
+                  <a:rPr lang="fr-FR" dirty="0" err="1"/>
+                  <a:t>worse</a:t>
+                </a:r>
+                <a:r>
+                  <a:rPr lang="fr-FR" dirty="0"/>
+                  <a:t> </a:t>
+                </a:r>
+                <a:r>
+                  <a:rPr lang="fr-FR" dirty="0" err="1"/>
+                  <a:t>than</a:t>
+                </a:r>
+                <a:r>
+                  <a:rPr lang="fr-FR" dirty="0"/>
+                  <a:t> GHI = 100?</a:t>
+                </a:r>
+              </a:p>
+              <a:p>
+                <a:r>
+                  <a:rPr lang="fr-FR" b="1" dirty="0"/>
+                  <a:t>For 2 </a:t>
+                </a:r>
+                <a:r>
+                  <a:rPr lang="fr-FR" b="1" dirty="0" err="1"/>
+                  <a:t>categories</a:t>
+                </a:r>
+                <a:r>
+                  <a:rPr lang="fr-FR" b="1" dirty="0"/>
+                  <a:t> </a:t>
+                </a:r>
+                <a:r>
+                  <a:rPr lang="fr-FR" i="1" dirty="0"/>
+                  <a:t>{</a:t>
+                </a:r>
+                <a:r>
+                  <a:rPr lang="fr-FR" i="1" dirty="0" err="1"/>
+                  <a:t>bad</a:t>
+                </a:r>
+                <a:r>
+                  <a:rPr lang="fr-FR" i="1" dirty="0"/>
+                  <a:t> </a:t>
+                </a:r>
+                <a:r>
+                  <a:rPr lang="fr-FR" i="1" dirty="0" err="1"/>
+                  <a:t>health</a:t>
+                </a:r>
+                <a:r>
+                  <a:rPr lang="fr-FR" i="1" dirty="0"/>
+                  <a:t>, good </a:t>
+                </a:r>
+                <a:r>
+                  <a:rPr lang="fr-FR" i="1" dirty="0" err="1"/>
+                  <a:t>health</a:t>
+                </a:r>
+                <a:r>
+                  <a:rPr lang="fr-FR" i="1" dirty="0"/>
+                  <a:t>}</a:t>
+                </a:r>
+                <a:r>
+                  <a:rPr lang="fr-FR" dirty="0"/>
+                  <a:t>,</a:t>
+                </a:r>
+              </a:p>
+              <a:p>
+                <a:pPr lvl="1"/>
+                <a:r>
+                  <a:rPr lang="fr-FR" dirty="0"/>
+                  <a:t>75,31% of </a:t>
+                </a:r>
+                <a:r>
+                  <a:rPr lang="fr-FR" dirty="0" err="1"/>
+                  <a:t>accuracy</a:t>
+                </a:r>
+                <a:endParaRPr lang="fr-FR" dirty="0"/>
+              </a:p>
+              <a:p>
+                <a:pPr lvl="1"/>
+                <a:r>
+                  <a:rPr lang="fr-FR" dirty="0"/>
+                  <a:t>1,51 times </a:t>
+                </a:r>
+                <a:r>
+                  <a:rPr lang="fr-FR" dirty="0" err="1"/>
+                  <a:t>better</a:t>
+                </a:r>
+                <a:r>
+                  <a:rPr lang="fr-FR" dirty="0"/>
+                  <a:t> </a:t>
+                </a:r>
+                <a:r>
+                  <a:rPr lang="fr-FR" dirty="0" err="1"/>
+                  <a:t>than</a:t>
+                </a:r>
+                <a:r>
+                  <a:rPr lang="fr-FR" dirty="0"/>
+                  <a:t> </a:t>
+                </a:r>
+                <a:r>
+                  <a:rPr lang="fr-FR" dirty="0" err="1"/>
+                  <a:t>dummy</a:t>
+                </a:r>
+                <a:r>
+                  <a:rPr lang="fr-FR" dirty="0"/>
+                  <a:t> classifier</a:t>
+                </a:r>
+              </a:p>
+              <a:p>
+                <a:r>
+                  <a:rPr lang="fr-FR" b="1" dirty="0"/>
+                  <a:t>For 10 </a:t>
+                </a:r>
+                <a:r>
+                  <a:rPr lang="fr-FR" b="1" dirty="0" err="1"/>
+                  <a:t>categories</a:t>
+                </a:r>
+                <a:r>
+                  <a:rPr lang="fr-FR" dirty="0"/>
+                  <a:t>,</a:t>
+                </a:r>
+              </a:p>
+              <a:p>
+                <a:pPr lvl="1"/>
+                <a:r>
+                  <a:rPr lang="fr-FR" dirty="0"/>
+                  <a:t>41,21% of </a:t>
+                </a:r>
+                <a:r>
+                  <a:rPr lang="fr-FR" dirty="0" err="1"/>
+                  <a:t>accuracy</a:t>
+                </a:r>
+                <a:endParaRPr lang="fr-FR" dirty="0"/>
+              </a:p>
+              <a:p>
+                <a:pPr lvl="1"/>
+                <a:r>
+                  <a:rPr lang="fr-FR" dirty="0"/>
+                  <a:t>4,12 times </a:t>
+                </a:r>
+                <a:r>
+                  <a:rPr lang="fr-FR" dirty="0" err="1"/>
+                  <a:t>better</a:t>
+                </a:r>
+                <a:r>
+                  <a:rPr lang="fr-FR" dirty="0"/>
+                  <a:t> </a:t>
+                </a:r>
+                <a:r>
+                  <a:rPr lang="fr-FR" dirty="0" err="1"/>
+                  <a:t>than</a:t>
+                </a:r>
+                <a:r>
+                  <a:rPr lang="fr-FR" dirty="0"/>
+                  <a:t> </a:t>
+                </a:r>
+                <a:r>
+                  <a:rPr lang="fr-FR" dirty="0" err="1"/>
+                  <a:t>dummy</a:t>
+                </a:r>
+                <a:r>
+                  <a:rPr lang="fr-FR" dirty="0"/>
+                  <a:t> classifier!</a:t>
+                </a:r>
+              </a:p>
+              <a:p>
+                <a:pPr lvl="1"/>
+                <a:endParaRPr lang="fr-FR" b="1" dirty="0"/>
+              </a:p>
+              <a:p>
+                <a:endParaRPr lang="fr-FR" b="1" dirty="0"/>
+              </a:p>
+              <a:p>
+                <a:endParaRPr lang="fr-FR" b="1" dirty="0"/>
+              </a:p>
+            </p:txBody>
+          </p:sp>
+        </mc:Choice>
+        <mc:Fallback xmlns="">
+          <p:sp>
+            <p:nvSpPr>
+              <p:cNvPr id="3" name="Espace réservé du contenu 2">
+                <a:extLst>
+                  <a:ext uri="{FF2B5EF4-FFF2-40B4-BE49-F238E27FC236}">
+                    <a16:creationId xmlns:a16="http://schemas.microsoft.com/office/drawing/2014/main" id="{FD768049-343D-9EB5-B2D9-091FDD70AC44}"/>
+                  </a:ext>
+                </a:extLst>
+              </p:cNvPr>
+              <p:cNvSpPr>
+                <a:spLocks noGrp="1" noRot="1" noChangeAspect="1" noMove="1" noResize="1" noEditPoints="1" noAdjustHandles="1" noChangeArrowheads="1" noChangeShapeType="1" noTextEdit="1"/>
+              </p:cNvSpPr>
+              <p:nvPr>
+                <p:ph idx="1"/>
+              </p:nvPr>
+            </p:nvSpPr>
+            <p:spPr>
+              <a:xfrm>
+                <a:off x="1202878" y="2241755"/>
+                <a:ext cx="8595360" cy="4351337"/>
+              </a:xfrm>
+              <a:blipFill>
+                <a:blip r:embed="rId2"/>
+                <a:stretch>
+                  <a:fillRect l="-142" t="-1120"/>
+                </a:stretch>
+              </a:blipFill>
+            </p:spPr>
+            <p:txBody>
+              <a:bodyPr/>
+              <a:lstStyle/>
+              <a:p>
+                <a:r>
+                  <a:rPr lang="fr-FR">
+                    <a:noFill/>
+                  </a:rPr>
+                  <a:t> </a:t>
+                </a:r>
+              </a:p>
+            </p:txBody>
+          </p:sp>
+        </mc:Fallback>
+      </mc:AlternateContent>
+      <p:sp>
+        <p:nvSpPr>
+          <p:cNvPr id="4" name="Espace réservé du numéro de diapositive 3">
+            <a:extLst>
+              <a:ext uri="{FF2B5EF4-FFF2-40B4-BE49-F238E27FC236}">
+                <a16:creationId xmlns:a16="http://schemas.microsoft.com/office/drawing/2014/main" id="{C2328755-8715-B3C4-ADDD-1AA048EC231E}"/>
+              </a:ext>
+            </a:extLst>
+          </p:cNvPr>
+          <p:cNvSpPr>
+            <a:spLocks noGrp="1"/>
+          </p:cNvSpPr>
+          <p:nvPr>
+            <p:ph type="sldNum" sz="quarter" idx="12"/>
+          </p:nvPr>
+        </p:nvSpPr>
+        <p:spPr/>
+        <p:txBody>
+          <a:bodyPr>
+            <a:normAutofit lnSpcReduction="10000"/>
+          </a:bodyPr>
+          <a:lstStyle/>
+          <a:p>
+            <a:fld id="{DC9A08A5-7ACC-4C52-B2B9-9EF3D4E7F5B2}" type="slidenum">
+              <a:rPr lang="fr-FR" smtClean="0"/>
+              <a:t>18</a:t>
+            </a:fld>
+            <a:endParaRPr lang="fr-FR"/>
+          </a:p>
+        </p:txBody>
+      </p:sp>
+      <p:pic>
+        <p:nvPicPr>
+          <p:cNvPr id="13" name="Image 12">
+            <a:extLst>
+              <a:ext uri="{FF2B5EF4-FFF2-40B4-BE49-F238E27FC236}">
+                <a16:creationId xmlns:a16="http://schemas.microsoft.com/office/drawing/2014/main" id="{0142949D-4D9D-12B5-B56C-B0BDC332B14B}"/>
+              </a:ext>
+            </a:extLst>
+          </p:cNvPr>
+          <p:cNvPicPr>
+            <a:picLocks noChangeAspect="1"/>
+          </p:cNvPicPr>
+          <p:nvPr/>
+        </p:nvPicPr>
+        <p:blipFill>
+          <a:blip r:embed="rId3"/>
+          <a:stretch>
+            <a:fillRect/>
+          </a:stretch>
+        </p:blipFill>
+        <p:spPr>
+          <a:xfrm>
+            <a:off x="6247268" y="2260986"/>
+            <a:ext cx="5045572" cy="3705342"/>
+          </a:xfrm>
+          <a:prstGeom prst="rect">
+            <a:avLst/>
+          </a:prstGeom>
+        </p:spPr>
+      </p:pic>
+    </p:spTree>
+    <p:extLst>
+      <p:ext uri="{BB962C8B-B14F-4D97-AF65-F5344CB8AC3E}">
+        <p14:creationId xmlns:p14="http://schemas.microsoft.com/office/powerpoint/2010/main" val="1475915632"/>
+      </p:ext>
+    </p:extLst>
+  </p:cSld>
+  <p:clrMapOvr>
+    <a:masterClrMapping/>
+  </p:clrMapOvr>
+</p:sld>
+</file>
+
+<file path=ppt/slides/slide19.xml><?xml version="1.0" encoding="utf-8"?>
+<p:sld xmlns:a="http://schemas.openxmlformats.org/drawingml/2006/main" xmlns:r="http://schemas.openxmlformats.org/officeDocument/2006/relationships" xmlns:p="http://schemas.openxmlformats.org/presentationml/2006/main">
+  <p:cSld>
+    <p:spTree>
+      <p:nvGrpSpPr>
+        <p:cNvPr id="1" name=""/>
+        <p:cNvGrpSpPr/>
+        <p:nvPr/>
+      </p:nvGrpSpPr>
+      <p:grpSpPr>
+        <a:xfrm>
+          <a:off x="0" y="0"/>
+          <a:ext cx="0" cy="0"/>
+          <a:chOff x="0" y="0"/>
+          <a:chExt cx="0" cy="0"/>
+        </a:xfrm>
+      </p:grpSpPr>
+      <p:sp>
+        <p:nvSpPr>
+          <p:cNvPr id="2" name="Titre 1">
+            <a:extLst>
+              <a:ext uri="{FF2B5EF4-FFF2-40B4-BE49-F238E27FC236}">
+                <a16:creationId xmlns:a16="http://schemas.microsoft.com/office/drawing/2014/main" id="{0241FDBA-865B-2B8B-35F8-270B89A5484F}"/>
+              </a:ext>
+            </a:extLst>
+          </p:cNvPr>
+          <p:cNvSpPr>
+            <a:spLocks noGrp="1"/>
+          </p:cNvSpPr>
+          <p:nvPr>
+            <p:ph type="title"/>
+          </p:nvPr>
+        </p:nvSpPr>
+        <p:spPr>
+          <a:xfrm>
+            <a:off x="1143884" y="729553"/>
+            <a:ext cx="10605663" cy="1325562"/>
+          </a:xfrm>
+        </p:spPr>
+        <p:txBody>
+          <a:bodyPr>
+            <a:normAutofit fontScale="90000"/>
+          </a:bodyPr>
+          <a:lstStyle/>
+          <a:p>
+            <a:r>
+              <a:rPr lang="fr-FR" b="1" dirty="0"/>
+              <a:t>V – Second machine </a:t>
+            </a:r>
+            <a:r>
+              <a:rPr lang="fr-FR" b="1" dirty="0" err="1"/>
+              <a:t>learning</a:t>
+            </a:r>
+            <a:r>
+              <a:rPr lang="fr-FR" b="1" dirty="0"/>
+              <a:t> </a:t>
+            </a:r>
+            <a:r>
+              <a:rPr lang="fr-FR" b="1" dirty="0" err="1"/>
+              <a:t>procedures</a:t>
+            </a:r>
+            <a:br>
+              <a:rPr lang="fr-FR" b="1" dirty="0"/>
+            </a:br>
+            <a:r>
+              <a:rPr lang="fr-FR" dirty="0" err="1"/>
+              <a:t>Tree</a:t>
+            </a:r>
+            <a:r>
+              <a:rPr lang="fr-FR" dirty="0"/>
+              <a:t> </a:t>
+            </a:r>
+            <a:r>
+              <a:rPr lang="fr-FR" dirty="0" err="1"/>
+              <a:t>Based</a:t>
+            </a:r>
+            <a:r>
+              <a:rPr lang="fr-FR" dirty="0"/>
+              <a:t> </a:t>
+            </a:r>
+            <a:r>
+              <a:rPr lang="fr-FR" dirty="0" err="1"/>
+              <a:t>methods</a:t>
+            </a:r>
+            <a:r>
+              <a:rPr lang="fr-FR" dirty="0"/>
+              <a:t> – </a:t>
+            </a:r>
+            <a:r>
+              <a:rPr lang="fr-FR" dirty="0" err="1"/>
+              <a:t>Random</a:t>
+            </a:r>
+            <a:r>
+              <a:rPr lang="fr-FR" dirty="0"/>
+              <a:t> Forest</a:t>
+            </a:r>
+          </a:p>
+        </p:txBody>
+      </p:sp>
+      <p:sp>
+        <p:nvSpPr>
+          <p:cNvPr id="3" name="Espace réservé du contenu 2">
+            <a:extLst>
+              <a:ext uri="{FF2B5EF4-FFF2-40B4-BE49-F238E27FC236}">
+                <a16:creationId xmlns:a16="http://schemas.microsoft.com/office/drawing/2014/main" id="{FD768049-343D-9EB5-B2D9-091FDD70AC44}"/>
+              </a:ext>
+            </a:extLst>
+          </p:cNvPr>
+          <p:cNvSpPr>
+            <a:spLocks noGrp="1"/>
+          </p:cNvSpPr>
+          <p:nvPr>
+            <p:ph idx="1"/>
+          </p:nvPr>
+        </p:nvSpPr>
+        <p:spPr>
+          <a:xfrm>
+            <a:off x="1202878" y="2241755"/>
+            <a:ext cx="8595360" cy="4351337"/>
+          </a:xfrm>
+        </p:spPr>
+        <p:txBody>
+          <a:bodyPr/>
+          <a:lstStyle/>
+          <a:p>
+            <a:endParaRPr lang="fr-FR" dirty="0"/>
+          </a:p>
+        </p:txBody>
+      </p:sp>
+      <p:sp>
+        <p:nvSpPr>
+          <p:cNvPr id="4" name="Espace réservé du numéro de diapositive 3">
+            <a:extLst>
+              <a:ext uri="{FF2B5EF4-FFF2-40B4-BE49-F238E27FC236}">
+                <a16:creationId xmlns:a16="http://schemas.microsoft.com/office/drawing/2014/main" id="{C2328755-8715-B3C4-ADDD-1AA048EC231E}"/>
+              </a:ext>
+            </a:extLst>
+          </p:cNvPr>
+          <p:cNvSpPr>
+            <a:spLocks noGrp="1"/>
+          </p:cNvSpPr>
+          <p:nvPr>
+            <p:ph type="sldNum" sz="quarter" idx="12"/>
+          </p:nvPr>
+        </p:nvSpPr>
+        <p:spPr/>
+        <p:txBody>
+          <a:bodyPr>
+            <a:normAutofit lnSpcReduction="10000"/>
+          </a:bodyPr>
+          <a:lstStyle/>
+          <a:p>
+            <a:fld id="{DC9A08A5-7ACC-4C52-B2B9-9EF3D4E7F5B2}" type="slidenum">
+              <a:rPr lang="fr-FR" smtClean="0"/>
+              <a:t>19</a:t>
+            </a:fld>
+            <a:endParaRPr lang="fr-FR"/>
+          </a:p>
+        </p:txBody>
+      </p:sp>
+    </p:spTree>
+    <p:extLst>
+      <p:ext uri="{BB962C8B-B14F-4D97-AF65-F5344CB8AC3E}">
+        <p14:creationId xmlns:p14="http://schemas.microsoft.com/office/powerpoint/2010/main" val="247627698"/>
       </p:ext>
     </p:extLst>
   </p:cSld>
@@ -6538,6 +8118,125 @@
     <p:extLst>
       <p:ext uri="{BB962C8B-B14F-4D97-AF65-F5344CB8AC3E}">
         <p14:creationId xmlns:p14="http://schemas.microsoft.com/office/powerpoint/2010/main" val="2949016627"/>
+      </p:ext>
+    </p:extLst>
+  </p:cSld>
+  <p:clrMapOvr>
+    <a:masterClrMapping/>
+  </p:clrMapOvr>
+</p:sld>
+</file>
+
+<file path=ppt/slides/slide20.xml><?xml version="1.0" encoding="utf-8"?>
+<p:sld xmlns:a="http://schemas.openxmlformats.org/drawingml/2006/main" xmlns:r="http://schemas.openxmlformats.org/officeDocument/2006/relationships" xmlns:p="http://schemas.openxmlformats.org/presentationml/2006/main">
+  <p:cSld>
+    <p:spTree>
+      <p:nvGrpSpPr>
+        <p:cNvPr id="1" name=""/>
+        <p:cNvGrpSpPr/>
+        <p:nvPr/>
+      </p:nvGrpSpPr>
+      <p:grpSpPr>
+        <a:xfrm>
+          <a:off x="0" y="0"/>
+          <a:ext cx="0" cy="0"/>
+          <a:chOff x="0" y="0"/>
+          <a:chExt cx="0" cy="0"/>
+        </a:xfrm>
+      </p:grpSpPr>
+      <p:sp>
+        <p:nvSpPr>
+          <p:cNvPr id="2" name="Titre 1">
+            <a:extLst>
+              <a:ext uri="{FF2B5EF4-FFF2-40B4-BE49-F238E27FC236}">
+                <a16:creationId xmlns:a16="http://schemas.microsoft.com/office/drawing/2014/main" id="{6E083F9C-0465-A00D-5493-1BB6D273FFD2}"/>
+              </a:ext>
+            </a:extLst>
+          </p:cNvPr>
+          <p:cNvSpPr>
+            <a:spLocks noGrp="1"/>
+          </p:cNvSpPr>
+          <p:nvPr>
+            <p:ph type="title"/>
+          </p:nvPr>
+        </p:nvSpPr>
+        <p:spPr>
+          <a:xfrm>
+            <a:off x="1141413" y="609600"/>
+            <a:ext cx="9905998" cy="983226"/>
+          </a:xfrm>
+        </p:spPr>
+        <p:txBody>
+          <a:bodyPr/>
+          <a:lstStyle/>
+          <a:p>
+            <a:r>
+              <a:rPr lang="fr-FR" b="1" dirty="0"/>
+              <a:t>VI - Conclusion</a:t>
+            </a:r>
+          </a:p>
+        </p:txBody>
+      </p:sp>
+      <p:sp>
+        <p:nvSpPr>
+          <p:cNvPr id="3" name="Espace réservé du contenu 2">
+            <a:extLst>
+              <a:ext uri="{FF2B5EF4-FFF2-40B4-BE49-F238E27FC236}">
+                <a16:creationId xmlns:a16="http://schemas.microsoft.com/office/drawing/2014/main" id="{2B532F68-EF4E-2C33-FB15-EA643FA46D2B}"/>
+              </a:ext>
+            </a:extLst>
+          </p:cNvPr>
+          <p:cNvSpPr>
+            <a:spLocks noGrp="1"/>
+          </p:cNvSpPr>
+          <p:nvPr>
+            <p:ph idx="1"/>
+          </p:nvPr>
+        </p:nvSpPr>
+        <p:spPr/>
+        <p:txBody>
+          <a:bodyPr/>
+          <a:lstStyle/>
+          <a:p>
+            <a:endParaRPr lang="fr-FR"/>
+          </a:p>
+        </p:txBody>
+      </p:sp>
+      <p:sp>
+        <p:nvSpPr>
+          <p:cNvPr id="4" name="Espace réservé du numéro de diapositive 3">
+            <a:extLst>
+              <a:ext uri="{FF2B5EF4-FFF2-40B4-BE49-F238E27FC236}">
+                <a16:creationId xmlns:a16="http://schemas.microsoft.com/office/drawing/2014/main" id="{FE7C4907-2A3C-6DD8-27C9-1A003A70920B}"/>
+              </a:ext>
+            </a:extLst>
+          </p:cNvPr>
+          <p:cNvSpPr>
+            <a:spLocks noGrp="1"/>
+          </p:cNvSpPr>
+          <p:nvPr>
+            <p:ph type="sldNum" sz="quarter" idx="12"/>
+          </p:nvPr>
+        </p:nvSpPr>
+        <p:spPr/>
+        <p:txBody>
+          <a:bodyPr>
+            <a:normAutofit lnSpcReduction="10000"/>
+          </a:bodyPr>
+          <a:lstStyle/>
+          <a:p>
+            <a:fld id="{DC9A08A5-7ACC-4C52-B2B9-9EF3D4E7F5B2}" type="slidenum">
+              <a:rPr lang="fr-FR" smtClean="0"/>
+              <a:t>20</a:t>
+            </a:fld>
+            <a:endParaRPr lang="fr-FR"/>
+          </a:p>
+        </p:txBody>
+      </p:sp>
+    </p:spTree>
+    <p:extLst>
+      <p:ext uri="{BB962C8B-B14F-4D97-AF65-F5344CB8AC3E}">
+        <p14:creationId xmlns:p14="http://schemas.microsoft.com/office/powerpoint/2010/main" val="1363480817"/>
       </p:ext>
     </p:extLst>
   </p:cSld>
@@ -6990,8 +8689,8 @@
           </a:p>
         </p:txBody>
       </p:sp>
-      <mc:AlternateContent xmlns:mc="http://schemas.openxmlformats.org/markup-compatibility/2006">
-        <mc:Choice xmlns:a14="http://schemas.microsoft.com/office/drawing/2010/main" Requires="a14">
+      <mc:AlternateContent xmlns:mc="http://schemas.openxmlformats.org/markup-compatibility/2006" xmlns:a14="http://schemas.microsoft.com/office/drawing/2010/main">
+        <mc:Choice Requires="a14">
           <p:sp>
             <p:nvSpPr>
               <p:cNvPr id="3" name="Espace réservé du contenu 2">
@@ -7200,7 +8899,7 @@
             </p:txBody>
           </p:sp>
         </mc:Choice>
-        <mc:Fallback>
+        <mc:Fallback xmlns="">
           <p:sp>
             <p:nvSpPr>
               <p:cNvPr id="3" name="Espace réservé du contenu 2">
@@ -7349,8 +9048,8 @@
           </a:p>
         </p:txBody>
       </p:sp>
-      <mc:AlternateContent xmlns:mc="http://schemas.openxmlformats.org/markup-compatibility/2006">
-        <mc:Choice xmlns:a14="http://schemas.microsoft.com/office/drawing/2010/main" Requires="a14">
+      <mc:AlternateContent xmlns:mc="http://schemas.openxmlformats.org/markup-compatibility/2006" xmlns:a14="http://schemas.microsoft.com/office/drawing/2010/main">
+        <mc:Choice Requires="a14">
           <p:sp>
             <p:nvSpPr>
               <p:cNvPr id="3" name="Espace réservé du contenu 2">
@@ -7660,7 +9359,7 @@
             </p:txBody>
           </p:sp>
         </mc:Choice>
-        <mc:Fallback>
+        <mc:Fallback xmlns="">
           <p:sp>
             <p:nvSpPr>
               <p:cNvPr id="3" name="Espace réservé du contenu 2">
@@ -7809,8 +9508,8 @@
           </a:p>
         </p:txBody>
       </p:sp>
-      <mc:AlternateContent xmlns:mc="http://schemas.openxmlformats.org/markup-compatibility/2006">
-        <mc:Choice xmlns:a14="http://schemas.microsoft.com/office/drawing/2010/main" Requires="a14">
+      <mc:AlternateContent xmlns:mc="http://schemas.openxmlformats.org/markup-compatibility/2006" xmlns:a14="http://schemas.microsoft.com/office/drawing/2010/main">
+        <mc:Choice Requires="a14">
           <p:sp>
             <p:nvSpPr>
               <p:cNvPr id="3" name="Espace réservé du contenu 2">
@@ -8120,7 +9819,7 @@
             </p:txBody>
           </p:sp>
         </mc:Choice>
-        <mc:Fallback>
+        <mc:Fallback xmlns="">
           <p:sp>
             <p:nvSpPr>
               <p:cNvPr id="3" name="Espace réservé du contenu 2">

</xml_diff>

<commit_message>
Suppression d'une slide en doublon
</commit_message>
<xml_diff>
--- a/Soutenance/Soutenance - Présentation.pptx
+++ b/Soutenance/Soutenance - Présentation.pptx
@@ -5,7 +5,7 @@
     <p:sldMasterId id="2147483714" r:id="rId1"/>
   </p:sldMasterIdLst>
   <p:notesMasterIdLst>
-    <p:notesMasterId r:id="rId22"/>
+    <p:notesMasterId r:id="rId21"/>
   </p:notesMasterIdLst>
   <p:sldIdLst>
     <p:sldId id="256" r:id="rId2"/>
@@ -14,20 +14,19 @@
     <p:sldId id="259" r:id="rId5"/>
     <p:sldId id="260" r:id="rId6"/>
     <p:sldId id="272" r:id="rId7"/>
-    <p:sldId id="273" r:id="rId8"/>
-    <p:sldId id="274" r:id="rId9"/>
-    <p:sldId id="276" r:id="rId10"/>
-    <p:sldId id="275" r:id="rId11"/>
-    <p:sldId id="277" r:id="rId12"/>
-    <p:sldId id="262" r:id="rId13"/>
-    <p:sldId id="265" r:id="rId14"/>
-    <p:sldId id="269" r:id="rId15"/>
-    <p:sldId id="271" r:id="rId16"/>
-    <p:sldId id="278" r:id="rId17"/>
-    <p:sldId id="280" r:id="rId18"/>
-    <p:sldId id="279" r:id="rId19"/>
-    <p:sldId id="270" r:id="rId20"/>
-    <p:sldId id="263" r:id="rId21"/>
+    <p:sldId id="274" r:id="rId8"/>
+    <p:sldId id="276" r:id="rId9"/>
+    <p:sldId id="275" r:id="rId10"/>
+    <p:sldId id="277" r:id="rId11"/>
+    <p:sldId id="262" r:id="rId12"/>
+    <p:sldId id="265" r:id="rId13"/>
+    <p:sldId id="269" r:id="rId14"/>
+    <p:sldId id="271" r:id="rId15"/>
+    <p:sldId id="278" r:id="rId16"/>
+    <p:sldId id="280" r:id="rId17"/>
+    <p:sldId id="279" r:id="rId18"/>
+    <p:sldId id="270" r:id="rId19"/>
+    <p:sldId id="263" r:id="rId20"/>
   </p:sldIdLst>
   <p:sldSz cx="12192000" cy="6858000"/>
   <p:notesSz cx="6858000" cy="9144000"/>
@@ -216,7 +215,7 @@
           <a:p>
             <a:fld id="{981C9C61-2C36-49D9-A983-0C73D7822A89}" type="datetimeFigureOut">
               <a:rPr lang="fr-FR" smtClean="0"/>
-              <a:t>21/05/2023</a:t>
+              <a:t>22/05/2023</a:t>
             </a:fld>
             <a:endParaRPr lang="fr-FR"/>
           </a:p>
@@ -651,7 +650,7 @@
           <a:p>
             <a:fld id="{AB812BCF-9BED-4509-A9F0-BB2A7053D7B8}" type="datetime1">
               <a:rPr lang="fr-FR" smtClean="0"/>
-              <a:t>21/05/2023</a:t>
+              <a:t>22/05/2023</a:t>
             </a:fld>
             <a:endParaRPr lang="fr-FR"/>
           </a:p>
@@ -879,7 +878,7 @@
           <a:p>
             <a:fld id="{4D187174-5443-4214-8581-D9701160E043}" type="datetime1">
               <a:rPr lang="fr-FR" smtClean="0"/>
-              <a:t>21/05/2023</a:t>
+              <a:t>22/05/2023</a:t>
             </a:fld>
             <a:endParaRPr lang="fr-FR"/>
           </a:p>
@@ -1059,7 +1058,7 @@
           <a:p>
             <a:fld id="{F24D0A28-4133-436C-A2CE-8389C1194983}" type="datetime1">
               <a:rPr lang="fr-FR" smtClean="0"/>
-              <a:t>21/05/2023</a:t>
+              <a:t>22/05/2023</a:t>
             </a:fld>
             <a:endParaRPr lang="fr-FR"/>
           </a:p>
@@ -1229,7 +1228,7 @@
           <a:p>
             <a:fld id="{08D4553E-7AF4-483A-9243-9AE70AAD3F3A}" type="datetime1">
               <a:rPr lang="fr-FR" smtClean="0"/>
-              <a:t>21/05/2023</a:t>
+              <a:t>22/05/2023</a:t>
             </a:fld>
             <a:endParaRPr lang="fr-FR"/>
           </a:p>
@@ -1483,7 +1482,7 @@
           <a:p>
             <a:fld id="{301E6F40-ED1D-4D99-AE91-D6412C7A03EF}" type="datetime1">
               <a:rPr lang="fr-FR" smtClean="0"/>
-              <a:t>21/05/2023</a:t>
+              <a:t>22/05/2023</a:t>
             </a:fld>
             <a:endParaRPr lang="fr-FR"/>
           </a:p>
@@ -1809,7 +1808,7 @@
           <a:p>
             <a:fld id="{C94CB90A-7DE7-459D-9B5B-4FCC9AF5FD81}" type="datetime1">
               <a:rPr lang="fr-FR" smtClean="0"/>
-              <a:t>21/05/2023</a:t>
+              <a:t>22/05/2023</a:t>
             </a:fld>
             <a:endParaRPr lang="fr-FR"/>
           </a:p>
@@ -2260,7 +2259,7 @@
           <a:p>
             <a:fld id="{277210C4-41D0-46B3-8525-BCBE92D1E22B}" type="datetime1">
               <a:rPr lang="fr-FR" smtClean="0"/>
-              <a:t>21/05/2023</a:t>
+              <a:t>22/05/2023</a:t>
             </a:fld>
             <a:endParaRPr lang="fr-FR"/>
           </a:p>
@@ -2378,7 +2377,7 @@
           <a:p>
             <a:fld id="{67630AD6-8C71-4B4C-AC9B-43B1C1E45240}" type="datetime1">
               <a:rPr lang="fr-FR" smtClean="0"/>
-              <a:t>21/05/2023</a:t>
+              <a:t>22/05/2023</a:t>
             </a:fld>
             <a:endParaRPr lang="fr-FR"/>
           </a:p>
@@ -2473,7 +2472,7 @@
           <a:p>
             <a:fld id="{186DBC00-48DF-4512-968E-9B457CE38853}" type="datetime1">
               <a:rPr lang="fr-FR" smtClean="0"/>
-              <a:t>21/05/2023</a:t>
+              <a:t>22/05/2023</a:t>
             </a:fld>
             <a:endParaRPr lang="fr-FR"/>
           </a:p>
@@ -2760,7 +2759,7 @@
           <a:p>
             <a:fld id="{66B51E60-A705-421D-925B-2E767ED99351}" type="datetime1">
               <a:rPr lang="fr-FR" smtClean="0"/>
-              <a:t>21/05/2023</a:t>
+              <a:t>22/05/2023</a:t>
             </a:fld>
             <a:endParaRPr lang="fr-FR"/>
           </a:p>
@@ -3082,7 +3081,7 @@
           <a:p>
             <a:fld id="{A4FFD765-E8B9-45DA-9D6B-78A998897229}" type="datetime1">
               <a:rPr lang="fr-FR" smtClean="0"/>
-              <a:t>21/05/2023</a:t>
+              <a:t>22/05/2023</a:t>
             </a:fld>
             <a:endParaRPr lang="fr-FR"/>
           </a:p>
@@ -3336,7 +3335,7 @@
           <a:p>
             <a:fld id="{25BDF4BB-9F02-4066-BED6-CCD793DC15DB}" type="datetime1">
               <a:rPr lang="fr-FR" smtClean="0"/>
-              <a:t>21/05/2023</a:t>
+              <a:t>22/05/2023</a:t>
             </a:fld>
             <a:endParaRPr lang="fr-FR"/>
           </a:p>
@@ -4151,503 +4150,6 @@
           </a:p>
         </p:txBody>
       </p:sp>
-      <p:sp>
-        <p:nvSpPr>
-          <p:cNvPr id="3" name="Espace réservé du contenu 2">
-            <a:extLst>
-              <a:ext uri="{FF2B5EF4-FFF2-40B4-BE49-F238E27FC236}">
-                <a16:creationId xmlns:a16="http://schemas.microsoft.com/office/drawing/2014/main" id="{1D01F226-D975-2F28-D3E1-D2ACE6E01245}"/>
-              </a:ext>
-            </a:extLst>
-          </p:cNvPr>
-          <p:cNvSpPr>
-            <a:spLocks noGrp="1"/>
-          </p:cNvSpPr>
-          <p:nvPr>
-            <p:ph idx="1"/>
-          </p:nvPr>
-        </p:nvSpPr>
-        <p:spPr/>
-        <p:txBody>
-          <a:bodyPr/>
-          <a:lstStyle/>
-          <a:p>
-            <a:r>
-              <a:rPr lang="fr-FR" dirty="0" err="1"/>
-              <a:t>HMLasso</a:t>
-            </a:r>
-            <a:r>
-              <a:rPr lang="fr-FR" dirty="0"/>
-              <a:t> in Python</a:t>
-            </a:r>
-          </a:p>
-          <a:p>
-            <a:pPr lvl="1"/>
-            <a:r>
-              <a:rPr lang="fr-FR" dirty="0"/>
-              <a:t>CVXPY </a:t>
-            </a:r>
-            <a:r>
-              <a:rPr lang="fr-FR" dirty="0" err="1"/>
-              <a:t>library</a:t>
-            </a:r>
-            <a:r>
-              <a:rPr lang="fr-FR" dirty="0"/>
-              <a:t> → solver</a:t>
-            </a:r>
-          </a:p>
-          <a:p>
-            <a:pPr lvl="1"/>
-            <a:r>
-              <a:rPr lang="fr-FR" dirty="0" err="1"/>
-              <a:t>Scikit-learn</a:t>
-            </a:r>
-            <a:r>
-              <a:rPr lang="fr-FR" dirty="0"/>
-              <a:t> like interface</a:t>
-            </a:r>
-          </a:p>
-          <a:p>
-            <a:r>
-              <a:rPr lang="fr-FR" b="1" dirty="0" err="1"/>
-              <a:t>Useful</a:t>
-            </a:r>
-            <a:r>
-              <a:rPr lang="fr-FR" dirty="0"/>
-              <a:t> to select </a:t>
-            </a:r>
-            <a:r>
-              <a:rPr lang="fr-FR" dirty="0" err="1"/>
-              <a:t>predictors</a:t>
-            </a:r>
-            <a:endParaRPr lang="fr-FR" dirty="0"/>
-          </a:p>
-        </p:txBody>
-      </p:sp>
-      <p:sp>
-        <p:nvSpPr>
-          <p:cNvPr id="4" name="Espace réservé du numéro de diapositive 3">
-            <a:extLst>
-              <a:ext uri="{FF2B5EF4-FFF2-40B4-BE49-F238E27FC236}">
-                <a16:creationId xmlns:a16="http://schemas.microsoft.com/office/drawing/2014/main" id="{24A1B06C-442D-9215-C048-8487166BD9C1}"/>
-              </a:ext>
-            </a:extLst>
-          </p:cNvPr>
-          <p:cNvSpPr>
-            <a:spLocks noGrp="1"/>
-          </p:cNvSpPr>
-          <p:nvPr>
-            <p:ph type="sldNum" sz="quarter" idx="12"/>
-          </p:nvPr>
-        </p:nvSpPr>
-        <p:spPr/>
-        <p:txBody>
-          <a:bodyPr>
-            <a:normAutofit lnSpcReduction="10000"/>
-          </a:bodyPr>
-          <a:lstStyle/>
-          <a:p>
-            <a:fld id="{DC9A08A5-7ACC-4C52-B2B9-9EF3D4E7F5B2}" type="slidenum">
-              <a:rPr lang="fr-FR" smtClean="0"/>
-              <a:t>10</a:t>
-            </a:fld>
-            <a:endParaRPr lang="fr-FR"/>
-          </a:p>
-        </p:txBody>
-      </p:sp>
-      <p:grpSp>
-        <p:nvGrpSpPr>
-          <p:cNvPr id="11" name="Groupe 10">
-            <a:extLst>
-              <a:ext uri="{FF2B5EF4-FFF2-40B4-BE49-F238E27FC236}">
-                <a16:creationId xmlns:a16="http://schemas.microsoft.com/office/drawing/2014/main" id="{50864FBF-7C39-8667-0AA1-210479570D70}"/>
-              </a:ext>
-            </a:extLst>
-          </p:cNvPr>
-          <p:cNvGrpSpPr/>
-          <p:nvPr/>
-        </p:nvGrpSpPr>
-        <p:grpSpPr>
-          <a:xfrm>
-            <a:off x="4927372" y="1682567"/>
-            <a:ext cx="6063161" cy="2926456"/>
-            <a:chOff x="4927372" y="1682567"/>
-            <a:chExt cx="6063161" cy="2926456"/>
-          </a:xfrm>
-        </p:grpSpPr>
-        <p:pic>
-          <p:nvPicPr>
-            <p:cNvPr id="8" name="Image 7">
-              <a:extLst>
-                <a:ext uri="{FF2B5EF4-FFF2-40B4-BE49-F238E27FC236}">
-                  <a16:creationId xmlns:a16="http://schemas.microsoft.com/office/drawing/2014/main" id="{84E95D8B-1884-F576-BC1E-46DF4336CC54}"/>
-                </a:ext>
-              </a:extLst>
-            </p:cNvPr>
-            <p:cNvPicPr>
-              <a:picLocks noChangeAspect="1"/>
-            </p:cNvPicPr>
-            <p:nvPr/>
-          </p:nvPicPr>
-          <p:blipFill>
-            <a:blip r:embed="rId2"/>
-            <a:stretch>
-              <a:fillRect/>
-            </a:stretch>
-          </p:blipFill>
-          <p:spPr>
-            <a:xfrm>
-              <a:off x="4927372" y="1682567"/>
-              <a:ext cx="6063160" cy="2411715"/>
-            </a:xfrm>
-            <a:prstGeom prst="rect">
-              <a:avLst/>
-            </a:prstGeom>
-          </p:spPr>
-        </p:pic>
-        <p:pic>
-          <p:nvPicPr>
-            <p:cNvPr id="10" name="Image 9">
-              <a:extLst>
-                <a:ext uri="{FF2B5EF4-FFF2-40B4-BE49-F238E27FC236}">
-                  <a16:creationId xmlns:a16="http://schemas.microsoft.com/office/drawing/2014/main" id="{5E3E1D5B-F9C4-A37C-DE20-7B28097288FB}"/>
-                </a:ext>
-              </a:extLst>
-            </p:cNvPr>
-            <p:cNvPicPr>
-              <a:picLocks noChangeAspect="1"/>
-            </p:cNvPicPr>
-            <p:nvPr/>
-          </p:nvPicPr>
-          <p:blipFill>
-            <a:blip r:embed="rId3"/>
-            <a:stretch>
-              <a:fillRect/>
-            </a:stretch>
-          </p:blipFill>
-          <p:spPr>
-            <a:xfrm>
-              <a:off x="4927373" y="4090818"/>
-              <a:ext cx="6063160" cy="518205"/>
-            </a:xfrm>
-            <a:prstGeom prst="rect">
-              <a:avLst/>
-            </a:prstGeom>
-          </p:spPr>
-        </p:pic>
-      </p:grpSp>
-      <p:sp>
-        <p:nvSpPr>
-          <p:cNvPr id="12" name="Ellipse 11">
-            <a:extLst>
-              <a:ext uri="{FF2B5EF4-FFF2-40B4-BE49-F238E27FC236}">
-                <a16:creationId xmlns:a16="http://schemas.microsoft.com/office/drawing/2014/main" id="{9D583984-69A1-2FF1-92D3-365D406FA234}"/>
-              </a:ext>
-            </a:extLst>
-          </p:cNvPr>
-          <p:cNvSpPr/>
-          <p:nvPr/>
-        </p:nvSpPr>
-        <p:spPr>
-          <a:xfrm>
-            <a:off x="6872748" y="4274074"/>
-            <a:ext cx="678426" cy="272997"/>
-          </a:xfrm>
-          <a:prstGeom prst="ellipse">
-            <a:avLst/>
-          </a:prstGeom>
-          <a:noFill/>
-          <a:ln>
-            <a:solidFill>
-              <a:srgbClr val="FF0000"/>
-            </a:solidFill>
-          </a:ln>
-        </p:spPr>
-        <p:style>
-          <a:lnRef idx="2">
-            <a:schemeClr val="accent6"/>
-          </a:lnRef>
-          <a:fillRef idx="1">
-            <a:schemeClr val="lt1"/>
-          </a:fillRef>
-          <a:effectRef idx="0">
-            <a:schemeClr val="accent6"/>
-          </a:effectRef>
-          <a:fontRef idx="minor">
-            <a:schemeClr val="dk1"/>
-          </a:fontRef>
-        </p:style>
-        <p:txBody>
-          <a:bodyPr rtlCol="0" anchor="ctr"/>
-          <a:lstStyle/>
-          <a:p>
-            <a:pPr algn="ctr"/>
-            <a:endParaRPr lang="fr-FR"/>
-          </a:p>
-        </p:txBody>
-      </p:sp>
-      <p:sp>
-        <p:nvSpPr>
-          <p:cNvPr id="13" name="Ellipse 12">
-            <a:extLst>
-              <a:ext uri="{FF2B5EF4-FFF2-40B4-BE49-F238E27FC236}">
-                <a16:creationId xmlns:a16="http://schemas.microsoft.com/office/drawing/2014/main" id="{57800941-D647-A7FE-BEBA-3FD0C8A71AEA}"/>
-              </a:ext>
-            </a:extLst>
-          </p:cNvPr>
-          <p:cNvSpPr/>
-          <p:nvPr/>
-        </p:nvSpPr>
-        <p:spPr>
-          <a:xfrm>
-            <a:off x="8971934" y="4101249"/>
-            <a:ext cx="816471" cy="305810"/>
-          </a:xfrm>
-          <a:prstGeom prst="ellipse">
-            <a:avLst/>
-          </a:prstGeom>
-          <a:noFill/>
-          <a:ln>
-            <a:solidFill>
-              <a:srgbClr val="FF0000"/>
-            </a:solidFill>
-          </a:ln>
-        </p:spPr>
-        <p:style>
-          <a:lnRef idx="2">
-            <a:schemeClr val="accent6"/>
-          </a:lnRef>
-          <a:fillRef idx="1">
-            <a:schemeClr val="lt1"/>
-          </a:fillRef>
-          <a:effectRef idx="0">
-            <a:schemeClr val="accent6"/>
-          </a:effectRef>
-          <a:fontRef idx="minor">
-            <a:schemeClr val="dk1"/>
-          </a:fontRef>
-        </p:style>
-        <p:txBody>
-          <a:bodyPr rtlCol="0" anchor="ctr"/>
-          <a:lstStyle/>
-          <a:p>
-            <a:pPr algn="ctr"/>
-            <a:endParaRPr lang="fr-FR"/>
-          </a:p>
-        </p:txBody>
-      </p:sp>
-      <p:sp>
-        <p:nvSpPr>
-          <p:cNvPr id="14" name="ZoneTexte 13">
-            <a:extLst>
-              <a:ext uri="{FF2B5EF4-FFF2-40B4-BE49-F238E27FC236}">
-                <a16:creationId xmlns:a16="http://schemas.microsoft.com/office/drawing/2014/main" id="{BB430AAE-E90E-7F7A-6CCD-9808130CAC93}"/>
-              </a:ext>
-            </a:extLst>
-          </p:cNvPr>
-          <p:cNvSpPr txBox="1"/>
-          <p:nvPr/>
-        </p:nvSpPr>
-        <p:spPr>
-          <a:xfrm>
-            <a:off x="7976417" y="5071414"/>
-            <a:ext cx="1991033" cy="646331"/>
-          </a:xfrm>
-          <a:prstGeom prst="rect">
-            <a:avLst/>
-          </a:prstGeom>
-          <a:noFill/>
-        </p:spPr>
-        <p:txBody>
-          <a:bodyPr wrap="square" rtlCol="0">
-            <a:spAutoFit/>
-          </a:bodyPr>
-          <a:lstStyle/>
-          <a:p>
-            <a:pPr algn="ctr"/>
-            <a:r>
-              <a:rPr lang="fr-FR" dirty="0" err="1"/>
-              <a:t>We</a:t>
-            </a:r>
-            <a:r>
-              <a:rPr lang="fr-FR" dirty="0"/>
-              <a:t> can drop </a:t>
-            </a:r>
-            <a:r>
-              <a:rPr lang="fr-FR" dirty="0" err="1"/>
-              <a:t>columns</a:t>
-            </a:r>
-            <a:r>
-              <a:rPr lang="fr-FR" dirty="0"/>
-              <a:t> 6 and 9</a:t>
-            </a:r>
-          </a:p>
-        </p:txBody>
-      </p:sp>
-      <p:cxnSp>
-        <p:nvCxnSpPr>
-          <p:cNvPr id="16" name="Connecteur droit avec flèche 15">
-            <a:extLst>
-              <a:ext uri="{FF2B5EF4-FFF2-40B4-BE49-F238E27FC236}">
-                <a16:creationId xmlns:a16="http://schemas.microsoft.com/office/drawing/2014/main" id="{43ECC302-8D3A-BA41-3AEF-28586409509B}"/>
-              </a:ext>
-            </a:extLst>
-          </p:cNvPr>
-          <p:cNvCxnSpPr>
-            <a:cxnSpLocks/>
-            <a:stCxn id="14" idx="0"/>
-            <a:endCxn id="13" idx="4"/>
-          </p:cNvCxnSpPr>
-          <p:nvPr/>
-        </p:nvCxnSpPr>
-        <p:spPr>
-          <a:xfrm flipV="1">
-            <a:off x="8971934" y="4407059"/>
-            <a:ext cx="408236" cy="664355"/>
-          </a:xfrm>
-          <a:prstGeom prst="straightConnector1">
-            <a:avLst/>
-          </a:prstGeom>
-          <a:ln w="12700">
-            <a:tailEnd type="triangle"/>
-          </a:ln>
-        </p:spPr>
-        <p:style>
-          <a:lnRef idx="1">
-            <a:schemeClr val="dk1"/>
-          </a:lnRef>
-          <a:fillRef idx="0">
-            <a:schemeClr val="dk1"/>
-          </a:fillRef>
-          <a:effectRef idx="0">
-            <a:schemeClr val="dk1"/>
-          </a:effectRef>
-          <a:fontRef idx="minor">
-            <a:schemeClr val="tx1"/>
-          </a:fontRef>
-        </p:style>
-      </p:cxnSp>
-      <p:cxnSp>
-        <p:nvCxnSpPr>
-          <p:cNvPr id="19" name="Connecteur droit avec flèche 18">
-            <a:extLst>
-              <a:ext uri="{FF2B5EF4-FFF2-40B4-BE49-F238E27FC236}">
-                <a16:creationId xmlns:a16="http://schemas.microsoft.com/office/drawing/2014/main" id="{175B3052-7317-CED1-0544-3F6F7C0A37D1}"/>
-              </a:ext>
-            </a:extLst>
-          </p:cNvPr>
-          <p:cNvCxnSpPr>
-            <a:cxnSpLocks/>
-            <a:stCxn id="14" idx="0"/>
-            <a:endCxn id="12" idx="5"/>
-          </p:cNvCxnSpPr>
-          <p:nvPr/>
-        </p:nvCxnSpPr>
-        <p:spPr>
-          <a:xfrm flipH="1" flipV="1">
-            <a:off x="7451821" y="4507092"/>
-            <a:ext cx="1520113" cy="564322"/>
-          </a:xfrm>
-          <a:prstGeom prst="straightConnector1">
-            <a:avLst/>
-          </a:prstGeom>
-          <a:ln w="12700">
-            <a:tailEnd type="triangle"/>
-          </a:ln>
-        </p:spPr>
-        <p:style>
-          <a:lnRef idx="1">
-            <a:schemeClr val="dk1"/>
-          </a:lnRef>
-          <a:fillRef idx="0">
-            <a:schemeClr val="dk1"/>
-          </a:fillRef>
-          <a:effectRef idx="0">
-            <a:schemeClr val="dk1"/>
-          </a:effectRef>
-          <a:fontRef idx="minor">
-            <a:schemeClr val="tx1"/>
-          </a:fontRef>
-        </p:style>
-      </p:cxnSp>
-    </p:spTree>
-    <p:extLst>
-      <p:ext uri="{BB962C8B-B14F-4D97-AF65-F5344CB8AC3E}">
-        <p14:creationId xmlns:p14="http://schemas.microsoft.com/office/powerpoint/2010/main" val="4215413554"/>
-      </p:ext>
-    </p:extLst>
-  </p:cSld>
-  <p:clrMapOvr>
-    <a:masterClrMapping/>
-  </p:clrMapOvr>
-</p:sld>
-</file>
-
-<file path=ppt/slides/slide11.xml><?xml version="1.0" encoding="utf-8"?>
-<p:sld xmlns:a="http://schemas.openxmlformats.org/drawingml/2006/main" xmlns:r="http://schemas.openxmlformats.org/officeDocument/2006/relationships" xmlns:p="http://schemas.openxmlformats.org/presentationml/2006/main">
-  <p:cSld>
-    <p:spTree>
-      <p:nvGrpSpPr>
-        <p:cNvPr id="1" name=""/>
-        <p:cNvGrpSpPr/>
-        <p:nvPr/>
-      </p:nvGrpSpPr>
-      <p:grpSpPr>
-        <a:xfrm>
-          <a:off x="0" y="0"/>
-          <a:ext cx="0" cy="0"/>
-          <a:chOff x="0" y="0"/>
-          <a:chExt cx="0" cy="0"/>
-        </a:xfrm>
-      </p:grpSpPr>
-      <p:sp>
-        <p:nvSpPr>
-          <p:cNvPr id="2" name="Titre 1">
-            <a:extLst>
-              <a:ext uri="{FF2B5EF4-FFF2-40B4-BE49-F238E27FC236}">
-                <a16:creationId xmlns:a16="http://schemas.microsoft.com/office/drawing/2014/main" id="{AB10DCE2-D089-FCB5-593D-5C377D7BC510}"/>
-              </a:ext>
-            </a:extLst>
-          </p:cNvPr>
-          <p:cNvSpPr>
-            <a:spLocks noGrp="1"/>
-          </p:cNvSpPr>
-          <p:nvPr>
-            <p:ph type="title"/>
-          </p:nvPr>
-        </p:nvSpPr>
-        <p:spPr>
-          <a:xfrm>
-            <a:off x="1141413" y="609600"/>
-            <a:ext cx="9905998" cy="963561"/>
-          </a:xfrm>
-        </p:spPr>
-        <p:txBody>
-          <a:bodyPr>
-            <a:normAutofit fontScale="90000"/>
-          </a:bodyPr>
-          <a:lstStyle/>
-          <a:p>
-            <a:r>
-              <a:rPr lang="fr-FR" b="1" dirty="0"/>
-              <a:t>IV – First machine </a:t>
-            </a:r>
-            <a:r>
-              <a:rPr lang="fr-FR" b="1" dirty="0" err="1"/>
-              <a:t>learning</a:t>
-            </a:r>
-            <a:r>
-              <a:rPr lang="fr-FR" b="1" dirty="0"/>
-              <a:t> </a:t>
-            </a:r>
-            <a:r>
-              <a:rPr lang="fr-FR" b="1" dirty="0" err="1"/>
-              <a:t>procedures</a:t>
-            </a:r>
-            <a:endParaRPr lang="fr-FR" b="1" dirty="0"/>
-          </a:p>
-        </p:txBody>
-      </p:sp>
       <mc:AlternateContent xmlns:mc="http://schemas.openxmlformats.org/markup-compatibility/2006" xmlns:a14="http://schemas.microsoft.com/office/drawing/2010/main">
         <mc:Choice Requires="a14">
           <p:sp>
@@ -4858,7 +4360,7 @@
           <a:p>
             <a:fld id="{DC9A08A5-7ACC-4C52-B2B9-9EF3D4E7F5B2}" type="slidenum">
               <a:rPr lang="fr-FR" smtClean="0"/>
-              <a:t>11</a:t>
+              <a:t>10</a:t>
             </a:fld>
             <a:endParaRPr lang="fr-FR"/>
           </a:p>
@@ -5192,6 +4694,235 @@
 </p:sld>
 </file>
 
+<file path=ppt/slides/slide11.xml><?xml version="1.0" encoding="utf-8"?>
+<p:sld xmlns:a="http://schemas.openxmlformats.org/drawingml/2006/main" xmlns:r="http://schemas.openxmlformats.org/officeDocument/2006/relationships" xmlns:p="http://schemas.openxmlformats.org/presentationml/2006/main">
+  <p:cSld>
+    <p:spTree>
+      <p:nvGrpSpPr>
+        <p:cNvPr id="1" name=""/>
+        <p:cNvGrpSpPr/>
+        <p:nvPr/>
+      </p:nvGrpSpPr>
+      <p:grpSpPr>
+        <a:xfrm>
+          <a:off x="0" y="0"/>
+          <a:ext cx="0" cy="0"/>
+          <a:chOff x="0" y="0"/>
+          <a:chExt cx="0" cy="0"/>
+        </a:xfrm>
+      </p:grpSpPr>
+      <p:sp>
+        <p:nvSpPr>
+          <p:cNvPr id="2" name="Titre 1">
+            <a:extLst>
+              <a:ext uri="{FF2B5EF4-FFF2-40B4-BE49-F238E27FC236}">
+                <a16:creationId xmlns:a16="http://schemas.microsoft.com/office/drawing/2014/main" id="{79883FDB-3A69-8042-FBDE-58A476E46DD8}"/>
+              </a:ext>
+            </a:extLst>
+          </p:cNvPr>
+          <p:cNvSpPr>
+            <a:spLocks noGrp="1"/>
+          </p:cNvSpPr>
+          <p:nvPr>
+            <p:ph type="title"/>
+          </p:nvPr>
+        </p:nvSpPr>
+        <p:spPr>
+          <a:xfrm>
+            <a:off x="1141413" y="609600"/>
+            <a:ext cx="9905998" cy="894735"/>
+          </a:xfrm>
+        </p:spPr>
+        <p:txBody>
+          <a:bodyPr>
+            <a:normAutofit fontScale="90000"/>
+          </a:bodyPr>
+          <a:lstStyle/>
+          <a:p>
+            <a:r>
+              <a:rPr lang="fr-FR" b="1" dirty="0"/>
+              <a:t>V – Second machine </a:t>
+            </a:r>
+            <a:r>
+              <a:rPr lang="fr-FR" b="1" dirty="0" err="1"/>
+              <a:t>learning</a:t>
+            </a:r>
+            <a:r>
+              <a:rPr lang="fr-FR" b="1" dirty="0"/>
+              <a:t> </a:t>
+            </a:r>
+            <a:r>
+              <a:rPr lang="fr-FR" b="1" dirty="0" err="1"/>
+              <a:t>procedures</a:t>
+            </a:r>
+            <a:endParaRPr lang="fr-FR" b="1" dirty="0"/>
+          </a:p>
+        </p:txBody>
+      </p:sp>
+      <p:sp>
+        <p:nvSpPr>
+          <p:cNvPr id="3" name="Espace réservé du contenu 2">
+            <a:extLst>
+              <a:ext uri="{FF2B5EF4-FFF2-40B4-BE49-F238E27FC236}">
+                <a16:creationId xmlns:a16="http://schemas.microsoft.com/office/drawing/2014/main" id="{C91C1087-EBA2-3465-30A8-54ACCC86A796}"/>
+              </a:ext>
+            </a:extLst>
+          </p:cNvPr>
+          <p:cNvSpPr>
+            <a:spLocks noGrp="1"/>
+          </p:cNvSpPr>
+          <p:nvPr>
+            <p:ph idx="1"/>
+          </p:nvPr>
+        </p:nvSpPr>
+        <p:spPr/>
+        <p:txBody>
+          <a:bodyPr/>
+          <a:lstStyle/>
+          <a:p>
+            <a:r>
+              <a:rPr lang="fr-FR" b="1" dirty="0" err="1"/>
+              <a:t>Two</a:t>
+            </a:r>
+            <a:r>
+              <a:rPr lang="fr-FR" b="1" dirty="0"/>
+              <a:t> </a:t>
+            </a:r>
+            <a:r>
+              <a:rPr lang="fr-FR" b="1" dirty="0" err="1"/>
+              <a:t>kind</a:t>
+            </a:r>
+            <a:r>
+              <a:rPr lang="fr-FR" b="1" dirty="0"/>
+              <a:t> of </a:t>
+            </a:r>
+            <a:r>
+              <a:rPr lang="fr-FR" b="1" dirty="0" err="1"/>
+              <a:t>methods</a:t>
+            </a:r>
+            <a:endParaRPr lang="fr-FR" b="1" dirty="0"/>
+          </a:p>
+          <a:p>
+            <a:r>
+              <a:rPr lang="fr-FR" b="1" dirty="0" err="1"/>
+              <a:t>Linear</a:t>
+            </a:r>
+            <a:r>
+              <a:rPr lang="fr-FR" b="1" dirty="0"/>
+              <a:t> </a:t>
+            </a:r>
+            <a:r>
+              <a:rPr lang="fr-FR" b="1" dirty="0" err="1"/>
+              <a:t>methods</a:t>
+            </a:r>
+            <a:r>
+              <a:rPr lang="fr-FR" b="1" dirty="0"/>
+              <a:t>:</a:t>
+            </a:r>
+          </a:p>
+          <a:p>
+            <a:pPr lvl="1"/>
+            <a:r>
+              <a:rPr lang="fr-FR" dirty="0"/>
+              <a:t>2SLS</a:t>
+            </a:r>
+          </a:p>
+          <a:p>
+            <a:pPr lvl="1"/>
+            <a:r>
+              <a:rPr lang="fr-FR" dirty="0" err="1"/>
+              <a:t>Within</a:t>
+            </a:r>
+            <a:r>
+              <a:rPr lang="fr-FR" dirty="0"/>
+              <a:t> </a:t>
+            </a:r>
+            <a:r>
+              <a:rPr lang="fr-FR" dirty="0" err="1"/>
+              <a:t>regression</a:t>
+            </a:r>
+            <a:endParaRPr lang="fr-FR" dirty="0"/>
+          </a:p>
+          <a:p>
+            <a:r>
+              <a:rPr lang="fr-FR" b="1" dirty="0" err="1"/>
+              <a:t>Tree</a:t>
+            </a:r>
+            <a:r>
+              <a:rPr lang="fr-FR" b="1" dirty="0"/>
+              <a:t> </a:t>
+            </a:r>
+            <a:r>
+              <a:rPr lang="fr-FR" b="1" dirty="0" err="1"/>
+              <a:t>Based</a:t>
+            </a:r>
+            <a:r>
+              <a:rPr lang="fr-FR" b="1" dirty="0"/>
+              <a:t> Methods:</a:t>
+            </a:r>
+          </a:p>
+          <a:p>
+            <a:pPr lvl="1"/>
+            <a:r>
+              <a:rPr lang="fr-FR" dirty="0" err="1"/>
+              <a:t>XGBoost</a:t>
+            </a:r>
+            <a:endParaRPr lang="fr-FR" dirty="0"/>
+          </a:p>
+          <a:p>
+            <a:pPr lvl="1"/>
+            <a:r>
+              <a:rPr lang="fr-FR" dirty="0" err="1"/>
+              <a:t>RandomForest</a:t>
+            </a:r>
+            <a:endParaRPr lang="fr-FR" dirty="0"/>
+          </a:p>
+        </p:txBody>
+      </p:sp>
+      <p:sp>
+        <p:nvSpPr>
+          <p:cNvPr id="4" name="Espace réservé du numéro de diapositive 3">
+            <a:extLst>
+              <a:ext uri="{FF2B5EF4-FFF2-40B4-BE49-F238E27FC236}">
+                <a16:creationId xmlns:a16="http://schemas.microsoft.com/office/drawing/2014/main" id="{56A8E2A8-82BE-0969-2DAB-C6DFA54D3BA2}"/>
+              </a:ext>
+            </a:extLst>
+          </p:cNvPr>
+          <p:cNvSpPr>
+            <a:spLocks noGrp="1"/>
+          </p:cNvSpPr>
+          <p:nvPr>
+            <p:ph type="sldNum" sz="quarter" idx="12"/>
+          </p:nvPr>
+        </p:nvSpPr>
+        <p:spPr/>
+        <p:txBody>
+          <a:bodyPr>
+            <a:normAutofit lnSpcReduction="10000"/>
+          </a:bodyPr>
+          <a:lstStyle/>
+          <a:p>
+            <a:fld id="{DC9A08A5-7ACC-4C52-B2B9-9EF3D4E7F5B2}" type="slidenum">
+              <a:rPr lang="fr-FR" smtClean="0"/>
+              <a:t>11</a:t>
+            </a:fld>
+            <a:endParaRPr lang="fr-FR"/>
+          </a:p>
+        </p:txBody>
+      </p:sp>
+    </p:spTree>
+    <p:extLst>
+      <p:ext uri="{BB962C8B-B14F-4D97-AF65-F5344CB8AC3E}">
+        <p14:creationId xmlns:p14="http://schemas.microsoft.com/office/powerpoint/2010/main" val="2504085392"/>
+      </p:ext>
+    </p:extLst>
+  </p:cSld>
+  <p:clrMapOvr>
+    <a:masterClrMapping/>
+  </p:clrMapOvr>
+</p:sld>
+</file>
+
 <file path=ppt/slides/slide12.xml><?xml version="1.0" encoding="utf-8"?>
 <p:sld xmlns:a="http://schemas.openxmlformats.org/drawingml/2006/main" xmlns:r="http://schemas.openxmlformats.org/officeDocument/2006/relationships" xmlns:p="http://schemas.openxmlformats.org/presentationml/2006/main">
   <p:cSld>
@@ -5214,7 +4945,7 @@
           <p:cNvPr id="2" name="Titre 1">
             <a:extLst>
               <a:ext uri="{FF2B5EF4-FFF2-40B4-BE49-F238E27FC236}">
-                <a16:creationId xmlns:a16="http://schemas.microsoft.com/office/drawing/2014/main" id="{79883FDB-3A69-8042-FBDE-58A476E46DD8}"/>
+                <a16:creationId xmlns:a16="http://schemas.microsoft.com/office/drawing/2014/main" id="{0241FDBA-865B-2B8B-35F8-270B89A5484F}"/>
               </a:ext>
             </a:extLst>
           </p:cNvPr>
@@ -5227,8 +4958,8 @@
         </p:nvSpPr>
         <p:spPr>
           <a:xfrm>
-            <a:off x="1141413" y="609600"/>
-            <a:ext cx="9905998" cy="894735"/>
+            <a:off x="1143884" y="729553"/>
+            <a:ext cx="10605663" cy="1325562"/>
           </a:xfrm>
         </p:spPr>
         <p:txBody>
@@ -5253,7 +4984,25 @@
               <a:rPr lang="fr-FR" b="1" dirty="0" err="1"/>
               <a:t>procedures</a:t>
             </a:r>
-            <a:endParaRPr lang="fr-FR" b="1" dirty="0"/>
+            <a:br>
+              <a:rPr lang="fr-FR" b="1" dirty="0"/>
+            </a:br>
+            <a:r>
+              <a:rPr lang="fr-FR" dirty="0" err="1"/>
+              <a:t>Linear</a:t>
+            </a:r>
+            <a:r>
+              <a:rPr lang="fr-FR" dirty="0"/>
+              <a:t> </a:t>
+            </a:r>
+            <a:r>
+              <a:rPr lang="fr-FR" dirty="0" err="1"/>
+              <a:t>methods</a:t>
+            </a:r>
+            <a:r>
+              <a:rPr lang="fr-FR" dirty="0"/>
+              <a:t> – 2SLS</a:t>
+            </a:r>
           </a:p>
         </p:txBody>
       </p:sp>
@@ -5262,7 +5011,7 @@
           <p:cNvPr id="3" name="Espace réservé du contenu 2">
             <a:extLst>
               <a:ext uri="{FF2B5EF4-FFF2-40B4-BE49-F238E27FC236}">
-                <a16:creationId xmlns:a16="http://schemas.microsoft.com/office/drawing/2014/main" id="{C91C1087-EBA2-3465-30A8-54ACCC86A796}"/>
+                <a16:creationId xmlns:a16="http://schemas.microsoft.com/office/drawing/2014/main" id="{FD768049-343D-9EB5-B2D9-091FDD70AC44}"/>
               </a:ext>
             </a:extLst>
           </p:cNvPr>
@@ -5273,106 +5022,16 @@
             <p:ph idx="1"/>
           </p:nvPr>
         </p:nvSpPr>
-        <p:spPr/>
+        <p:spPr>
+          <a:xfrm>
+            <a:off x="1202878" y="2241755"/>
+            <a:ext cx="8595360" cy="4351337"/>
+          </a:xfrm>
+        </p:spPr>
         <p:txBody>
           <a:bodyPr/>
           <a:lstStyle/>
           <a:p>
-            <a:r>
-              <a:rPr lang="fr-FR" dirty="0" err="1"/>
-              <a:t>Two</a:t>
-            </a:r>
-            <a:r>
-              <a:rPr lang="fr-FR" dirty="0"/>
-              <a:t> </a:t>
-            </a:r>
-            <a:r>
-              <a:rPr lang="fr-FR" dirty="0" err="1"/>
-              <a:t>kind</a:t>
-            </a:r>
-            <a:r>
-              <a:rPr lang="fr-FR" dirty="0"/>
-              <a:t> of </a:t>
-            </a:r>
-            <a:r>
-              <a:rPr lang="fr-FR" dirty="0" err="1"/>
-              <a:t>methods</a:t>
-            </a:r>
-            <a:endParaRPr lang="fr-FR" dirty="0"/>
-          </a:p>
-          <a:p>
-            <a:r>
-              <a:rPr lang="fr-FR" dirty="0" err="1"/>
-              <a:t>Linear</a:t>
-            </a:r>
-            <a:r>
-              <a:rPr lang="fr-FR" dirty="0"/>
-              <a:t> </a:t>
-            </a:r>
-            <a:r>
-              <a:rPr lang="fr-FR" dirty="0" err="1"/>
-              <a:t>methods</a:t>
-            </a:r>
-            <a:r>
-              <a:rPr lang="fr-FR" dirty="0"/>
-              <a:t>:</a:t>
-            </a:r>
-          </a:p>
-          <a:p>
-            <a:pPr lvl="1"/>
-            <a:r>
-              <a:rPr lang="fr-FR" dirty="0"/>
-              <a:t>2SLS</a:t>
-            </a:r>
-          </a:p>
-          <a:p>
-            <a:pPr lvl="1"/>
-            <a:r>
-              <a:rPr lang="fr-FR" dirty="0" err="1"/>
-              <a:t>Within</a:t>
-            </a:r>
-            <a:r>
-              <a:rPr lang="fr-FR" dirty="0"/>
-              <a:t> </a:t>
-            </a:r>
-            <a:r>
-              <a:rPr lang="fr-FR" dirty="0" err="1"/>
-              <a:t>regression</a:t>
-            </a:r>
-            <a:endParaRPr lang="fr-FR" dirty="0"/>
-          </a:p>
-          <a:p>
-            <a:r>
-              <a:rPr lang="fr-FR" dirty="0" err="1"/>
-              <a:t>Tree</a:t>
-            </a:r>
-            <a:r>
-              <a:rPr lang="fr-FR" dirty="0"/>
-              <a:t> </a:t>
-            </a:r>
-            <a:r>
-              <a:rPr lang="fr-FR" dirty="0" err="1"/>
-              <a:t>Based</a:t>
-            </a:r>
-            <a:r>
-              <a:rPr lang="fr-FR" dirty="0"/>
-              <a:t> Methods:</a:t>
-            </a:r>
-          </a:p>
-          <a:p>
-            <a:pPr lvl="1"/>
-            <a:r>
-              <a:rPr lang="fr-FR" dirty="0" err="1"/>
-              <a:t>XGBoost</a:t>
-            </a:r>
-            <a:endParaRPr lang="fr-FR" dirty="0"/>
-          </a:p>
-          <a:p>
-            <a:pPr lvl="1"/>
-            <a:r>
-              <a:rPr lang="fr-FR" dirty="0" err="1"/>
-              <a:t>RandomForest</a:t>
-            </a:r>
             <a:endParaRPr lang="fr-FR" dirty="0"/>
           </a:p>
         </p:txBody>
@@ -5382,7 +5041,7 @@
           <p:cNvPr id="4" name="Espace réservé du numéro de diapositive 3">
             <a:extLst>
               <a:ext uri="{FF2B5EF4-FFF2-40B4-BE49-F238E27FC236}">
-                <a16:creationId xmlns:a16="http://schemas.microsoft.com/office/drawing/2014/main" id="{56A8E2A8-82BE-0969-2DAB-C6DFA54D3BA2}"/>
+                <a16:creationId xmlns:a16="http://schemas.microsoft.com/office/drawing/2014/main" id="{C2328755-8715-B3C4-ADDD-1AA048EC231E}"/>
               </a:ext>
             </a:extLst>
           </p:cNvPr>
@@ -5411,7 +5070,7 @@
     </p:spTree>
     <p:extLst>
       <p:ext uri="{BB962C8B-B14F-4D97-AF65-F5344CB8AC3E}">
-        <p14:creationId xmlns:p14="http://schemas.microsoft.com/office/powerpoint/2010/main" val="2504085392"/>
+        <p14:creationId xmlns:p14="http://schemas.microsoft.com/office/powerpoint/2010/main" val="3863148698"/>
       </p:ext>
     </p:extLst>
   </p:cSld>
@@ -5499,8 +5158,21 @@
             </a:r>
             <a:r>
               <a:rPr lang="fr-FR" dirty="0"/>
-              <a:t> – 2SLS</a:t>
-            </a:r>
+              <a:t> – </a:t>
+            </a:r>
+            <a:r>
+              <a:rPr lang="fr-FR" dirty="0" err="1"/>
+              <a:t>Within</a:t>
+            </a:r>
+            <a:r>
+              <a:rPr lang="fr-FR" dirty="0"/>
+              <a:t> </a:t>
+            </a:r>
+            <a:r>
+              <a:rPr lang="fr-FR" dirty="0" err="1"/>
+              <a:t>Regression</a:t>
+            </a:r>
+            <a:endParaRPr lang="fr-FR" dirty="0"/>
           </a:p>
         </p:txBody>
       </p:sp>
@@ -5568,7 +5240,7 @@
     </p:spTree>
     <p:extLst>
       <p:ext uri="{BB962C8B-B14F-4D97-AF65-F5344CB8AC3E}">
-        <p14:creationId xmlns:p14="http://schemas.microsoft.com/office/powerpoint/2010/main" val="3863148698"/>
+        <p14:creationId xmlns:p14="http://schemas.microsoft.com/office/powerpoint/2010/main" val="3820516815"/>
       </p:ext>
     </p:extLst>
   </p:cSld>
@@ -5644,7 +5316,7 @@
             </a:br>
             <a:r>
               <a:rPr lang="fr-FR" dirty="0" err="1"/>
-              <a:t>Linear</a:t>
+              <a:t>Tree</a:t>
             </a:r>
             <a:r>
               <a:rPr lang="fr-FR" dirty="0"/>
@@ -5652,6 +5324,14 @@
             </a:r>
             <a:r>
               <a:rPr lang="fr-FR" dirty="0" err="1"/>
+              <a:t>Based</a:t>
+            </a:r>
+            <a:r>
+              <a:rPr lang="fr-FR" dirty="0"/>
+              <a:t> </a:t>
+            </a:r>
+            <a:r>
+              <a:rPr lang="fr-FR" dirty="0" err="1"/>
               <a:t>methods</a:t>
             </a:r>
             <a:r>
@@ -5660,15 +5340,7 @@
             </a:r>
             <a:r>
               <a:rPr lang="fr-FR" dirty="0" err="1"/>
-              <a:t>Within</a:t>
-            </a:r>
-            <a:r>
-              <a:rPr lang="fr-FR" dirty="0"/>
-              <a:t> </a:t>
-            </a:r>
-            <a:r>
-              <a:rPr lang="fr-FR" dirty="0" err="1"/>
-              <a:t>Regression</a:t>
+              <a:t>XGBoost</a:t>
             </a:r>
             <a:endParaRPr lang="fr-FR" dirty="0"/>
           </a:p>
@@ -5700,6 +5372,117 @@
           <a:bodyPr/>
           <a:lstStyle/>
           <a:p>
+            <a:r>
+              <a:rPr lang="fr-FR" b="1" dirty="0"/>
+              <a:t>Fragile Family Challenge: </a:t>
+            </a:r>
+            <a:r>
+              <a:rPr lang="fr-FR" dirty="0" err="1"/>
+              <a:t>XGBoost</a:t>
+            </a:r>
+            <a:r>
+              <a:rPr lang="fr-FR" dirty="0"/>
+              <a:t> </a:t>
+            </a:r>
+            <a:r>
+              <a:rPr lang="fr-FR" dirty="0" err="1"/>
+              <a:t>provided</a:t>
+            </a:r>
+            <a:r>
+              <a:rPr lang="fr-FR" dirty="0"/>
+              <a:t> </a:t>
+            </a:r>
+            <a:r>
+              <a:rPr lang="fr-FR" dirty="0" err="1"/>
+              <a:t>powerful</a:t>
+            </a:r>
+            <a:r>
+              <a:rPr lang="fr-FR" dirty="0"/>
+              <a:t> </a:t>
+            </a:r>
+            <a:r>
+              <a:rPr lang="fr-FR" dirty="0" err="1"/>
+              <a:t>results</a:t>
+            </a:r>
+            <a:endParaRPr lang="fr-FR" dirty="0"/>
+          </a:p>
+          <a:p>
+            <a:pPr lvl="1"/>
+            <a:r>
+              <a:rPr lang="fr-FR" dirty="0" err="1"/>
+              <a:t>Let’s</a:t>
+            </a:r>
+            <a:r>
+              <a:rPr lang="fr-FR" dirty="0"/>
+              <a:t> </a:t>
+            </a:r>
+            <a:r>
+              <a:rPr lang="fr-FR" dirty="0" err="1"/>
+              <a:t>give</a:t>
+            </a:r>
+            <a:r>
+              <a:rPr lang="fr-FR" dirty="0"/>
+              <a:t> </a:t>
+            </a:r>
+            <a:r>
+              <a:rPr lang="fr-FR" dirty="0" err="1"/>
+              <a:t>it</a:t>
+            </a:r>
+            <a:r>
+              <a:rPr lang="fr-FR" dirty="0"/>
+              <a:t> a </a:t>
+            </a:r>
+            <a:r>
+              <a:rPr lang="fr-FR" dirty="0" err="1"/>
+              <a:t>try</a:t>
+            </a:r>
+            <a:r>
+              <a:rPr lang="fr-FR" dirty="0"/>
+              <a:t>!</a:t>
+            </a:r>
+          </a:p>
+          <a:p>
+            <a:r>
+              <a:rPr lang="fr-FR" b="1" dirty="0" err="1"/>
+              <a:t>What</a:t>
+            </a:r>
+            <a:r>
+              <a:rPr lang="fr-FR" b="1" dirty="0"/>
+              <a:t> </a:t>
+            </a:r>
+            <a:r>
+              <a:rPr lang="fr-FR" b="1" dirty="0" err="1"/>
+              <a:t>is</a:t>
+            </a:r>
+            <a:r>
+              <a:rPr lang="fr-FR" b="1" dirty="0"/>
+              <a:t> </a:t>
+            </a:r>
+            <a:r>
+              <a:rPr lang="fr-FR" b="1" dirty="0" err="1"/>
+              <a:t>it</a:t>
+            </a:r>
+            <a:r>
+              <a:rPr lang="fr-FR" b="1" dirty="0"/>
+              <a:t>?</a:t>
+            </a:r>
+          </a:p>
+          <a:p>
+            <a:pPr lvl="1"/>
+            <a:r>
+              <a:rPr lang="fr-FR" dirty="0"/>
+              <a:t>Gradient </a:t>
+            </a:r>
+            <a:r>
+              <a:rPr lang="fr-FR" dirty="0" err="1"/>
+              <a:t>Boosting</a:t>
+            </a:r>
+            <a:r>
+              <a:rPr lang="fr-FR" dirty="0"/>
+              <a:t> Method</a:t>
+            </a:r>
+          </a:p>
+          <a:p>
             <a:endParaRPr lang="fr-FR" dirty="0"/>
           </a:p>
         </p:txBody>
@@ -5730,287 +5513,6 @@
             <a:fld id="{DC9A08A5-7ACC-4C52-B2B9-9EF3D4E7F5B2}" type="slidenum">
               <a:rPr lang="fr-FR" smtClean="0"/>
               <a:t>14</a:t>
-            </a:fld>
-            <a:endParaRPr lang="fr-FR"/>
-          </a:p>
-        </p:txBody>
-      </p:sp>
-    </p:spTree>
-    <p:extLst>
-      <p:ext uri="{BB962C8B-B14F-4D97-AF65-F5344CB8AC3E}">
-        <p14:creationId xmlns:p14="http://schemas.microsoft.com/office/powerpoint/2010/main" val="3820516815"/>
-      </p:ext>
-    </p:extLst>
-  </p:cSld>
-  <p:clrMapOvr>
-    <a:masterClrMapping/>
-  </p:clrMapOvr>
-</p:sld>
-</file>
-
-<file path=ppt/slides/slide15.xml><?xml version="1.0" encoding="utf-8"?>
-<p:sld xmlns:a="http://schemas.openxmlformats.org/drawingml/2006/main" xmlns:r="http://schemas.openxmlformats.org/officeDocument/2006/relationships" xmlns:p="http://schemas.openxmlformats.org/presentationml/2006/main">
-  <p:cSld>
-    <p:spTree>
-      <p:nvGrpSpPr>
-        <p:cNvPr id="1" name=""/>
-        <p:cNvGrpSpPr/>
-        <p:nvPr/>
-      </p:nvGrpSpPr>
-      <p:grpSpPr>
-        <a:xfrm>
-          <a:off x="0" y="0"/>
-          <a:ext cx="0" cy="0"/>
-          <a:chOff x="0" y="0"/>
-          <a:chExt cx="0" cy="0"/>
-        </a:xfrm>
-      </p:grpSpPr>
-      <p:sp>
-        <p:nvSpPr>
-          <p:cNvPr id="2" name="Titre 1">
-            <a:extLst>
-              <a:ext uri="{FF2B5EF4-FFF2-40B4-BE49-F238E27FC236}">
-                <a16:creationId xmlns:a16="http://schemas.microsoft.com/office/drawing/2014/main" id="{0241FDBA-865B-2B8B-35F8-270B89A5484F}"/>
-              </a:ext>
-            </a:extLst>
-          </p:cNvPr>
-          <p:cNvSpPr>
-            <a:spLocks noGrp="1"/>
-          </p:cNvSpPr>
-          <p:nvPr>
-            <p:ph type="title"/>
-          </p:nvPr>
-        </p:nvSpPr>
-        <p:spPr>
-          <a:xfrm>
-            <a:off x="1143884" y="729553"/>
-            <a:ext cx="10605663" cy="1325562"/>
-          </a:xfrm>
-        </p:spPr>
-        <p:txBody>
-          <a:bodyPr>
-            <a:normAutofit fontScale="90000"/>
-          </a:bodyPr>
-          <a:lstStyle/>
-          <a:p>
-            <a:r>
-              <a:rPr lang="fr-FR" b="1" dirty="0"/>
-              <a:t>V – Second machine </a:t>
-            </a:r>
-            <a:r>
-              <a:rPr lang="fr-FR" b="1" dirty="0" err="1"/>
-              <a:t>learning</a:t>
-            </a:r>
-            <a:r>
-              <a:rPr lang="fr-FR" b="1" dirty="0"/>
-              <a:t> </a:t>
-            </a:r>
-            <a:r>
-              <a:rPr lang="fr-FR" b="1" dirty="0" err="1"/>
-              <a:t>procedures</a:t>
-            </a:r>
-            <a:br>
-              <a:rPr lang="fr-FR" b="1" dirty="0"/>
-            </a:br>
-            <a:r>
-              <a:rPr lang="fr-FR" dirty="0" err="1"/>
-              <a:t>Tree</a:t>
-            </a:r>
-            <a:r>
-              <a:rPr lang="fr-FR" dirty="0"/>
-              <a:t> </a:t>
-            </a:r>
-            <a:r>
-              <a:rPr lang="fr-FR" dirty="0" err="1"/>
-              <a:t>Based</a:t>
-            </a:r>
-            <a:r>
-              <a:rPr lang="fr-FR" dirty="0"/>
-              <a:t> </a:t>
-            </a:r>
-            <a:r>
-              <a:rPr lang="fr-FR" dirty="0" err="1"/>
-              <a:t>methods</a:t>
-            </a:r>
-            <a:r>
-              <a:rPr lang="fr-FR" dirty="0"/>
-              <a:t> – </a:t>
-            </a:r>
-            <a:r>
-              <a:rPr lang="fr-FR" dirty="0" err="1"/>
-              <a:t>XGBoost</a:t>
-            </a:r>
-            <a:endParaRPr lang="fr-FR" dirty="0"/>
-          </a:p>
-        </p:txBody>
-      </p:sp>
-      <p:sp>
-        <p:nvSpPr>
-          <p:cNvPr id="3" name="Espace réservé du contenu 2">
-            <a:extLst>
-              <a:ext uri="{FF2B5EF4-FFF2-40B4-BE49-F238E27FC236}">
-                <a16:creationId xmlns:a16="http://schemas.microsoft.com/office/drawing/2014/main" id="{FD768049-343D-9EB5-B2D9-091FDD70AC44}"/>
-              </a:ext>
-            </a:extLst>
-          </p:cNvPr>
-          <p:cNvSpPr>
-            <a:spLocks noGrp="1"/>
-          </p:cNvSpPr>
-          <p:nvPr>
-            <p:ph idx="1"/>
-          </p:nvPr>
-        </p:nvSpPr>
-        <p:spPr>
-          <a:xfrm>
-            <a:off x="1202878" y="2241755"/>
-            <a:ext cx="8595360" cy="4351337"/>
-          </a:xfrm>
-        </p:spPr>
-        <p:txBody>
-          <a:bodyPr/>
-          <a:lstStyle/>
-          <a:p>
-            <a:r>
-              <a:rPr lang="fr-FR" b="1" dirty="0"/>
-              <a:t>Fragile Family Challenge: </a:t>
-            </a:r>
-            <a:r>
-              <a:rPr lang="fr-FR" dirty="0" err="1"/>
-              <a:t>XGBoost</a:t>
-            </a:r>
-            <a:r>
-              <a:rPr lang="fr-FR" dirty="0"/>
-              <a:t> </a:t>
-            </a:r>
-            <a:r>
-              <a:rPr lang="fr-FR" dirty="0" err="1"/>
-              <a:t>provided</a:t>
-            </a:r>
-            <a:r>
-              <a:rPr lang="fr-FR" dirty="0"/>
-              <a:t> </a:t>
-            </a:r>
-            <a:r>
-              <a:rPr lang="fr-FR" dirty="0" err="1"/>
-              <a:t>powerful</a:t>
-            </a:r>
-            <a:r>
-              <a:rPr lang="fr-FR" dirty="0"/>
-              <a:t> </a:t>
-            </a:r>
-            <a:r>
-              <a:rPr lang="fr-FR" dirty="0" err="1"/>
-              <a:t>results</a:t>
-            </a:r>
-            <a:endParaRPr lang="fr-FR" dirty="0"/>
-          </a:p>
-          <a:p>
-            <a:pPr lvl="1"/>
-            <a:r>
-              <a:rPr lang="fr-FR" dirty="0" err="1"/>
-              <a:t>Let’s</a:t>
-            </a:r>
-            <a:r>
-              <a:rPr lang="fr-FR" dirty="0"/>
-              <a:t> </a:t>
-            </a:r>
-            <a:r>
-              <a:rPr lang="fr-FR" dirty="0" err="1"/>
-              <a:t>give</a:t>
-            </a:r>
-            <a:r>
-              <a:rPr lang="fr-FR" dirty="0"/>
-              <a:t> </a:t>
-            </a:r>
-            <a:r>
-              <a:rPr lang="fr-FR" dirty="0" err="1"/>
-              <a:t>it</a:t>
-            </a:r>
-            <a:r>
-              <a:rPr lang="fr-FR" dirty="0"/>
-              <a:t> a </a:t>
-            </a:r>
-            <a:r>
-              <a:rPr lang="fr-FR" dirty="0" err="1"/>
-              <a:t>try</a:t>
-            </a:r>
-            <a:r>
-              <a:rPr lang="fr-FR" dirty="0"/>
-              <a:t>!</a:t>
-            </a:r>
-          </a:p>
-          <a:p>
-            <a:r>
-              <a:rPr lang="fr-FR" b="1" dirty="0" err="1"/>
-              <a:t>What</a:t>
-            </a:r>
-            <a:r>
-              <a:rPr lang="fr-FR" b="1" dirty="0"/>
-              <a:t> </a:t>
-            </a:r>
-            <a:r>
-              <a:rPr lang="fr-FR" b="1" dirty="0" err="1"/>
-              <a:t>is</a:t>
-            </a:r>
-            <a:r>
-              <a:rPr lang="fr-FR" b="1" dirty="0"/>
-              <a:t> </a:t>
-            </a:r>
-            <a:r>
-              <a:rPr lang="fr-FR" b="1" dirty="0" err="1"/>
-              <a:t>it</a:t>
-            </a:r>
-            <a:r>
-              <a:rPr lang="fr-FR" b="1" dirty="0"/>
-              <a:t>?</a:t>
-            </a:r>
-          </a:p>
-          <a:p>
-            <a:pPr lvl="1"/>
-            <a:r>
-              <a:rPr lang="fr-FR" dirty="0"/>
-              <a:t>Gradient </a:t>
-            </a:r>
-            <a:r>
-              <a:rPr lang="fr-FR" dirty="0" err="1"/>
-              <a:t>Boosting</a:t>
-            </a:r>
-            <a:r>
-              <a:rPr lang="fr-FR" dirty="0"/>
-              <a:t> Method</a:t>
-            </a:r>
-          </a:p>
-          <a:p>
-            <a:endParaRPr lang="fr-FR" dirty="0"/>
-          </a:p>
-        </p:txBody>
-      </p:sp>
-      <p:sp>
-        <p:nvSpPr>
-          <p:cNvPr id="4" name="Espace réservé du numéro de diapositive 3">
-            <a:extLst>
-              <a:ext uri="{FF2B5EF4-FFF2-40B4-BE49-F238E27FC236}">
-                <a16:creationId xmlns:a16="http://schemas.microsoft.com/office/drawing/2014/main" id="{C2328755-8715-B3C4-ADDD-1AA048EC231E}"/>
-              </a:ext>
-            </a:extLst>
-          </p:cNvPr>
-          <p:cNvSpPr>
-            <a:spLocks noGrp="1"/>
-          </p:cNvSpPr>
-          <p:nvPr>
-            <p:ph type="sldNum" sz="quarter" idx="12"/>
-          </p:nvPr>
-        </p:nvSpPr>
-        <p:spPr/>
-        <p:txBody>
-          <a:bodyPr>
-            <a:normAutofit lnSpcReduction="10000"/>
-          </a:bodyPr>
-          <a:lstStyle/>
-          <a:p>
-            <a:fld id="{DC9A08A5-7ACC-4C52-B2B9-9EF3D4E7F5B2}" type="slidenum">
-              <a:rPr lang="fr-FR" smtClean="0"/>
-              <a:t>15</a:t>
             </a:fld>
             <a:endParaRPr lang="fr-FR"/>
           </a:p>
@@ -6029,7 +5531,7 @@
 </p:sld>
 </file>
 
-<file path=ppt/slides/slide16.xml><?xml version="1.0" encoding="utf-8"?>
+<file path=ppt/slides/slide15.xml><?xml version="1.0" encoding="utf-8"?>
 <p:sld xmlns:a="http://schemas.openxmlformats.org/drawingml/2006/main" xmlns:r="http://schemas.openxmlformats.org/officeDocument/2006/relationships" xmlns:p="http://schemas.openxmlformats.org/presentationml/2006/main">
   <p:cSld>
     <p:spTree>
@@ -6573,7 +6075,7 @@
           <a:p>
             <a:fld id="{DC9A08A5-7ACC-4C52-B2B9-9EF3D4E7F5B2}" type="slidenum">
               <a:rPr lang="fr-FR" smtClean="0"/>
-              <a:t>16</a:t>
+              <a:t>15</a:t>
             </a:fld>
             <a:endParaRPr lang="fr-FR"/>
           </a:p>
@@ -6684,7 +6186,7 @@
 </p:sld>
 </file>
 
-<file path=ppt/slides/slide17.xml><?xml version="1.0" encoding="utf-8"?>
+<file path=ppt/slides/slide16.xml><?xml version="1.0" encoding="utf-8"?>
 <p:sld xmlns:a="http://schemas.openxmlformats.org/drawingml/2006/main" xmlns:r="http://schemas.openxmlformats.org/officeDocument/2006/relationships" xmlns:p="http://schemas.openxmlformats.org/presentationml/2006/main">
   <p:cSld>
     <p:spTree>
@@ -6901,7 +6403,7 @@
           <a:p>
             <a:fld id="{DC9A08A5-7ACC-4C52-B2B9-9EF3D4E7F5B2}" type="slidenum">
               <a:rPr lang="fr-FR" smtClean="0"/>
-              <a:t>17</a:t>
+              <a:t>16</a:t>
             </a:fld>
             <a:endParaRPr lang="fr-FR"/>
           </a:p>
@@ -7242,7 +6744,7 @@
 </p:sld>
 </file>
 
-<file path=ppt/slides/slide18.xml><?xml version="1.0" encoding="utf-8"?>
+<file path=ppt/slides/slide17.xml><?xml version="1.0" encoding="utf-8"?>
 <p:sld xmlns:a="http://schemas.openxmlformats.org/drawingml/2006/main" xmlns:r="http://schemas.openxmlformats.org/officeDocument/2006/relationships" xmlns:p="http://schemas.openxmlformats.org/presentationml/2006/main">
   <p:cSld>
     <p:spTree>
@@ -7671,7 +7173,7 @@
           <a:p>
             <a:fld id="{DC9A08A5-7ACC-4C52-B2B9-9EF3D4E7F5B2}" type="slidenum">
               <a:rPr lang="fr-FR" smtClean="0"/>
-              <a:t>18</a:t>
+              <a:t>17</a:t>
             </a:fld>
             <a:endParaRPr lang="fr-FR"/>
           </a:p>
@@ -7720,6 +7222,179 @@
 </p:sld>
 </file>
 
+<file path=ppt/slides/slide18.xml><?xml version="1.0" encoding="utf-8"?>
+<p:sld xmlns:a="http://schemas.openxmlformats.org/drawingml/2006/main" xmlns:r="http://schemas.openxmlformats.org/officeDocument/2006/relationships" xmlns:p="http://schemas.openxmlformats.org/presentationml/2006/main">
+  <p:cSld>
+    <p:spTree>
+      <p:nvGrpSpPr>
+        <p:cNvPr id="1" name=""/>
+        <p:cNvGrpSpPr/>
+        <p:nvPr/>
+      </p:nvGrpSpPr>
+      <p:grpSpPr>
+        <a:xfrm>
+          <a:off x="0" y="0"/>
+          <a:ext cx="0" cy="0"/>
+          <a:chOff x="0" y="0"/>
+          <a:chExt cx="0" cy="0"/>
+        </a:xfrm>
+      </p:grpSpPr>
+      <p:sp>
+        <p:nvSpPr>
+          <p:cNvPr id="2" name="Titre 1">
+            <a:extLst>
+              <a:ext uri="{FF2B5EF4-FFF2-40B4-BE49-F238E27FC236}">
+                <a16:creationId xmlns:a16="http://schemas.microsoft.com/office/drawing/2014/main" id="{0241FDBA-865B-2B8B-35F8-270B89A5484F}"/>
+              </a:ext>
+            </a:extLst>
+          </p:cNvPr>
+          <p:cNvSpPr>
+            <a:spLocks noGrp="1"/>
+          </p:cNvSpPr>
+          <p:nvPr>
+            <p:ph type="title"/>
+          </p:nvPr>
+        </p:nvSpPr>
+        <p:spPr>
+          <a:xfrm>
+            <a:off x="1143884" y="729553"/>
+            <a:ext cx="10605663" cy="1325562"/>
+          </a:xfrm>
+        </p:spPr>
+        <p:txBody>
+          <a:bodyPr>
+            <a:normAutofit fontScale="90000"/>
+          </a:bodyPr>
+          <a:lstStyle/>
+          <a:p>
+            <a:r>
+              <a:rPr lang="fr-FR" b="1" dirty="0"/>
+              <a:t>V – Second machine </a:t>
+            </a:r>
+            <a:r>
+              <a:rPr lang="fr-FR" b="1" dirty="0" err="1"/>
+              <a:t>learning</a:t>
+            </a:r>
+            <a:r>
+              <a:rPr lang="fr-FR" b="1" dirty="0"/>
+              <a:t> </a:t>
+            </a:r>
+            <a:r>
+              <a:rPr lang="fr-FR" b="1" dirty="0" err="1"/>
+              <a:t>procedures</a:t>
+            </a:r>
+            <a:br>
+              <a:rPr lang="fr-FR" b="1" dirty="0"/>
+            </a:br>
+            <a:r>
+              <a:rPr lang="fr-FR" dirty="0" err="1"/>
+              <a:t>Tree</a:t>
+            </a:r>
+            <a:r>
+              <a:rPr lang="fr-FR" dirty="0"/>
+              <a:t> </a:t>
+            </a:r>
+            <a:r>
+              <a:rPr lang="fr-FR" dirty="0" err="1"/>
+              <a:t>Based</a:t>
+            </a:r>
+            <a:r>
+              <a:rPr lang="fr-FR" dirty="0"/>
+              <a:t> </a:t>
+            </a:r>
+            <a:r>
+              <a:rPr lang="fr-FR" dirty="0" err="1"/>
+              <a:t>methods</a:t>
+            </a:r>
+            <a:r>
+              <a:rPr lang="fr-FR" dirty="0"/>
+              <a:t> – </a:t>
+            </a:r>
+            <a:r>
+              <a:rPr lang="fr-FR" dirty="0" err="1"/>
+              <a:t>Random</a:t>
+            </a:r>
+            <a:r>
+              <a:rPr lang="fr-FR" dirty="0"/>
+              <a:t> Forest</a:t>
+            </a:r>
+          </a:p>
+        </p:txBody>
+      </p:sp>
+      <p:sp>
+        <p:nvSpPr>
+          <p:cNvPr id="3" name="Espace réservé du contenu 2">
+            <a:extLst>
+              <a:ext uri="{FF2B5EF4-FFF2-40B4-BE49-F238E27FC236}">
+                <a16:creationId xmlns:a16="http://schemas.microsoft.com/office/drawing/2014/main" id="{FD768049-343D-9EB5-B2D9-091FDD70AC44}"/>
+              </a:ext>
+            </a:extLst>
+          </p:cNvPr>
+          <p:cNvSpPr>
+            <a:spLocks noGrp="1"/>
+          </p:cNvSpPr>
+          <p:nvPr>
+            <p:ph idx="1"/>
+          </p:nvPr>
+        </p:nvSpPr>
+        <p:spPr>
+          <a:xfrm>
+            <a:off x="1202878" y="2241755"/>
+            <a:ext cx="8595360" cy="4351337"/>
+          </a:xfrm>
+        </p:spPr>
+        <p:txBody>
+          <a:bodyPr/>
+          <a:lstStyle/>
+          <a:p>
+            <a:endParaRPr lang="fr-FR" dirty="0"/>
+          </a:p>
+        </p:txBody>
+      </p:sp>
+      <p:sp>
+        <p:nvSpPr>
+          <p:cNvPr id="4" name="Espace réservé du numéro de diapositive 3">
+            <a:extLst>
+              <a:ext uri="{FF2B5EF4-FFF2-40B4-BE49-F238E27FC236}">
+                <a16:creationId xmlns:a16="http://schemas.microsoft.com/office/drawing/2014/main" id="{C2328755-8715-B3C4-ADDD-1AA048EC231E}"/>
+              </a:ext>
+            </a:extLst>
+          </p:cNvPr>
+          <p:cNvSpPr>
+            <a:spLocks noGrp="1"/>
+          </p:cNvSpPr>
+          <p:nvPr>
+            <p:ph type="sldNum" sz="quarter" idx="12"/>
+          </p:nvPr>
+        </p:nvSpPr>
+        <p:spPr/>
+        <p:txBody>
+          <a:bodyPr>
+            <a:normAutofit lnSpcReduction="10000"/>
+          </a:bodyPr>
+          <a:lstStyle/>
+          <a:p>
+            <a:fld id="{DC9A08A5-7ACC-4C52-B2B9-9EF3D4E7F5B2}" type="slidenum">
+              <a:rPr lang="fr-FR" smtClean="0"/>
+              <a:t>18</a:t>
+            </a:fld>
+            <a:endParaRPr lang="fr-FR"/>
+          </a:p>
+        </p:txBody>
+      </p:sp>
+    </p:spTree>
+    <p:extLst>
+      <p:ext uri="{BB962C8B-B14F-4D97-AF65-F5344CB8AC3E}">
+        <p14:creationId xmlns:p14="http://schemas.microsoft.com/office/powerpoint/2010/main" val="247627698"/>
+      </p:ext>
+    </p:extLst>
+  </p:cSld>
+  <p:clrMapOvr>
+    <a:masterClrMapping/>
+  </p:clrMapOvr>
+</p:sld>
+</file>
+
 <file path=ppt/slides/slide19.xml><?xml version="1.0" encoding="utf-8"?>
 <p:sld xmlns:a="http://schemas.openxmlformats.org/drawingml/2006/main" xmlns:r="http://schemas.openxmlformats.org/officeDocument/2006/relationships" xmlns:p="http://schemas.openxmlformats.org/presentationml/2006/main">
   <p:cSld>
@@ -7742,7 +7417,7 @@
           <p:cNvPr id="2" name="Titre 1">
             <a:extLst>
               <a:ext uri="{FF2B5EF4-FFF2-40B4-BE49-F238E27FC236}">
-                <a16:creationId xmlns:a16="http://schemas.microsoft.com/office/drawing/2014/main" id="{0241FDBA-865B-2B8B-35F8-270B89A5484F}"/>
+                <a16:creationId xmlns:a16="http://schemas.microsoft.com/office/drawing/2014/main" id="{6E083F9C-0465-A00D-5493-1BB6D273FFD2}"/>
               </a:ext>
             </a:extLst>
           </p:cNvPr>
@@ -7755,66 +7430,17 @@
         </p:nvSpPr>
         <p:spPr>
           <a:xfrm>
-            <a:off x="1143884" y="729553"/>
-            <a:ext cx="10605663" cy="1325562"/>
+            <a:off x="1141413" y="609600"/>
+            <a:ext cx="9905998" cy="983226"/>
           </a:xfrm>
         </p:spPr>
         <p:txBody>
-          <a:bodyPr>
-            <a:normAutofit fontScale="90000"/>
-          </a:bodyPr>
+          <a:bodyPr/>
           <a:lstStyle/>
           <a:p>
             <a:r>
               <a:rPr lang="fr-FR" b="1" dirty="0"/>
-              <a:t>V – Second machine </a:t>
-            </a:r>
-            <a:r>
-              <a:rPr lang="fr-FR" b="1" dirty="0" err="1"/>
-              <a:t>learning</a:t>
-            </a:r>
-            <a:r>
-              <a:rPr lang="fr-FR" b="1" dirty="0"/>
-              <a:t> </a:t>
-            </a:r>
-            <a:r>
-              <a:rPr lang="fr-FR" b="1" dirty="0" err="1"/>
-              <a:t>procedures</a:t>
-            </a:r>
-            <a:br>
-              <a:rPr lang="fr-FR" b="1" dirty="0"/>
-            </a:br>
-            <a:r>
-              <a:rPr lang="fr-FR" dirty="0" err="1"/>
-              <a:t>Tree</a:t>
-            </a:r>
-            <a:r>
-              <a:rPr lang="fr-FR" dirty="0"/>
-              <a:t> </a:t>
-            </a:r>
-            <a:r>
-              <a:rPr lang="fr-FR" dirty="0" err="1"/>
-              <a:t>Based</a:t>
-            </a:r>
-            <a:r>
-              <a:rPr lang="fr-FR" dirty="0"/>
-              <a:t> </a:t>
-            </a:r>
-            <a:r>
-              <a:rPr lang="fr-FR" dirty="0" err="1"/>
-              <a:t>methods</a:t>
-            </a:r>
-            <a:r>
-              <a:rPr lang="fr-FR" dirty="0"/>
-              <a:t> – </a:t>
-            </a:r>
-            <a:r>
-              <a:rPr lang="fr-FR" dirty="0" err="1"/>
-              <a:t>Random</a:t>
-            </a:r>
-            <a:r>
-              <a:rPr lang="fr-FR" dirty="0"/>
-              <a:t> Forest</a:t>
+              <a:t>VI - Conclusion</a:t>
             </a:r>
           </a:p>
         </p:txBody>
@@ -7824,7 +7450,7 @@
           <p:cNvPr id="3" name="Espace réservé du contenu 2">
             <a:extLst>
               <a:ext uri="{FF2B5EF4-FFF2-40B4-BE49-F238E27FC236}">
-                <a16:creationId xmlns:a16="http://schemas.microsoft.com/office/drawing/2014/main" id="{FD768049-343D-9EB5-B2D9-091FDD70AC44}"/>
+                <a16:creationId xmlns:a16="http://schemas.microsoft.com/office/drawing/2014/main" id="{2B532F68-EF4E-2C33-FB15-EA643FA46D2B}"/>
               </a:ext>
             </a:extLst>
           </p:cNvPr>
@@ -7835,17 +7461,12 @@
             <p:ph idx="1"/>
           </p:nvPr>
         </p:nvSpPr>
-        <p:spPr>
-          <a:xfrm>
-            <a:off x="1202878" y="2241755"/>
-            <a:ext cx="8595360" cy="4351337"/>
-          </a:xfrm>
-        </p:spPr>
+        <p:spPr/>
         <p:txBody>
           <a:bodyPr/>
           <a:lstStyle/>
           <a:p>
-            <a:endParaRPr lang="fr-FR" dirty="0"/>
+            <a:endParaRPr lang="fr-FR"/>
           </a:p>
         </p:txBody>
       </p:sp>
@@ -7854,7 +7475,7 @@
           <p:cNvPr id="4" name="Espace réservé du numéro de diapositive 3">
             <a:extLst>
               <a:ext uri="{FF2B5EF4-FFF2-40B4-BE49-F238E27FC236}">
-                <a16:creationId xmlns:a16="http://schemas.microsoft.com/office/drawing/2014/main" id="{C2328755-8715-B3C4-ADDD-1AA048EC231E}"/>
+                <a16:creationId xmlns:a16="http://schemas.microsoft.com/office/drawing/2014/main" id="{FE7C4907-2A3C-6DD8-27C9-1A003A70920B}"/>
               </a:ext>
             </a:extLst>
           </p:cNvPr>
@@ -7883,7 +7504,7 @@
     </p:spTree>
     <p:extLst>
       <p:ext uri="{BB962C8B-B14F-4D97-AF65-F5344CB8AC3E}">
-        <p14:creationId xmlns:p14="http://schemas.microsoft.com/office/powerpoint/2010/main" val="247627698"/>
+        <p14:creationId xmlns:p14="http://schemas.microsoft.com/office/powerpoint/2010/main" val="1363480817"/>
       </p:ext>
     </p:extLst>
   </p:cSld>
@@ -8118,125 +7739,6 @@
     <p:extLst>
       <p:ext uri="{BB962C8B-B14F-4D97-AF65-F5344CB8AC3E}">
         <p14:creationId xmlns:p14="http://schemas.microsoft.com/office/powerpoint/2010/main" val="2949016627"/>
-      </p:ext>
-    </p:extLst>
-  </p:cSld>
-  <p:clrMapOvr>
-    <a:masterClrMapping/>
-  </p:clrMapOvr>
-</p:sld>
-</file>
-
-<file path=ppt/slides/slide20.xml><?xml version="1.0" encoding="utf-8"?>
-<p:sld xmlns:a="http://schemas.openxmlformats.org/drawingml/2006/main" xmlns:r="http://schemas.openxmlformats.org/officeDocument/2006/relationships" xmlns:p="http://schemas.openxmlformats.org/presentationml/2006/main">
-  <p:cSld>
-    <p:spTree>
-      <p:nvGrpSpPr>
-        <p:cNvPr id="1" name=""/>
-        <p:cNvGrpSpPr/>
-        <p:nvPr/>
-      </p:nvGrpSpPr>
-      <p:grpSpPr>
-        <a:xfrm>
-          <a:off x="0" y="0"/>
-          <a:ext cx="0" cy="0"/>
-          <a:chOff x="0" y="0"/>
-          <a:chExt cx="0" cy="0"/>
-        </a:xfrm>
-      </p:grpSpPr>
-      <p:sp>
-        <p:nvSpPr>
-          <p:cNvPr id="2" name="Titre 1">
-            <a:extLst>
-              <a:ext uri="{FF2B5EF4-FFF2-40B4-BE49-F238E27FC236}">
-                <a16:creationId xmlns:a16="http://schemas.microsoft.com/office/drawing/2014/main" id="{6E083F9C-0465-A00D-5493-1BB6D273FFD2}"/>
-              </a:ext>
-            </a:extLst>
-          </p:cNvPr>
-          <p:cNvSpPr>
-            <a:spLocks noGrp="1"/>
-          </p:cNvSpPr>
-          <p:nvPr>
-            <p:ph type="title"/>
-          </p:nvPr>
-        </p:nvSpPr>
-        <p:spPr>
-          <a:xfrm>
-            <a:off x="1141413" y="609600"/>
-            <a:ext cx="9905998" cy="983226"/>
-          </a:xfrm>
-        </p:spPr>
-        <p:txBody>
-          <a:bodyPr/>
-          <a:lstStyle/>
-          <a:p>
-            <a:r>
-              <a:rPr lang="fr-FR" b="1" dirty="0"/>
-              <a:t>VI - Conclusion</a:t>
-            </a:r>
-          </a:p>
-        </p:txBody>
-      </p:sp>
-      <p:sp>
-        <p:nvSpPr>
-          <p:cNvPr id="3" name="Espace réservé du contenu 2">
-            <a:extLst>
-              <a:ext uri="{FF2B5EF4-FFF2-40B4-BE49-F238E27FC236}">
-                <a16:creationId xmlns:a16="http://schemas.microsoft.com/office/drawing/2014/main" id="{2B532F68-EF4E-2C33-FB15-EA643FA46D2B}"/>
-              </a:ext>
-            </a:extLst>
-          </p:cNvPr>
-          <p:cNvSpPr>
-            <a:spLocks noGrp="1"/>
-          </p:cNvSpPr>
-          <p:nvPr>
-            <p:ph idx="1"/>
-          </p:nvPr>
-        </p:nvSpPr>
-        <p:spPr/>
-        <p:txBody>
-          <a:bodyPr/>
-          <a:lstStyle/>
-          <a:p>
-            <a:endParaRPr lang="fr-FR"/>
-          </a:p>
-        </p:txBody>
-      </p:sp>
-      <p:sp>
-        <p:nvSpPr>
-          <p:cNvPr id="4" name="Espace réservé du numéro de diapositive 3">
-            <a:extLst>
-              <a:ext uri="{FF2B5EF4-FFF2-40B4-BE49-F238E27FC236}">
-                <a16:creationId xmlns:a16="http://schemas.microsoft.com/office/drawing/2014/main" id="{FE7C4907-2A3C-6DD8-27C9-1A003A70920B}"/>
-              </a:ext>
-            </a:extLst>
-          </p:cNvPr>
-          <p:cNvSpPr>
-            <a:spLocks noGrp="1"/>
-          </p:cNvSpPr>
-          <p:nvPr>
-            <p:ph type="sldNum" sz="quarter" idx="12"/>
-          </p:nvPr>
-        </p:nvSpPr>
-        <p:spPr/>
-        <p:txBody>
-          <a:bodyPr>
-            <a:normAutofit lnSpcReduction="10000"/>
-          </a:bodyPr>
-          <a:lstStyle/>
-          <a:p>
-            <a:fld id="{DC9A08A5-7ACC-4C52-B2B9-9EF3D4E7F5B2}" type="slidenum">
-              <a:rPr lang="fr-FR" smtClean="0"/>
-              <a:t>20</a:t>
-            </a:fld>
-            <a:endParaRPr lang="fr-FR"/>
-          </a:p>
-        </p:txBody>
-      </p:sp>
-    </p:spTree>
-    <p:extLst>
-      <p:ext uri="{BB962C8B-B14F-4D97-AF65-F5344CB8AC3E}">
-        <p14:creationId xmlns:p14="http://schemas.microsoft.com/office/powerpoint/2010/main" val="1363480817"/>
       </p:ext>
     </p:extLst>
   </p:cSld>
@@ -9433,7 +8935,7 @@
     </p:spTree>
     <p:extLst>
       <p:ext uri="{BB962C8B-B14F-4D97-AF65-F5344CB8AC3E}">
-        <p14:creationId xmlns:p14="http://schemas.microsoft.com/office/powerpoint/2010/main" val="2532050806"/>
+        <p14:creationId xmlns:p14="http://schemas.microsoft.com/office/powerpoint/2010/main" val="1208626335"/>
       </p:ext>
     </p:extLst>
   </p:cSld>
@@ -9508,357 +9010,79 @@
           </a:p>
         </p:txBody>
       </p:sp>
-      <mc:AlternateContent xmlns:mc="http://schemas.openxmlformats.org/markup-compatibility/2006" xmlns:a14="http://schemas.microsoft.com/office/drawing/2010/main">
-        <mc:Choice Requires="a14">
-          <p:sp>
-            <p:nvSpPr>
-              <p:cNvPr id="3" name="Espace réservé du contenu 2">
-                <a:extLst>
-                  <a:ext uri="{FF2B5EF4-FFF2-40B4-BE49-F238E27FC236}">
-                    <a16:creationId xmlns:a16="http://schemas.microsoft.com/office/drawing/2014/main" id="{1D01F226-D975-2F28-D3E1-D2ACE6E01245}"/>
-                  </a:ext>
-                </a:extLst>
-              </p:cNvPr>
-              <p:cNvSpPr>
-                <a:spLocks noGrp="1"/>
-              </p:cNvSpPr>
-              <p:nvPr>
-                <p:ph idx="1"/>
-              </p:nvPr>
-            </p:nvSpPr>
-            <p:spPr/>
-            <p:txBody>
-              <a:bodyPr/>
-              <a:lstStyle/>
-              <a:p>
-                <a14:m>
-                  <m:oMath xmlns:m="http://schemas.openxmlformats.org/officeDocument/2006/math">
-                    <m:r>
-                      <a:rPr lang="fr-FR" b="0" i="1" smtClean="0">
-                        <a:latin typeface="Cambria Math" panose="02040503050406030204" pitchFamily="18" charset="0"/>
-                      </a:rPr>
-                      <m:t>𝑛</m:t>
-                    </m:r>
-                    <m:r>
-                      <a:rPr lang="fr-FR" b="0" i="1" smtClean="0">
-                        <a:latin typeface="Cambria Math" panose="02040503050406030204" pitchFamily="18" charset="0"/>
-                      </a:rPr>
-                      <m:t>≈</m:t>
-                    </m:r>
-                    <m:r>
-                      <a:rPr lang="fr-FR" b="0" i="1" smtClean="0">
-                        <a:latin typeface="Cambria Math" panose="02040503050406030204" pitchFamily="18" charset="0"/>
-                      </a:rPr>
-                      <m:t>𝑝</m:t>
-                    </m:r>
-                  </m:oMath>
-                </a14:m>
-                <a:r>
-                  <a:rPr lang="fr-FR" b="0" dirty="0"/>
-                  <a:t> </a:t>
-                </a:r>
-                <a14:m>
-                  <m:oMath xmlns:m="http://schemas.openxmlformats.org/officeDocument/2006/math">
-                    <m:r>
-                      <a:rPr lang="fr-FR" b="0" i="1" dirty="0" smtClean="0">
-                        <a:latin typeface="Cambria Math" panose="02040503050406030204" pitchFamily="18" charset="0"/>
-                      </a:rPr>
-                      <m:t>⇒</m:t>
-                    </m:r>
-                  </m:oMath>
-                </a14:m>
-                <a:r>
-                  <a:rPr lang="fr-FR" b="0" dirty="0"/>
-                  <a:t> Standard </a:t>
-                </a:r>
-                <a:r>
-                  <a:rPr lang="fr-FR" b="0" dirty="0" err="1"/>
-                  <a:t>methods</a:t>
-                </a:r>
-                <a:r>
-                  <a:rPr lang="fr-FR" dirty="0"/>
-                  <a:t> </a:t>
-                </a:r>
-                <a:r>
-                  <a:rPr lang="fr-FR" dirty="0" err="1"/>
-                  <a:t>would</a:t>
-                </a:r>
-                <a:r>
-                  <a:rPr lang="fr-FR" dirty="0"/>
-                  <a:t> not converge</a:t>
-                </a:r>
-              </a:p>
-              <a:p>
-                <a:r>
-                  <a:rPr lang="fr-FR" b="1" dirty="0" err="1"/>
-                  <a:t>Idea</a:t>
-                </a:r>
-                <a:r>
-                  <a:rPr lang="fr-FR" b="1" dirty="0"/>
-                  <a:t>: </a:t>
-                </a:r>
-                <a:r>
-                  <a:rPr lang="fr-FR" b="0" dirty="0"/>
-                  <a:t>Select </a:t>
-                </a:r>
-                <a14:m>
-                  <m:oMath xmlns:m="http://schemas.openxmlformats.org/officeDocument/2006/math">
-                    <m:sSup>
-                      <m:sSupPr>
-                        <m:ctrlPr>
-                          <a:rPr lang="fr-FR" b="0" i="1" smtClean="0">
-                            <a:latin typeface="Cambria Math" panose="02040503050406030204" pitchFamily="18" charset="0"/>
-                          </a:rPr>
-                        </m:ctrlPr>
-                      </m:sSupPr>
-                      <m:e>
-                        <m:r>
-                          <a:rPr lang="fr-FR" b="0" i="1" smtClean="0">
-                            <a:latin typeface="Cambria Math" panose="02040503050406030204" pitchFamily="18" charset="0"/>
-                          </a:rPr>
-                          <m:t>𝑝</m:t>
-                        </m:r>
-                      </m:e>
-                      <m:sup>
-                        <m:r>
-                          <a:rPr lang="fr-FR" b="0" i="1" smtClean="0">
-                            <a:latin typeface="Cambria Math" panose="02040503050406030204" pitchFamily="18" charset="0"/>
-                          </a:rPr>
-                          <m:t>′</m:t>
-                        </m:r>
-                      </m:sup>
-                    </m:sSup>
-                    <m:r>
-                      <a:rPr lang="fr-FR" b="0" i="1" smtClean="0">
-                        <a:latin typeface="Cambria Math" panose="02040503050406030204" pitchFamily="18" charset="0"/>
-                      </a:rPr>
-                      <m:t>≪</m:t>
-                    </m:r>
-                    <m:r>
-                      <a:rPr lang="fr-FR" b="0" i="1" smtClean="0">
-                        <a:latin typeface="Cambria Math" panose="02040503050406030204" pitchFamily="18" charset="0"/>
-                      </a:rPr>
-                      <m:t>𝑝</m:t>
-                    </m:r>
-                  </m:oMath>
-                </a14:m>
-                <a:r>
-                  <a:rPr lang="fr-FR" b="0" dirty="0"/>
-                  <a:t> </a:t>
-                </a:r>
-                <a:r>
-                  <a:rPr lang="fr-FR" b="0" dirty="0" err="1"/>
-                  <a:t>predictors</a:t>
-                </a:r>
-                <a:r>
-                  <a:rPr lang="fr-FR" b="0" dirty="0"/>
-                  <a:t> </a:t>
-                </a:r>
-                <a:r>
-                  <a:rPr lang="fr-FR" b="0" dirty="0" err="1"/>
-                  <a:t>before</a:t>
-                </a:r>
-                <a:r>
-                  <a:rPr lang="fr-FR" dirty="0" err="1"/>
-                  <a:t>hand</a:t>
-                </a:r>
-                <a:endParaRPr lang="fr-FR" dirty="0"/>
-              </a:p>
-              <a:p>
-                <a:pPr lvl="1"/>
-                <a:r>
-                  <a:rPr lang="fr-FR" b="0" dirty="0"/>
-                  <a:t>How</a:t>
-                </a:r>
-                <a:r>
-                  <a:rPr lang="fr-FR" dirty="0"/>
-                  <a:t>? Lasso</a:t>
-                </a:r>
-              </a:p>
-              <a:p>
-                <a:pPr lvl="1"/>
-                <a:r>
-                  <a:rPr lang="fr-FR" b="0" dirty="0" err="1"/>
-                  <a:t>Problem</a:t>
-                </a:r>
-                <a:r>
-                  <a:rPr lang="fr-FR" b="0" dirty="0"/>
-                  <a:t>: a lot of </a:t>
-                </a:r>
-                <a:r>
-                  <a:rPr lang="fr-FR" b="0" dirty="0" err="1"/>
-                  <a:t>missing</a:t>
-                </a:r>
-                <a:r>
-                  <a:rPr lang="fr-FR" b="0" dirty="0"/>
-                  <a:t> data</a:t>
-                </a:r>
-              </a:p>
-              <a:p>
-                <a:r>
-                  <a:rPr lang="fr-FR" b="1" dirty="0"/>
-                  <a:t>Solution:</a:t>
-                </a:r>
-                <a:r>
-                  <a:rPr lang="fr-FR" b="0" dirty="0"/>
-                  <a:t> </a:t>
-                </a:r>
-                <a:r>
-                  <a:rPr lang="fr-FR" b="0" dirty="0" err="1"/>
-                  <a:t>modified</a:t>
-                </a:r>
-                <a:r>
-                  <a:rPr lang="fr-FR" b="0" dirty="0"/>
-                  <a:t> version of the Lasso</a:t>
-                </a:r>
-              </a:p>
-              <a:p>
-                <a:r>
-                  <a:rPr lang="fr-FR" b="1" dirty="0"/>
-                  <a:t>State-of-the-art: </a:t>
-                </a:r>
-                <a:r>
-                  <a:rPr lang="fr-FR" b="0" dirty="0" err="1"/>
-                  <a:t>CoCoLasso</a:t>
-                </a:r>
-                <a:r>
-                  <a:rPr lang="fr-FR" b="0" dirty="0"/>
-                  <a:t> vs </a:t>
-                </a:r>
-                <a:r>
-                  <a:rPr lang="fr-FR" b="0" dirty="0" err="1"/>
-                  <a:t>HMLasso</a:t>
-                </a:r>
-                <a:endParaRPr lang="fr-FR" dirty="0"/>
-              </a:p>
-              <a:p>
-                <a:pPr lvl="1"/>
-                <a:r>
-                  <a:rPr lang="fr-FR" dirty="0" err="1"/>
-                  <a:t>HMLasso</a:t>
-                </a:r>
-                <a:r>
-                  <a:rPr lang="fr-FR" dirty="0"/>
-                  <a:t> </a:t>
-                </a:r>
-                <a:r>
-                  <a:rPr lang="fr-FR" dirty="0" err="1"/>
-                  <a:t>better</a:t>
-                </a:r>
-                <a:r>
-                  <a:rPr lang="fr-FR" b="1" dirty="0"/>
-                  <a:t> </a:t>
-                </a:r>
-                <a:r>
-                  <a:rPr lang="fr-FR" dirty="0"/>
-                  <a:t>for </a:t>
-                </a:r>
-                <a:r>
-                  <a:rPr lang="fr-FR" dirty="0" err="1"/>
-                  <a:t>our</a:t>
-                </a:r>
-                <a:r>
-                  <a:rPr lang="fr-FR" dirty="0"/>
-                  <a:t> </a:t>
-                </a:r>
-                <a:r>
-                  <a:rPr lang="fr-FR" dirty="0" err="1"/>
-                  <a:t>purpose</a:t>
-                </a:r>
-                <a:endParaRPr lang="fr-FR" dirty="0"/>
-              </a:p>
-              <a:p>
-                <a:pPr lvl="1"/>
-                <a:r>
-                  <a:rPr lang="fr-FR" b="0" dirty="0"/>
-                  <a:t>But </a:t>
-                </a:r>
-                <a:r>
-                  <a:rPr lang="fr-FR" dirty="0"/>
-                  <a:t>not </a:t>
-                </a:r>
-                <a:r>
-                  <a:rPr lang="fr-FR" dirty="0" err="1"/>
-                  <a:t>implemented</a:t>
-                </a:r>
-                <a:r>
-                  <a:rPr lang="fr-FR" dirty="0"/>
-                  <a:t> in Python…</a:t>
-                </a:r>
-              </a:p>
-              <a:p>
-                <a:r>
-                  <a:rPr lang="fr-FR" b="1" dirty="0"/>
-                  <a:t>So </a:t>
-                </a:r>
-                <a:r>
-                  <a:rPr lang="fr-FR" b="1" dirty="0" err="1"/>
-                  <a:t>we</a:t>
-                </a:r>
-                <a:r>
-                  <a:rPr lang="fr-FR" b="1" dirty="0"/>
-                  <a:t> </a:t>
-                </a:r>
-                <a:r>
-                  <a:rPr lang="fr-FR" b="1" dirty="0" err="1"/>
-                  <a:t>implemented</a:t>
-                </a:r>
-                <a:r>
-                  <a:rPr lang="fr-FR" b="1" dirty="0"/>
-                  <a:t> </a:t>
-                </a:r>
-                <a:r>
-                  <a:rPr lang="fr-FR" b="1" dirty="0" err="1"/>
-                  <a:t>it!</a:t>
-                </a:r>
-                <a:endParaRPr lang="fr-FR" b="1" dirty="0"/>
-              </a:p>
-              <a:p>
-                <a:endParaRPr lang="fr-FR" dirty="0"/>
-              </a:p>
-            </p:txBody>
-          </p:sp>
-        </mc:Choice>
-        <mc:Fallback xmlns="">
-          <p:sp>
-            <p:nvSpPr>
-              <p:cNvPr id="3" name="Espace réservé du contenu 2">
-                <a:extLst>
-                  <a:ext uri="{FF2B5EF4-FFF2-40B4-BE49-F238E27FC236}">
-                    <a16:creationId xmlns:a16="http://schemas.microsoft.com/office/drawing/2014/main" id="{1D01F226-D975-2F28-D3E1-D2ACE6E01245}"/>
-                  </a:ext>
-                </a:extLst>
-              </p:cNvPr>
-              <p:cNvSpPr>
-                <a:spLocks noGrp="1" noRot="1" noChangeAspect="1" noMove="1" noResize="1" noEditPoints="1" noAdjustHandles="1" noChangeArrowheads="1" noChangeShapeType="1" noTextEdit="1"/>
-              </p:cNvSpPr>
-              <p:nvPr>
-                <p:ph idx="1"/>
-              </p:nvPr>
-            </p:nvSpPr>
-            <p:spPr>
-              <a:blipFill>
-                <a:blip r:embed="rId2"/>
-                <a:stretch>
-                  <a:fillRect l="-142" t="-1120"/>
-                </a:stretch>
-              </a:blipFill>
-            </p:spPr>
-            <p:txBody>
-              <a:bodyPr/>
-              <a:lstStyle/>
-              <a:p>
-                <a:r>
-                  <a:rPr lang="fr-FR">
-                    <a:noFill/>
-                  </a:rPr>
-                  <a:t> </a:t>
-                </a:r>
-              </a:p>
-            </p:txBody>
-          </p:sp>
-        </mc:Fallback>
-      </mc:AlternateContent>
+      <p:sp>
+        <p:nvSpPr>
+          <p:cNvPr id="3" name="Espace réservé du contenu 2">
+            <a:extLst>
+              <a:ext uri="{FF2B5EF4-FFF2-40B4-BE49-F238E27FC236}">
+                <a16:creationId xmlns:a16="http://schemas.microsoft.com/office/drawing/2014/main" id="{1D01F226-D975-2F28-D3E1-D2ACE6E01245}"/>
+              </a:ext>
+            </a:extLst>
+          </p:cNvPr>
+          <p:cNvSpPr>
+            <a:spLocks noGrp="1"/>
+          </p:cNvSpPr>
+          <p:nvPr>
+            <p:ph idx="1"/>
+          </p:nvPr>
+        </p:nvSpPr>
+        <p:spPr/>
+        <p:txBody>
+          <a:bodyPr/>
+          <a:lstStyle/>
+          <a:p>
+            <a:r>
+              <a:rPr lang="fr-FR" dirty="0" err="1"/>
+              <a:t>HMLasso</a:t>
+            </a:r>
+            <a:r>
+              <a:rPr lang="fr-FR" dirty="0"/>
+              <a:t> in Python</a:t>
+            </a:r>
+          </a:p>
+          <a:p>
+            <a:pPr lvl="1"/>
+            <a:r>
+              <a:rPr lang="fr-FR" dirty="0"/>
+              <a:t>CVXPY </a:t>
+            </a:r>
+            <a:r>
+              <a:rPr lang="fr-FR" dirty="0" err="1"/>
+              <a:t>library</a:t>
+            </a:r>
+            <a:r>
+              <a:rPr lang="fr-FR" dirty="0"/>
+              <a:t> → solver</a:t>
+            </a:r>
+          </a:p>
+          <a:p>
+            <a:pPr lvl="1"/>
+            <a:r>
+              <a:rPr lang="fr-FR" dirty="0" err="1"/>
+              <a:t>Scikit-learn</a:t>
+            </a:r>
+            <a:r>
+              <a:rPr lang="fr-FR" dirty="0"/>
+              <a:t> like interface</a:t>
+            </a:r>
+          </a:p>
+          <a:p>
+            <a:r>
+              <a:rPr lang="fr-FR" b="1" dirty="0" err="1"/>
+              <a:t>Useful</a:t>
+            </a:r>
+            <a:r>
+              <a:rPr lang="fr-FR" dirty="0"/>
+              <a:t> to select </a:t>
+            </a:r>
+            <a:r>
+              <a:rPr lang="fr-FR" dirty="0" err="1"/>
+              <a:t>predictors</a:t>
+            </a:r>
+            <a:endParaRPr lang="fr-FR" dirty="0"/>
+          </a:p>
+        </p:txBody>
+      </p:sp>
       <p:sp>
         <p:nvSpPr>
           <p:cNvPr id="4" name="Espace réservé du numéro de diapositive 3">
@@ -9893,7 +9117,7 @@
     </p:spTree>
     <p:extLst>
       <p:ext uri="{BB962C8B-B14F-4D97-AF65-F5344CB8AC3E}">
-        <p14:creationId xmlns:p14="http://schemas.microsoft.com/office/powerpoint/2010/main" val="1208626335"/>
+        <p14:creationId xmlns:p14="http://schemas.microsoft.com/office/powerpoint/2010/main" val="718381304"/>
       </p:ext>
     </p:extLst>
   </p:cSld>
@@ -10072,10 +9296,325 @@
           </a:p>
         </p:txBody>
       </p:sp>
+      <p:grpSp>
+        <p:nvGrpSpPr>
+          <p:cNvPr id="11" name="Groupe 10">
+            <a:extLst>
+              <a:ext uri="{FF2B5EF4-FFF2-40B4-BE49-F238E27FC236}">
+                <a16:creationId xmlns:a16="http://schemas.microsoft.com/office/drawing/2014/main" id="{50864FBF-7C39-8667-0AA1-210479570D70}"/>
+              </a:ext>
+            </a:extLst>
+          </p:cNvPr>
+          <p:cNvGrpSpPr/>
+          <p:nvPr/>
+        </p:nvGrpSpPr>
+        <p:grpSpPr>
+          <a:xfrm>
+            <a:off x="4927372" y="1682567"/>
+            <a:ext cx="6063161" cy="2926456"/>
+            <a:chOff x="4927372" y="1682567"/>
+            <a:chExt cx="6063161" cy="2926456"/>
+          </a:xfrm>
+        </p:grpSpPr>
+        <p:pic>
+          <p:nvPicPr>
+            <p:cNvPr id="8" name="Image 7">
+              <a:extLst>
+                <a:ext uri="{FF2B5EF4-FFF2-40B4-BE49-F238E27FC236}">
+                  <a16:creationId xmlns:a16="http://schemas.microsoft.com/office/drawing/2014/main" id="{84E95D8B-1884-F576-BC1E-46DF4336CC54}"/>
+                </a:ext>
+              </a:extLst>
+            </p:cNvPr>
+            <p:cNvPicPr>
+              <a:picLocks noChangeAspect="1"/>
+            </p:cNvPicPr>
+            <p:nvPr/>
+          </p:nvPicPr>
+          <p:blipFill>
+            <a:blip r:embed="rId2"/>
+            <a:stretch>
+              <a:fillRect/>
+            </a:stretch>
+          </p:blipFill>
+          <p:spPr>
+            <a:xfrm>
+              <a:off x="4927372" y="1682567"/>
+              <a:ext cx="6063160" cy="2411715"/>
+            </a:xfrm>
+            <a:prstGeom prst="rect">
+              <a:avLst/>
+            </a:prstGeom>
+          </p:spPr>
+        </p:pic>
+        <p:pic>
+          <p:nvPicPr>
+            <p:cNvPr id="10" name="Image 9">
+              <a:extLst>
+                <a:ext uri="{FF2B5EF4-FFF2-40B4-BE49-F238E27FC236}">
+                  <a16:creationId xmlns:a16="http://schemas.microsoft.com/office/drawing/2014/main" id="{5E3E1D5B-F9C4-A37C-DE20-7B28097288FB}"/>
+                </a:ext>
+              </a:extLst>
+            </p:cNvPr>
+            <p:cNvPicPr>
+              <a:picLocks noChangeAspect="1"/>
+            </p:cNvPicPr>
+            <p:nvPr/>
+          </p:nvPicPr>
+          <p:blipFill>
+            <a:blip r:embed="rId3"/>
+            <a:stretch>
+              <a:fillRect/>
+            </a:stretch>
+          </p:blipFill>
+          <p:spPr>
+            <a:xfrm>
+              <a:off x="4927373" y="4090818"/>
+              <a:ext cx="6063160" cy="518205"/>
+            </a:xfrm>
+            <a:prstGeom prst="rect">
+              <a:avLst/>
+            </a:prstGeom>
+          </p:spPr>
+        </p:pic>
+      </p:grpSp>
+      <p:sp>
+        <p:nvSpPr>
+          <p:cNvPr id="12" name="Ellipse 11">
+            <a:extLst>
+              <a:ext uri="{FF2B5EF4-FFF2-40B4-BE49-F238E27FC236}">
+                <a16:creationId xmlns:a16="http://schemas.microsoft.com/office/drawing/2014/main" id="{9D583984-69A1-2FF1-92D3-365D406FA234}"/>
+              </a:ext>
+            </a:extLst>
+          </p:cNvPr>
+          <p:cNvSpPr/>
+          <p:nvPr/>
+        </p:nvSpPr>
+        <p:spPr>
+          <a:xfrm>
+            <a:off x="6872748" y="4274074"/>
+            <a:ext cx="678426" cy="272997"/>
+          </a:xfrm>
+          <a:prstGeom prst="ellipse">
+            <a:avLst/>
+          </a:prstGeom>
+          <a:noFill/>
+          <a:ln>
+            <a:solidFill>
+              <a:srgbClr val="FF0000"/>
+            </a:solidFill>
+          </a:ln>
+        </p:spPr>
+        <p:style>
+          <a:lnRef idx="2">
+            <a:schemeClr val="accent6"/>
+          </a:lnRef>
+          <a:fillRef idx="1">
+            <a:schemeClr val="lt1"/>
+          </a:fillRef>
+          <a:effectRef idx="0">
+            <a:schemeClr val="accent6"/>
+          </a:effectRef>
+          <a:fontRef idx="minor">
+            <a:schemeClr val="dk1"/>
+          </a:fontRef>
+        </p:style>
+        <p:txBody>
+          <a:bodyPr rtlCol="0" anchor="ctr"/>
+          <a:lstStyle/>
+          <a:p>
+            <a:pPr algn="ctr"/>
+            <a:endParaRPr lang="fr-FR"/>
+          </a:p>
+        </p:txBody>
+      </p:sp>
+      <p:sp>
+        <p:nvSpPr>
+          <p:cNvPr id="13" name="Ellipse 12">
+            <a:extLst>
+              <a:ext uri="{FF2B5EF4-FFF2-40B4-BE49-F238E27FC236}">
+                <a16:creationId xmlns:a16="http://schemas.microsoft.com/office/drawing/2014/main" id="{57800941-D647-A7FE-BEBA-3FD0C8A71AEA}"/>
+              </a:ext>
+            </a:extLst>
+          </p:cNvPr>
+          <p:cNvSpPr/>
+          <p:nvPr/>
+        </p:nvSpPr>
+        <p:spPr>
+          <a:xfrm>
+            <a:off x="8971934" y="4101249"/>
+            <a:ext cx="816471" cy="305810"/>
+          </a:xfrm>
+          <a:prstGeom prst="ellipse">
+            <a:avLst/>
+          </a:prstGeom>
+          <a:noFill/>
+          <a:ln>
+            <a:solidFill>
+              <a:srgbClr val="FF0000"/>
+            </a:solidFill>
+          </a:ln>
+        </p:spPr>
+        <p:style>
+          <a:lnRef idx="2">
+            <a:schemeClr val="accent6"/>
+          </a:lnRef>
+          <a:fillRef idx="1">
+            <a:schemeClr val="lt1"/>
+          </a:fillRef>
+          <a:effectRef idx="0">
+            <a:schemeClr val="accent6"/>
+          </a:effectRef>
+          <a:fontRef idx="minor">
+            <a:schemeClr val="dk1"/>
+          </a:fontRef>
+        </p:style>
+        <p:txBody>
+          <a:bodyPr rtlCol="0" anchor="ctr"/>
+          <a:lstStyle/>
+          <a:p>
+            <a:pPr algn="ctr"/>
+            <a:endParaRPr lang="fr-FR"/>
+          </a:p>
+        </p:txBody>
+      </p:sp>
+      <p:sp>
+        <p:nvSpPr>
+          <p:cNvPr id="14" name="ZoneTexte 13">
+            <a:extLst>
+              <a:ext uri="{FF2B5EF4-FFF2-40B4-BE49-F238E27FC236}">
+                <a16:creationId xmlns:a16="http://schemas.microsoft.com/office/drawing/2014/main" id="{BB430AAE-E90E-7F7A-6CCD-9808130CAC93}"/>
+              </a:ext>
+            </a:extLst>
+          </p:cNvPr>
+          <p:cNvSpPr txBox="1"/>
+          <p:nvPr/>
+        </p:nvSpPr>
+        <p:spPr>
+          <a:xfrm>
+            <a:off x="7976417" y="5071414"/>
+            <a:ext cx="1991033" cy="646331"/>
+          </a:xfrm>
+          <a:prstGeom prst="rect">
+            <a:avLst/>
+          </a:prstGeom>
+          <a:noFill/>
+        </p:spPr>
+        <p:txBody>
+          <a:bodyPr wrap="square" rtlCol="0">
+            <a:spAutoFit/>
+          </a:bodyPr>
+          <a:lstStyle/>
+          <a:p>
+            <a:pPr algn="ctr"/>
+            <a:r>
+              <a:rPr lang="fr-FR" dirty="0" err="1"/>
+              <a:t>We</a:t>
+            </a:r>
+            <a:r>
+              <a:rPr lang="fr-FR" dirty="0"/>
+              <a:t> can drop </a:t>
+            </a:r>
+            <a:r>
+              <a:rPr lang="fr-FR" dirty="0" err="1"/>
+              <a:t>columns</a:t>
+            </a:r>
+            <a:r>
+              <a:rPr lang="fr-FR" dirty="0"/>
+              <a:t> 6 and 9</a:t>
+            </a:r>
+          </a:p>
+        </p:txBody>
+      </p:sp>
+      <p:cxnSp>
+        <p:nvCxnSpPr>
+          <p:cNvPr id="16" name="Connecteur droit avec flèche 15">
+            <a:extLst>
+              <a:ext uri="{FF2B5EF4-FFF2-40B4-BE49-F238E27FC236}">
+                <a16:creationId xmlns:a16="http://schemas.microsoft.com/office/drawing/2014/main" id="{43ECC302-8D3A-BA41-3AEF-28586409509B}"/>
+              </a:ext>
+            </a:extLst>
+          </p:cNvPr>
+          <p:cNvCxnSpPr>
+            <a:cxnSpLocks/>
+            <a:stCxn id="14" idx="0"/>
+            <a:endCxn id="13" idx="4"/>
+          </p:cNvCxnSpPr>
+          <p:nvPr/>
+        </p:nvCxnSpPr>
+        <p:spPr>
+          <a:xfrm flipV="1">
+            <a:off x="8971934" y="4407059"/>
+            <a:ext cx="408236" cy="664355"/>
+          </a:xfrm>
+          <a:prstGeom prst="straightConnector1">
+            <a:avLst/>
+          </a:prstGeom>
+          <a:ln w="12700">
+            <a:tailEnd type="triangle"/>
+          </a:ln>
+        </p:spPr>
+        <p:style>
+          <a:lnRef idx="1">
+            <a:schemeClr val="dk1"/>
+          </a:lnRef>
+          <a:fillRef idx="0">
+            <a:schemeClr val="dk1"/>
+          </a:fillRef>
+          <a:effectRef idx="0">
+            <a:schemeClr val="dk1"/>
+          </a:effectRef>
+          <a:fontRef idx="minor">
+            <a:schemeClr val="tx1"/>
+          </a:fontRef>
+        </p:style>
+      </p:cxnSp>
+      <p:cxnSp>
+        <p:nvCxnSpPr>
+          <p:cNvPr id="19" name="Connecteur droit avec flèche 18">
+            <a:extLst>
+              <a:ext uri="{FF2B5EF4-FFF2-40B4-BE49-F238E27FC236}">
+                <a16:creationId xmlns:a16="http://schemas.microsoft.com/office/drawing/2014/main" id="{175B3052-7317-CED1-0544-3F6F7C0A37D1}"/>
+              </a:ext>
+            </a:extLst>
+          </p:cNvPr>
+          <p:cNvCxnSpPr>
+            <a:cxnSpLocks/>
+            <a:stCxn id="14" idx="0"/>
+            <a:endCxn id="12" idx="5"/>
+          </p:cNvCxnSpPr>
+          <p:nvPr/>
+        </p:nvCxnSpPr>
+        <p:spPr>
+          <a:xfrm flipH="1" flipV="1">
+            <a:off x="7451821" y="4507092"/>
+            <a:ext cx="1520113" cy="564322"/>
+          </a:xfrm>
+          <a:prstGeom prst="straightConnector1">
+            <a:avLst/>
+          </a:prstGeom>
+          <a:ln w="12700">
+            <a:tailEnd type="triangle"/>
+          </a:ln>
+        </p:spPr>
+        <p:style>
+          <a:lnRef idx="1">
+            <a:schemeClr val="dk1"/>
+          </a:lnRef>
+          <a:fillRef idx="0">
+            <a:schemeClr val="dk1"/>
+          </a:fillRef>
+          <a:effectRef idx="0">
+            <a:schemeClr val="dk1"/>
+          </a:effectRef>
+          <a:fontRef idx="minor">
+            <a:schemeClr val="tx1"/>
+          </a:fontRef>
+        </p:style>
+      </p:cxnSp>
     </p:spTree>
     <p:extLst>
       <p:ext uri="{BB962C8B-B14F-4D97-AF65-F5344CB8AC3E}">
-        <p14:creationId xmlns:p14="http://schemas.microsoft.com/office/powerpoint/2010/main" val="718381304"/>
+        <p14:creationId xmlns:p14="http://schemas.microsoft.com/office/powerpoint/2010/main" val="4215413554"/>
       </p:ext>
     </p:extLst>
   </p:cSld>

</xml_diff>

<commit_message>
J'avais oublié d'upload le fichier sur les random forests
</commit_message>
<xml_diff>
--- a/Soutenance/Soutenance - Présentation.pptx
+++ b/Soutenance/Soutenance - Présentation.pptx
@@ -5,7 +5,7 @@
     <p:sldMasterId id="2147483714" r:id="rId1"/>
   </p:sldMasterIdLst>
   <p:notesMasterIdLst>
-    <p:notesMasterId r:id="rId21"/>
+    <p:notesMasterId r:id="rId24"/>
   </p:notesMasterIdLst>
   <p:sldIdLst>
     <p:sldId id="256" r:id="rId2"/>
@@ -26,7 +26,10 @@
     <p:sldId id="280" r:id="rId17"/>
     <p:sldId id="279" r:id="rId18"/>
     <p:sldId id="270" r:id="rId19"/>
-    <p:sldId id="263" r:id="rId20"/>
+    <p:sldId id="281" r:id="rId20"/>
+    <p:sldId id="282" r:id="rId21"/>
+    <p:sldId id="284" r:id="rId22"/>
+    <p:sldId id="263" r:id="rId23"/>
   </p:sldIdLst>
   <p:sldSz cx="12192000" cy="6858000"/>
   <p:notesSz cx="6858000" cy="9144000"/>
@@ -215,7 +218,7 @@
           <a:p>
             <a:fld id="{981C9C61-2C36-49D9-A983-0C73D7822A89}" type="datetimeFigureOut">
               <a:rPr lang="fr-FR" smtClean="0"/>
-              <a:t>22/05/2023</a:t>
+              <a:t>23/05/2023</a:t>
             </a:fld>
             <a:endParaRPr lang="fr-FR"/>
           </a:p>
@@ -650,7 +653,7 @@
           <a:p>
             <a:fld id="{AB812BCF-9BED-4509-A9F0-BB2A7053D7B8}" type="datetime1">
               <a:rPr lang="fr-FR" smtClean="0"/>
-              <a:t>22/05/2023</a:t>
+              <a:t>23/05/2023</a:t>
             </a:fld>
             <a:endParaRPr lang="fr-FR"/>
           </a:p>
@@ -878,7 +881,7 @@
           <a:p>
             <a:fld id="{4D187174-5443-4214-8581-D9701160E043}" type="datetime1">
               <a:rPr lang="fr-FR" smtClean="0"/>
-              <a:t>22/05/2023</a:t>
+              <a:t>23/05/2023</a:t>
             </a:fld>
             <a:endParaRPr lang="fr-FR"/>
           </a:p>
@@ -1058,7 +1061,7 @@
           <a:p>
             <a:fld id="{F24D0A28-4133-436C-A2CE-8389C1194983}" type="datetime1">
               <a:rPr lang="fr-FR" smtClean="0"/>
-              <a:t>22/05/2023</a:t>
+              <a:t>23/05/2023</a:t>
             </a:fld>
             <a:endParaRPr lang="fr-FR"/>
           </a:p>
@@ -1228,7 +1231,7 @@
           <a:p>
             <a:fld id="{08D4553E-7AF4-483A-9243-9AE70AAD3F3A}" type="datetime1">
               <a:rPr lang="fr-FR" smtClean="0"/>
-              <a:t>22/05/2023</a:t>
+              <a:t>23/05/2023</a:t>
             </a:fld>
             <a:endParaRPr lang="fr-FR"/>
           </a:p>
@@ -1482,7 +1485,7 @@
           <a:p>
             <a:fld id="{301E6F40-ED1D-4D99-AE91-D6412C7A03EF}" type="datetime1">
               <a:rPr lang="fr-FR" smtClean="0"/>
-              <a:t>22/05/2023</a:t>
+              <a:t>23/05/2023</a:t>
             </a:fld>
             <a:endParaRPr lang="fr-FR"/>
           </a:p>
@@ -1808,7 +1811,7 @@
           <a:p>
             <a:fld id="{C94CB90A-7DE7-459D-9B5B-4FCC9AF5FD81}" type="datetime1">
               <a:rPr lang="fr-FR" smtClean="0"/>
-              <a:t>22/05/2023</a:t>
+              <a:t>23/05/2023</a:t>
             </a:fld>
             <a:endParaRPr lang="fr-FR"/>
           </a:p>
@@ -2259,7 +2262,7 @@
           <a:p>
             <a:fld id="{277210C4-41D0-46B3-8525-BCBE92D1E22B}" type="datetime1">
               <a:rPr lang="fr-FR" smtClean="0"/>
-              <a:t>22/05/2023</a:t>
+              <a:t>23/05/2023</a:t>
             </a:fld>
             <a:endParaRPr lang="fr-FR"/>
           </a:p>
@@ -2377,7 +2380,7 @@
           <a:p>
             <a:fld id="{67630AD6-8C71-4B4C-AC9B-43B1C1E45240}" type="datetime1">
               <a:rPr lang="fr-FR" smtClean="0"/>
-              <a:t>22/05/2023</a:t>
+              <a:t>23/05/2023</a:t>
             </a:fld>
             <a:endParaRPr lang="fr-FR"/>
           </a:p>
@@ -2472,7 +2475,7 @@
           <a:p>
             <a:fld id="{186DBC00-48DF-4512-968E-9B457CE38853}" type="datetime1">
               <a:rPr lang="fr-FR" smtClean="0"/>
-              <a:t>22/05/2023</a:t>
+              <a:t>23/05/2023</a:t>
             </a:fld>
             <a:endParaRPr lang="fr-FR"/>
           </a:p>
@@ -2759,7 +2762,7 @@
           <a:p>
             <a:fld id="{66B51E60-A705-421D-925B-2E767ED99351}" type="datetime1">
               <a:rPr lang="fr-FR" smtClean="0"/>
-              <a:t>22/05/2023</a:t>
+              <a:t>23/05/2023</a:t>
             </a:fld>
             <a:endParaRPr lang="fr-FR"/>
           </a:p>
@@ -3081,7 +3084,7 @@
           <a:p>
             <a:fld id="{A4FFD765-E8B9-45DA-9D6B-78A998897229}" type="datetime1">
               <a:rPr lang="fr-FR" smtClean="0"/>
-              <a:t>22/05/2023</a:t>
+              <a:t>23/05/2023</a:t>
             </a:fld>
             <a:endParaRPr lang="fr-FR"/>
           </a:p>
@@ -3335,7 +3338,7 @@
           <a:p>
             <a:fld id="{25BDF4BB-9F02-4066-BED6-CCD793DC15DB}" type="datetime1">
               <a:rPr lang="fr-FR" smtClean="0"/>
-              <a:t>22/05/2023</a:t>
+              <a:t>23/05/2023</a:t>
             </a:fld>
             <a:endParaRPr lang="fr-FR"/>
           </a:p>
@@ -7347,6 +7350,64 @@
           <a:bodyPr/>
           <a:lstStyle/>
           <a:p>
+            <a:r>
+              <a:rPr lang="fr-FR" dirty="0"/>
+              <a:t>Boosting </a:t>
+            </a:r>
+            <a:r>
+              <a:rPr lang="fr-FR" dirty="0" err="1"/>
+              <a:t>works</a:t>
+            </a:r>
+            <a:r>
+              <a:rPr lang="fr-FR" dirty="0"/>
+              <a:t>. </a:t>
+            </a:r>
+            <a:r>
+              <a:rPr lang="fr-FR" b="1" dirty="0" err="1"/>
+              <a:t>What</a:t>
+            </a:r>
+            <a:r>
+              <a:rPr lang="fr-FR" b="1" dirty="0"/>
+              <a:t> about bagging?</a:t>
+            </a:r>
+          </a:p>
+          <a:p>
+            <a:pPr lvl="1"/>
+            <a:r>
+              <a:rPr lang="fr-FR" b="1" dirty="0" err="1"/>
+              <a:t>Random</a:t>
+            </a:r>
+            <a:r>
+              <a:rPr lang="fr-FR" b="1" dirty="0"/>
+              <a:t> Forest </a:t>
+            </a:r>
+            <a:r>
+              <a:rPr lang="fr-FR" dirty="0"/>
+              <a:t>vs Gradient </a:t>
+            </a:r>
+            <a:r>
+              <a:rPr lang="fr-FR" dirty="0" err="1"/>
+              <a:t>Boosting</a:t>
+            </a:r>
+            <a:endParaRPr lang="fr-FR" dirty="0"/>
+          </a:p>
+          <a:p>
+            <a:pPr marL="274320" lvl="1" indent="0">
+              <a:buNone/>
+            </a:pPr>
+            <a:endParaRPr lang="fr-FR" dirty="0"/>
+          </a:p>
+          <a:p>
+            <a:pPr marL="274320" lvl="1" indent="0">
+              <a:buNone/>
+            </a:pPr>
+            <a:r>
+              <a:rPr lang="fr-FR" b="0" dirty="0"/>
+              <a:t>	</a:t>
+            </a:r>
+          </a:p>
+          <a:p>
+            <a:pPr lvl="1"/>
             <a:endParaRPr lang="fr-FR" dirty="0"/>
           </a:p>
         </p:txBody>
@@ -7378,7 +7439,7 @@
               <a:rPr lang="fr-FR" smtClean="0"/>
               <a:t>18</a:t>
             </a:fld>
-            <a:endParaRPr lang="fr-FR"/>
+            <a:endParaRPr lang="fr-FR" dirty="0"/>
           </a:p>
         </p:txBody>
       </p:sp>
@@ -7417,7 +7478,7 @@
           <p:cNvPr id="2" name="Titre 1">
             <a:extLst>
               <a:ext uri="{FF2B5EF4-FFF2-40B4-BE49-F238E27FC236}">
-                <a16:creationId xmlns:a16="http://schemas.microsoft.com/office/drawing/2014/main" id="{6E083F9C-0465-A00D-5493-1BB6D273FFD2}"/>
+                <a16:creationId xmlns:a16="http://schemas.microsoft.com/office/drawing/2014/main" id="{0241FDBA-865B-2B8B-35F8-270B89A5484F}"/>
               </a:ext>
             </a:extLst>
           </p:cNvPr>
@@ -7430,52 +7491,340 @@
         </p:nvSpPr>
         <p:spPr>
           <a:xfrm>
-            <a:off x="1141413" y="609600"/>
-            <a:ext cx="9905998" cy="983226"/>
+            <a:off x="1143884" y="729553"/>
+            <a:ext cx="10605663" cy="1325562"/>
           </a:xfrm>
         </p:spPr>
         <p:txBody>
-          <a:bodyPr/>
+          <a:bodyPr>
+            <a:normAutofit fontScale="90000"/>
+          </a:bodyPr>
           <a:lstStyle/>
           <a:p>
             <a:r>
               <a:rPr lang="fr-FR" b="1" dirty="0"/>
-              <a:t>VI - Conclusion</a:t>
-            </a:r>
-          </a:p>
-        </p:txBody>
-      </p:sp>
-      <p:sp>
-        <p:nvSpPr>
-          <p:cNvPr id="3" name="Espace réservé du contenu 2">
-            <a:extLst>
-              <a:ext uri="{FF2B5EF4-FFF2-40B4-BE49-F238E27FC236}">
-                <a16:creationId xmlns:a16="http://schemas.microsoft.com/office/drawing/2014/main" id="{2B532F68-EF4E-2C33-FB15-EA643FA46D2B}"/>
-              </a:ext>
-            </a:extLst>
-          </p:cNvPr>
-          <p:cNvSpPr>
-            <a:spLocks noGrp="1"/>
-          </p:cNvSpPr>
-          <p:nvPr>
-            <p:ph idx="1"/>
-          </p:nvPr>
-        </p:nvSpPr>
-        <p:spPr/>
-        <p:txBody>
-          <a:bodyPr/>
-          <a:lstStyle/>
-          <a:p>
-            <a:endParaRPr lang="fr-FR"/>
-          </a:p>
-        </p:txBody>
-      </p:sp>
+              <a:t>V – Second machine </a:t>
+            </a:r>
+            <a:r>
+              <a:rPr lang="fr-FR" b="1" dirty="0" err="1"/>
+              <a:t>learning</a:t>
+            </a:r>
+            <a:r>
+              <a:rPr lang="fr-FR" b="1" dirty="0"/>
+              <a:t> </a:t>
+            </a:r>
+            <a:r>
+              <a:rPr lang="fr-FR" b="1" dirty="0" err="1"/>
+              <a:t>procedures</a:t>
+            </a:r>
+            <a:br>
+              <a:rPr lang="fr-FR" b="1" dirty="0"/>
+            </a:br>
+            <a:r>
+              <a:rPr lang="fr-FR" dirty="0" err="1"/>
+              <a:t>Tree</a:t>
+            </a:r>
+            <a:r>
+              <a:rPr lang="fr-FR" dirty="0"/>
+              <a:t> </a:t>
+            </a:r>
+            <a:r>
+              <a:rPr lang="fr-FR" dirty="0" err="1"/>
+              <a:t>Based</a:t>
+            </a:r>
+            <a:r>
+              <a:rPr lang="fr-FR" dirty="0"/>
+              <a:t> </a:t>
+            </a:r>
+            <a:r>
+              <a:rPr lang="fr-FR" dirty="0" err="1"/>
+              <a:t>methods</a:t>
+            </a:r>
+            <a:r>
+              <a:rPr lang="fr-FR" dirty="0"/>
+              <a:t> – </a:t>
+            </a:r>
+            <a:r>
+              <a:rPr lang="fr-FR" dirty="0" err="1"/>
+              <a:t>Random</a:t>
+            </a:r>
+            <a:r>
+              <a:rPr lang="fr-FR" dirty="0"/>
+              <a:t> Forest</a:t>
+            </a:r>
+          </a:p>
+        </p:txBody>
+      </p:sp>
+      <mc:AlternateContent xmlns:mc="http://schemas.openxmlformats.org/markup-compatibility/2006">
+        <mc:Choice xmlns:a14="http://schemas.microsoft.com/office/drawing/2010/main" Requires="a14">
+          <p:sp>
+            <p:nvSpPr>
+              <p:cNvPr id="3" name="Espace réservé du contenu 2">
+                <a:extLst>
+                  <a:ext uri="{FF2B5EF4-FFF2-40B4-BE49-F238E27FC236}">
+                    <a16:creationId xmlns:a16="http://schemas.microsoft.com/office/drawing/2014/main" id="{FD768049-343D-9EB5-B2D9-091FDD70AC44}"/>
+                  </a:ext>
+                </a:extLst>
+              </p:cNvPr>
+              <p:cNvSpPr>
+                <a:spLocks noGrp="1"/>
+              </p:cNvSpPr>
+              <p:nvPr>
+                <p:ph idx="1"/>
+              </p:nvPr>
+            </p:nvSpPr>
+            <p:spPr>
+              <a:xfrm>
+                <a:off x="1202878" y="2241755"/>
+                <a:ext cx="8595360" cy="4351337"/>
+              </a:xfrm>
+            </p:spPr>
+            <p:txBody>
+              <a:bodyPr/>
+              <a:lstStyle/>
+              <a:p>
+                <a:r>
+                  <a:rPr lang="fr-FR" dirty="0"/>
+                  <a:t>Boosting </a:t>
+                </a:r>
+                <a:r>
+                  <a:rPr lang="fr-FR" dirty="0" err="1"/>
+                  <a:t>works</a:t>
+                </a:r>
+                <a:r>
+                  <a:rPr lang="fr-FR" dirty="0"/>
+                  <a:t>. </a:t>
+                </a:r>
+                <a:r>
+                  <a:rPr lang="fr-FR" b="1" dirty="0" err="1"/>
+                  <a:t>What</a:t>
+                </a:r>
+                <a:r>
+                  <a:rPr lang="fr-FR" b="1" dirty="0"/>
+                  <a:t> about bagging?</a:t>
+                </a:r>
+              </a:p>
+              <a:p>
+                <a:pPr lvl="1"/>
+                <a:r>
+                  <a:rPr lang="fr-FR" b="1" dirty="0" err="1"/>
+                  <a:t>Random</a:t>
+                </a:r>
+                <a:r>
+                  <a:rPr lang="fr-FR" b="1" dirty="0"/>
+                  <a:t> Forest </a:t>
+                </a:r>
+                <a:r>
+                  <a:rPr lang="fr-FR" dirty="0"/>
+                  <a:t>vs Gradient </a:t>
+                </a:r>
+                <a:r>
+                  <a:rPr lang="fr-FR" dirty="0" err="1"/>
+                  <a:t>Boosting</a:t>
+                </a:r>
+                <a:endParaRPr lang="fr-FR" dirty="0"/>
+              </a:p>
+              <a:p>
+                <a:r>
+                  <a:rPr lang="fr-FR" b="1" dirty="0" err="1"/>
+                  <a:t>What</a:t>
+                </a:r>
+                <a:r>
+                  <a:rPr lang="fr-FR" b="1" dirty="0"/>
+                  <a:t> </a:t>
+                </a:r>
+                <a:r>
+                  <a:rPr lang="fr-FR" b="1" dirty="0" err="1"/>
+                  <a:t>is</a:t>
+                </a:r>
+                <a:r>
+                  <a:rPr lang="fr-FR" b="1" dirty="0"/>
+                  <a:t> </a:t>
+                </a:r>
+                <a:r>
+                  <a:rPr lang="fr-FR" b="1" dirty="0" err="1"/>
+                  <a:t>it</a:t>
+                </a:r>
+                <a:r>
+                  <a:rPr lang="fr-FR" b="1" dirty="0"/>
+                  <a:t>?</a:t>
+                </a:r>
+              </a:p>
+              <a:p>
+                <a:pPr lvl="1"/>
+                <a:r>
+                  <a:rPr lang="fr-FR" b="1" dirty="0" err="1"/>
+                  <a:t>Idea</a:t>
+                </a:r>
+                <a:r>
+                  <a:rPr lang="fr-FR" b="1" dirty="0"/>
+                  <a:t>:</a:t>
+                </a:r>
+                <a:r>
+                  <a:rPr lang="fr-FR" dirty="0"/>
+                  <a:t> </a:t>
+                </a:r>
+                <a:r>
+                  <a:rPr lang="fr-FR" dirty="0" err="1"/>
+                  <a:t>parallelise</a:t>
+                </a:r>
+                <a:r>
+                  <a:rPr lang="fr-FR" dirty="0"/>
+                  <a:t> the training of </a:t>
+                </a:r>
+                <a:r>
+                  <a:rPr lang="fr-FR" dirty="0" err="1"/>
+                  <a:t>decision</a:t>
+                </a:r>
+                <a:r>
+                  <a:rPr lang="fr-FR" dirty="0"/>
+                  <a:t> </a:t>
+                </a:r>
+                <a:r>
+                  <a:rPr lang="fr-FR" dirty="0" err="1"/>
+                  <a:t>trees</a:t>
+                </a:r>
+                <a:endParaRPr lang="fr-FR" dirty="0"/>
+              </a:p>
+              <a:p>
+                <a:pPr lvl="1"/>
+                <a:r>
+                  <a:rPr lang="fr-FR" b="0" dirty="0" err="1"/>
+                  <a:t>Wi</a:t>
+                </a:r>
+                <a:r>
+                  <a:rPr lang="fr-FR" b="0" dirty="0"/>
+                  <a:t>sdom of crowds </a:t>
+                </a:r>
+                <a14:m>
+                  <m:oMath xmlns:m="http://schemas.openxmlformats.org/officeDocument/2006/math">
+                    <m:r>
+                      <a:rPr lang="fr-FR" b="0" i="1" smtClean="0">
+                        <a:latin typeface="Cambria Math" panose="02040503050406030204" pitchFamily="18" charset="0"/>
+                      </a:rPr>
+                      <m:t>⇒</m:t>
+                    </m:r>
+                  </m:oMath>
+                </a14:m>
+                <a:r>
+                  <a:rPr lang="fr-FR" b="0" dirty="0"/>
+                  <a:t> </a:t>
+                </a:r>
+                <a:r>
+                  <a:rPr lang="fr-FR" b="0" dirty="0" err="1"/>
+                  <a:t>Majority-voting</a:t>
+                </a:r>
+                <a:r>
+                  <a:rPr lang="fr-FR" b="0" dirty="0"/>
+                  <a:t> to </a:t>
+                </a:r>
+                <a:r>
+                  <a:rPr lang="fr-FR" b="0" dirty="0" err="1"/>
+                  <a:t>predict</a:t>
+                </a:r>
+                <a:endParaRPr lang="fr-FR" b="0" dirty="0"/>
+              </a:p>
+              <a:p>
+                <a:pPr marL="274320" lvl="1" indent="0">
+                  <a:buNone/>
+                </a:pPr>
+                <a:r>
+                  <a:rPr lang="fr-FR" dirty="0"/>
+                  <a:t>a class</a:t>
+                </a:r>
+              </a:p>
+              <a:p>
+                <a:pPr lvl="1"/>
+                <a:r>
+                  <a:rPr lang="fr-FR" b="1" dirty="0"/>
+                  <a:t>How? </a:t>
+                </a:r>
+                <a:r>
+                  <a:rPr lang="fr-FR" dirty="0" err="1"/>
+                  <a:t>Database</a:t>
+                </a:r>
+                <a:r>
+                  <a:rPr lang="fr-FR" dirty="0"/>
+                  <a:t> </a:t>
+                </a:r>
+                <a:r>
+                  <a:rPr lang="fr-FR" dirty="0" err="1"/>
+                  <a:t>boostrap</a:t>
+                </a:r>
+                <a:endParaRPr lang="fr-FR" dirty="0"/>
+              </a:p>
+              <a:p>
+                <a:pPr marL="274320" lvl="1" indent="0">
+                  <a:buNone/>
+                </a:pPr>
+                <a:endParaRPr lang="fr-FR" dirty="0"/>
+              </a:p>
+              <a:p>
+                <a:pPr marL="274320" lvl="1" indent="0">
+                  <a:buNone/>
+                </a:pPr>
+                <a:r>
+                  <a:rPr lang="fr-FR" b="0" dirty="0"/>
+                  <a:t>	</a:t>
+                </a:r>
+              </a:p>
+              <a:p>
+                <a:pPr lvl="1"/>
+                <a:endParaRPr lang="fr-FR" dirty="0"/>
+              </a:p>
+            </p:txBody>
+          </p:sp>
+        </mc:Choice>
+        <mc:Fallback>
+          <p:sp>
+            <p:nvSpPr>
+              <p:cNvPr id="3" name="Espace réservé du contenu 2">
+                <a:extLst>
+                  <a:ext uri="{FF2B5EF4-FFF2-40B4-BE49-F238E27FC236}">
+                    <a16:creationId xmlns:a16="http://schemas.microsoft.com/office/drawing/2014/main" id="{FD768049-343D-9EB5-B2D9-091FDD70AC44}"/>
+                  </a:ext>
+                </a:extLst>
+              </p:cNvPr>
+              <p:cNvSpPr>
+                <a:spLocks noGrp="1" noRot="1" noChangeAspect="1" noMove="1" noResize="1" noEditPoints="1" noAdjustHandles="1" noChangeArrowheads="1" noChangeShapeType="1" noTextEdit="1"/>
+              </p:cNvSpPr>
+              <p:nvPr>
+                <p:ph idx="1"/>
+              </p:nvPr>
+            </p:nvSpPr>
+            <p:spPr>
+              <a:xfrm>
+                <a:off x="1202878" y="2241755"/>
+                <a:ext cx="8595360" cy="4351337"/>
+              </a:xfrm>
+              <a:blipFill>
+                <a:blip r:embed="rId2"/>
+                <a:stretch>
+                  <a:fillRect l="-142" t="-1120"/>
+                </a:stretch>
+              </a:blipFill>
+            </p:spPr>
+            <p:txBody>
+              <a:bodyPr/>
+              <a:lstStyle/>
+              <a:p>
+                <a:r>
+                  <a:rPr lang="fr-FR">
+                    <a:noFill/>
+                  </a:rPr>
+                  <a:t> </a:t>
+                </a:r>
+              </a:p>
+            </p:txBody>
+          </p:sp>
+        </mc:Fallback>
+      </mc:AlternateContent>
       <p:sp>
         <p:nvSpPr>
           <p:cNvPr id="4" name="Espace réservé du numéro de diapositive 3">
             <a:extLst>
               <a:ext uri="{FF2B5EF4-FFF2-40B4-BE49-F238E27FC236}">
-                <a16:creationId xmlns:a16="http://schemas.microsoft.com/office/drawing/2014/main" id="{FE7C4907-2A3C-6DD8-27C9-1A003A70920B}"/>
+                <a16:creationId xmlns:a16="http://schemas.microsoft.com/office/drawing/2014/main" id="{C2328755-8715-B3C4-ADDD-1AA048EC231E}"/>
               </a:ext>
             </a:extLst>
           </p:cNvPr>
@@ -7497,14 +7846,106 @@
               <a:rPr lang="fr-FR" smtClean="0"/>
               <a:t>19</a:t>
             </a:fld>
-            <a:endParaRPr lang="fr-FR"/>
-          </a:p>
-        </p:txBody>
-      </p:sp>
+            <a:endParaRPr lang="fr-FR" dirty="0"/>
+          </a:p>
+        </p:txBody>
+      </p:sp>
+      <p:grpSp>
+        <p:nvGrpSpPr>
+          <p:cNvPr id="8" name="Groupe 7">
+            <a:extLst>
+              <a:ext uri="{FF2B5EF4-FFF2-40B4-BE49-F238E27FC236}">
+                <a16:creationId xmlns:a16="http://schemas.microsoft.com/office/drawing/2014/main" id="{37D9272E-F44A-B636-E405-7A6E10B82CCC}"/>
+              </a:ext>
+            </a:extLst>
+          </p:cNvPr>
+          <p:cNvGrpSpPr/>
+          <p:nvPr/>
+        </p:nvGrpSpPr>
+        <p:grpSpPr>
+          <a:xfrm>
+            <a:off x="6587392" y="2353702"/>
+            <a:ext cx="4225806" cy="3169354"/>
+            <a:chOff x="6446715" y="2363749"/>
+            <a:chExt cx="4225806" cy="3169354"/>
+          </a:xfrm>
+        </p:grpSpPr>
+        <p:pic>
+          <p:nvPicPr>
+            <p:cNvPr id="6" name="Image 5" descr="Une image contenant texte, ligne, diagramme, capture d’écran">
+              <a:extLst>
+                <a:ext uri="{FF2B5EF4-FFF2-40B4-BE49-F238E27FC236}">
+                  <a16:creationId xmlns:a16="http://schemas.microsoft.com/office/drawing/2014/main" id="{785A741E-4A14-F6D7-D55B-E859BEF62C58}"/>
+                </a:ext>
+              </a:extLst>
+            </p:cNvPr>
+            <p:cNvPicPr>
+              <a:picLocks noChangeAspect="1"/>
+            </p:cNvPicPr>
+            <p:nvPr/>
+          </p:nvPicPr>
+          <p:blipFill>
+            <a:blip r:embed="rId3">
+              <a:extLst>
+                <a:ext uri="{28A0092B-C50C-407E-A947-70E740481C1C}">
+                  <a14:useLocalDpi xmlns:a14="http://schemas.microsoft.com/office/drawing/2010/main" val="0"/>
+                </a:ext>
+              </a:extLst>
+            </a:blip>
+            <a:stretch>
+              <a:fillRect/>
+            </a:stretch>
+          </p:blipFill>
+          <p:spPr>
+            <a:xfrm>
+              <a:off x="6446715" y="2363749"/>
+              <a:ext cx="4225806" cy="3169354"/>
+            </a:xfrm>
+            <a:prstGeom prst="rect">
+              <a:avLst/>
+            </a:prstGeom>
+          </p:spPr>
+        </p:pic>
+        <p:sp>
+          <p:nvSpPr>
+            <p:cNvPr id="7" name="ZoneTexte 6">
+              <a:extLst>
+                <a:ext uri="{FF2B5EF4-FFF2-40B4-BE49-F238E27FC236}">
+                  <a16:creationId xmlns:a16="http://schemas.microsoft.com/office/drawing/2014/main" id="{31E7E1BA-0A50-AC04-C1EA-260DEEB328C0}"/>
+                </a:ext>
+              </a:extLst>
+            </p:cNvPr>
+            <p:cNvSpPr txBox="1"/>
+            <p:nvPr/>
+          </p:nvSpPr>
+          <p:spPr>
+            <a:xfrm>
+              <a:off x="6446715" y="5178034"/>
+              <a:ext cx="3903633" cy="276999"/>
+            </a:xfrm>
+            <a:prstGeom prst="rect">
+              <a:avLst/>
+            </a:prstGeom>
+            <a:noFill/>
+          </p:spPr>
+          <p:txBody>
+            <a:bodyPr wrap="none" rtlCol="0">
+              <a:spAutoFit/>
+            </a:bodyPr>
+            <a:lstStyle/>
+            <a:p>
+              <a:r>
+                <a:rPr lang="fr-FR" sz="1200" dirty="0"/>
+                <a:t>Source: https://en.wikipedia.org/wiki/Random_forest</a:t>
+              </a:r>
+            </a:p>
+          </p:txBody>
+        </p:sp>
+      </p:grpSp>
     </p:spTree>
     <p:extLst>
       <p:ext uri="{BB962C8B-B14F-4D97-AF65-F5344CB8AC3E}">
-        <p14:creationId xmlns:p14="http://schemas.microsoft.com/office/powerpoint/2010/main" val="1363480817"/>
+        <p14:creationId xmlns:p14="http://schemas.microsoft.com/office/powerpoint/2010/main" val="230318963"/>
       </p:ext>
     </p:extLst>
   </p:cSld>
@@ -7739,6 +8180,976 @@
     <p:extLst>
       <p:ext uri="{BB962C8B-B14F-4D97-AF65-F5344CB8AC3E}">
         <p14:creationId xmlns:p14="http://schemas.microsoft.com/office/powerpoint/2010/main" val="2949016627"/>
+      </p:ext>
+    </p:extLst>
+  </p:cSld>
+  <p:clrMapOvr>
+    <a:masterClrMapping/>
+  </p:clrMapOvr>
+</p:sld>
+</file>
+
+<file path=ppt/slides/slide20.xml><?xml version="1.0" encoding="utf-8"?>
+<p:sld xmlns:a="http://schemas.openxmlformats.org/drawingml/2006/main" xmlns:r="http://schemas.openxmlformats.org/officeDocument/2006/relationships" xmlns:p="http://schemas.openxmlformats.org/presentationml/2006/main">
+  <p:cSld>
+    <p:spTree>
+      <p:nvGrpSpPr>
+        <p:cNvPr id="1" name=""/>
+        <p:cNvGrpSpPr/>
+        <p:nvPr/>
+      </p:nvGrpSpPr>
+      <p:grpSpPr>
+        <a:xfrm>
+          <a:off x="0" y="0"/>
+          <a:ext cx="0" cy="0"/>
+          <a:chOff x="0" y="0"/>
+          <a:chExt cx="0" cy="0"/>
+        </a:xfrm>
+      </p:grpSpPr>
+      <p:sp>
+        <p:nvSpPr>
+          <p:cNvPr id="2" name="Titre 1">
+            <a:extLst>
+              <a:ext uri="{FF2B5EF4-FFF2-40B4-BE49-F238E27FC236}">
+                <a16:creationId xmlns:a16="http://schemas.microsoft.com/office/drawing/2014/main" id="{0241FDBA-865B-2B8B-35F8-270B89A5484F}"/>
+              </a:ext>
+            </a:extLst>
+          </p:cNvPr>
+          <p:cNvSpPr>
+            <a:spLocks noGrp="1"/>
+          </p:cNvSpPr>
+          <p:nvPr>
+            <p:ph type="title"/>
+          </p:nvPr>
+        </p:nvSpPr>
+        <p:spPr>
+          <a:xfrm>
+            <a:off x="1143884" y="729553"/>
+            <a:ext cx="10605663" cy="1325562"/>
+          </a:xfrm>
+        </p:spPr>
+        <p:txBody>
+          <a:bodyPr>
+            <a:normAutofit fontScale="90000"/>
+          </a:bodyPr>
+          <a:lstStyle/>
+          <a:p>
+            <a:r>
+              <a:rPr lang="fr-FR" b="1" dirty="0"/>
+              <a:t>V – Second machine </a:t>
+            </a:r>
+            <a:r>
+              <a:rPr lang="fr-FR" b="1" dirty="0" err="1"/>
+              <a:t>learning</a:t>
+            </a:r>
+            <a:r>
+              <a:rPr lang="fr-FR" b="1" dirty="0"/>
+              <a:t> </a:t>
+            </a:r>
+            <a:r>
+              <a:rPr lang="fr-FR" b="1" dirty="0" err="1"/>
+              <a:t>procedures</a:t>
+            </a:r>
+            <a:br>
+              <a:rPr lang="fr-FR" b="1" dirty="0"/>
+            </a:br>
+            <a:r>
+              <a:rPr lang="fr-FR" dirty="0" err="1"/>
+              <a:t>Tree</a:t>
+            </a:r>
+            <a:r>
+              <a:rPr lang="fr-FR" dirty="0"/>
+              <a:t> </a:t>
+            </a:r>
+            <a:r>
+              <a:rPr lang="fr-FR" dirty="0" err="1"/>
+              <a:t>Based</a:t>
+            </a:r>
+            <a:r>
+              <a:rPr lang="fr-FR" dirty="0"/>
+              <a:t> </a:t>
+            </a:r>
+            <a:r>
+              <a:rPr lang="fr-FR" dirty="0" err="1"/>
+              <a:t>methods</a:t>
+            </a:r>
+            <a:r>
+              <a:rPr lang="fr-FR" dirty="0"/>
+              <a:t> – </a:t>
+            </a:r>
+            <a:r>
+              <a:rPr lang="fr-FR" dirty="0" err="1"/>
+              <a:t>Random</a:t>
+            </a:r>
+            <a:r>
+              <a:rPr lang="fr-FR" dirty="0"/>
+              <a:t> Forest</a:t>
+            </a:r>
+          </a:p>
+        </p:txBody>
+      </p:sp>
+      <p:sp>
+        <p:nvSpPr>
+          <p:cNvPr id="3" name="Espace réservé du contenu 2">
+            <a:extLst>
+              <a:ext uri="{FF2B5EF4-FFF2-40B4-BE49-F238E27FC236}">
+                <a16:creationId xmlns:a16="http://schemas.microsoft.com/office/drawing/2014/main" id="{FD768049-343D-9EB5-B2D9-091FDD70AC44}"/>
+              </a:ext>
+            </a:extLst>
+          </p:cNvPr>
+          <p:cNvSpPr>
+            <a:spLocks noGrp="1"/>
+          </p:cNvSpPr>
+          <p:nvPr>
+            <p:ph idx="1"/>
+          </p:nvPr>
+        </p:nvSpPr>
+        <p:spPr>
+          <a:xfrm>
+            <a:off x="1202878" y="2241755"/>
+            <a:ext cx="8595360" cy="4351337"/>
+          </a:xfrm>
+        </p:spPr>
+        <p:txBody>
+          <a:bodyPr/>
+          <a:lstStyle/>
+          <a:p>
+            <a:r>
+              <a:rPr lang="fr-FR" b="1" dirty="0"/>
+              <a:t>On </a:t>
+            </a:r>
+            <a:r>
+              <a:rPr lang="fr-FR" b="1" dirty="0" err="1"/>
+              <a:t>our</a:t>
+            </a:r>
+            <a:r>
+              <a:rPr lang="fr-FR" b="1" dirty="0"/>
+              <a:t> data</a:t>
+            </a:r>
+          </a:p>
+          <a:p>
+            <a:pPr lvl="1"/>
+            <a:r>
+              <a:rPr lang="fr-FR" dirty="0" err="1"/>
+              <a:t>Regression</a:t>
+            </a:r>
+            <a:endParaRPr lang="fr-FR" dirty="0"/>
+          </a:p>
+          <a:p>
+            <a:pPr lvl="1"/>
+            <a:r>
+              <a:rPr lang="fr-FR" dirty="0" err="1"/>
+              <a:t>Optimized</a:t>
+            </a:r>
+            <a:r>
+              <a:rPr lang="fr-FR" dirty="0"/>
+              <a:t> </a:t>
+            </a:r>
+            <a:r>
+              <a:rPr lang="fr-FR" dirty="0" err="1"/>
+              <a:t>hyperparameters</a:t>
+            </a:r>
+            <a:r>
+              <a:rPr lang="fr-FR" dirty="0"/>
+              <a:t> </a:t>
+            </a:r>
+            <a:r>
+              <a:rPr lang="fr-FR" dirty="0" err="1"/>
+              <a:t>using</a:t>
+            </a:r>
+            <a:r>
+              <a:rPr lang="fr-FR" dirty="0"/>
+              <a:t> cross-validation</a:t>
+            </a:r>
+          </a:p>
+          <a:p>
+            <a:pPr lvl="1"/>
+            <a:r>
+              <a:rPr lang="fr-FR" b="1" dirty="0" err="1"/>
+              <a:t>Results</a:t>
+            </a:r>
+            <a:r>
+              <a:rPr lang="fr-FR" b="1" dirty="0"/>
+              <a:t>:</a:t>
+            </a:r>
+          </a:p>
+          <a:p>
+            <a:pPr marL="274320" lvl="1" indent="0">
+              <a:buNone/>
+            </a:pPr>
+            <a:endParaRPr lang="fr-FR" dirty="0"/>
+          </a:p>
+          <a:p>
+            <a:pPr marL="274320" lvl="1" indent="0">
+              <a:buNone/>
+            </a:pPr>
+            <a:r>
+              <a:rPr lang="fr-FR" b="0" dirty="0"/>
+              <a:t>	</a:t>
+            </a:r>
+          </a:p>
+          <a:p>
+            <a:pPr lvl="1"/>
+            <a:endParaRPr lang="fr-FR" dirty="0"/>
+          </a:p>
+        </p:txBody>
+      </p:sp>
+      <p:sp>
+        <p:nvSpPr>
+          <p:cNvPr id="4" name="Espace réservé du numéro de diapositive 3">
+            <a:extLst>
+              <a:ext uri="{FF2B5EF4-FFF2-40B4-BE49-F238E27FC236}">
+                <a16:creationId xmlns:a16="http://schemas.microsoft.com/office/drawing/2014/main" id="{C2328755-8715-B3C4-ADDD-1AA048EC231E}"/>
+              </a:ext>
+            </a:extLst>
+          </p:cNvPr>
+          <p:cNvSpPr>
+            <a:spLocks noGrp="1"/>
+          </p:cNvSpPr>
+          <p:nvPr>
+            <p:ph type="sldNum" sz="quarter" idx="12"/>
+          </p:nvPr>
+        </p:nvSpPr>
+        <p:spPr/>
+        <p:txBody>
+          <a:bodyPr>
+            <a:normAutofit lnSpcReduction="10000"/>
+          </a:bodyPr>
+          <a:lstStyle/>
+          <a:p>
+            <a:fld id="{DC9A08A5-7ACC-4C52-B2B9-9EF3D4E7F5B2}" type="slidenum">
+              <a:rPr lang="fr-FR" smtClean="0"/>
+              <a:t>20</a:t>
+            </a:fld>
+            <a:endParaRPr lang="fr-FR" dirty="0"/>
+          </a:p>
+        </p:txBody>
+      </p:sp>
+      <p:pic>
+        <p:nvPicPr>
+          <p:cNvPr id="9" name="Image 8">
+            <a:extLst>
+              <a:ext uri="{FF2B5EF4-FFF2-40B4-BE49-F238E27FC236}">
+                <a16:creationId xmlns:a16="http://schemas.microsoft.com/office/drawing/2014/main" id="{6E29C8D6-D47D-61EA-885C-F99E276984BF}"/>
+              </a:ext>
+            </a:extLst>
+          </p:cNvPr>
+          <p:cNvPicPr>
+            <a:picLocks noChangeAspect="1"/>
+          </p:cNvPicPr>
+          <p:nvPr/>
+        </p:nvPicPr>
+        <p:blipFill>
+          <a:blip r:embed="rId2"/>
+          <a:stretch>
+            <a:fillRect/>
+          </a:stretch>
+        </p:blipFill>
+        <p:spPr>
+          <a:xfrm>
+            <a:off x="1477465" y="3618271"/>
+            <a:ext cx="9014194" cy="2128513"/>
+          </a:xfrm>
+          <a:prstGeom prst="rect">
+            <a:avLst/>
+          </a:prstGeom>
+        </p:spPr>
+      </p:pic>
+      <p:sp>
+        <p:nvSpPr>
+          <p:cNvPr id="10" name="Ellipse 9">
+            <a:extLst>
+              <a:ext uri="{FF2B5EF4-FFF2-40B4-BE49-F238E27FC236}">
+                <a16:creationId xmlns:a16="http://schemas.microsoft.com/office/drawing/2014/main" id="{B4592506-09C2-9A71-4A60-93F14A0B0188}"/>
+              </a:ext>
+            </a:extLst>
+          </p:cNvPr>
+          <p:cNvSpPr/>
+          <p:nvPr/>
+        </p:nvSpPr>
+        <p:spPr>
+          <a:xfrm>
+            <a:off x="5591271" y="4001729"/>
+            <a:ext cx="766917" cy="344129"/>
+          </a:xfrm>
+          <a:prstGeom prst="ellipse">
+            <a:avLst/>
+          </a:prstGeom>
+          <a:noFill/>
+          <a:ln w="12700">
+            <a:solidFill>
+              <a:srgbClr val="FF0000"/>
+            </a:solidFill>
+          </a:ln>
+        </p:spPr>
+        <p:style>
+          <a:lnRef idx="2">
+            <a:schemeClr val="accent1">
+              <a:shade val="50000"/>
+            </a:schemeClr>
+          </a:lnRef>
+          <a:fillRef idx="1">
+            <a:schemeClr val="accent1"/>
+          </a:fillRef>
+          <a:effectRef idx="0">
+            <a:schemeClr val="accent1"/>
+          </a:effectRef>
+          <a:fontRef idx="minor">
+            <a:schemeClr val="lt1"/>
+          </a:fontRef>
+        </p:style>
+        <p:txBody>
+          <a:bodyPr rtlCol="0" anchor="ctr"/>
+          <a:lstStyle/>
+          <a:p>
+            <a:pPr algn="ctr"/>
+            <a:endParaRPr lang="fr-FR"/>
+          </a:p>
+        </p:txBody>
+      </p:sp>
+      <p:sp>
+        <p:nvSpPr>
+          <p:cNvPr id="11" name="ZoneTexte 10">
+            <a:extLst>
+              <a:ext uri="{FF2B5EF4-FFF2-40B4-BE49-F238E27FC236}">
+                <a16:creationId xmlns:a16="http://schemas.microsoft.com/office/drawing/2014/main" id="{D933DBA1-30F1-E5F8-7075-CE45C4DEAF68}"/>
+              </a:ext>
+            </a:extLst>
+          </p:cNvPr>
+          <p:cNvSpPr txBox="1"/>
+          <p:nvPr/>
+        </p:nvSpPr>
+        <p:spPr>
+          <a:xfrm>
+            <a:off x="7216877" y="3054752"/>
+            <a:ext cx="2823209" cy="369332"/>
+          </a:xfrm>
+          <a:prstGeom prst="rect">
+            <a:avLst/>
+          </a:prstGeom>
+          <a:noFill/>
+        </p:spPr>
+        <p:txBody>
+          <a:bodyPr wrap="none" rtlCol="0">
+            <a:spAutoFit/>
+          </a:bodyPr>
+          <a:lstStyle/>
+          <a:p>
+            <a:r>
+              <a:rPr lang="fr-FR" dirty="0"/>
+              <a:t>Strong </a:t>
+            </a:r>
+            <a:r>
+              <a:rPr lang="fr-FR" dirty="0" err="1"/>
+              <a:t>prediction</a:t>
+            </a:r>
+            <a:r>
+              <a:rPr lang="fr-FR" dirty="0"/>
+              <a:t> power!</a:t>
+            </a:r>
+          </a:p>
+        </p:txBody>
+      </p:sp>
+      <p:cxnSp>
+        <p:nvCxnSpPr>
+          <p:cNvPr id="13" name="Connecteur droit avec flèche 12">
+            <a:extLst>
+              <a:ext uri="{FF2B5EF4-FFF2-40B4-BE49-F238E27FC236}">
+                <a16:creationId xmlns:a16="http://schemas.microsoft.com/office/drawing/2014/main" id="{7478669D-68A1-9733-8919-13D2903121A3}"/>
+              </a:ext>
+            </a:extLst>
+          </p:cNvPr>
+          <p:cNvCxnSpPr>
+            <a:cxnSpLocks/>
+            <a:stCxn id="11" idx="1"/>
+            <a:endCxn id="10" idx="7"/>
+          </p:cNvCxnSpPr>
+          <p:nvPr/>
+        </p:nvCxnSpPr>
+        <p:spPr>
+          <a:xfrm flipH="1">
+            <a:off x="6245876" y="3239418"/>
+            <a:ext cx="971001" cy="812708"/>
+          </a:xfrm>
+          <a:prstGeom prst="straightConnector1">
+            <a:avLst/>
+          </a:prstGeom>
+          <a:ln w="12700">
+            <a:tailEnd type="triangle"/>
+          </a:ln>
+        </p:spPr>
+        <p:style>
+          <a:lnRef idx="1">
+            <a:schemeClr val="dk1"/>
+          </a:lnRef>
+          <a:fillRef idx="0">
+            <a:schemeClr val="dk1"/>
+          </a:fillRef>
+          <a:effectRef idx="0">
+            <a:schemeClr val="dk1"/>
+          </a:effectRef>
+          <a:fontRef idx="minor">
+            <a:schemeClr val="tx1"/>
+          </a:fontRef>
+        </p:style>
+      </p:cxnSp>
+      <p:sp>
+        <p:nvSpPr>
+          <p:cNvPr id="15" name="Ellipse 14">
+            <a:extLst>
+              <a:ext uri="{FF2B5EF4-FFF2-40B4-BE49-F238E27FC236}">
+                <a16:creationId xmlns:a16="http://schemas.microsoft.com/office/drawing/2014/main" id="{9BB54FE5-9A3C-E65A-0CF8-BBB2D88596D9}"/>
+              </a:ext>
+            </a:extLst>
+          </p:cNvPr>
+          <p:cNvSpPr/>
+          <p:nvPr/>
+        </p:nvSpPr>
+        <p:spPr>
+          <a:xfrm>
+            <a:off x="7216877" y="5428642"/>
+            <a:ext cx="1492869" cy="344129"/>
+          </a:xfrm>
+          <a:prstGeom prst="ellipse">
+            <a:avLst/>
+          </a:prstGeom>
+          <a:noFill/>
+          <a:ln w="12700">
+            <a:solidFill>
+              <a:srgbClr val="FF0000"/>
+            </a:solidFill>
+          </a:ln>
+        </p:spPr>
+        <p:style>
+          <a:lnRef idx="2">
+            <a:schemeClr val="accent1">
+              <a:shade val="50000"/>
+            </a:schemeClr>
+          </a:lnRef>
+          <a:fillRef idx="1">
+            <a:schemeClr val="accent1"/>
+          </a:fillRef>
+          <a:effectRef idx="0">
+            <a:schemeClr val="accent1"/>
+          </a:effectRef>
+          <a:fontRef idx="minor">
+            <a:schemeClr val="lt1"/>
+          </a:fontRef>
+        </p:style>
+        <p:txBody>
+          <a:bodyPr rtlCol="0" anchor="ctr"/>
+          <a:lstStyle/>
+          <a:p>
+            <a:pPr algn="ctr"/>
+            <a:endParaRPr lang="fr-FR"/>
+          </a:p>
+        </p:txBody>
+      </p:sp>
+    </p:spTree>
+    <p:extLst>
+      <p:ext uri="{BB962C8B-B14F-4D97-AF65-F5344CB8AC3E}">
+        <p14:creationId xmlns:p14="http://schemas.microsoft.com/office/powerpoint/2010/main" val="1866197149"/>
+      </p:ext>
+    </p:extLst>
+  </p:cSld>
+  <p:clrMapOvr>
+    <a:masterClrMapping/>
+  </p:clrMapOvr>
+</p:sld>
+</file>
+
+<file path=ppt/slides/slide21.xml><?xml version="1.0" encoding="utf-8"?>
+<p:sld xmlns:a="http://schemas.openxmlformats.org/drawingml/2006/main" xmlns:r="http://schemas.openxmlformats.org/officeDocument/2006/relationships" xmlns:p="http://schemas.openxmlformats.org/presentationml/2006/main">
+  <p:cSld>
+    <p:spTree>
+      <p:nvGrpSpPr>
+        <p:cNvPr id="1" name=""/>
+        <p:cNvGrpSpPr/>
+        <p:nvPr/>
+      </p:nvGrpSpPr>
+      <p:grpSpPr>
+        <a:xfrm>
+          <a:off x="0" y="0"/>
+          <a:ext cx="0" cy="0"/>
+          <a:chOff x="0" y="0"/>
+          <a:chExt cx="0" cy="0"/>
+        </a:xfrm>
+      </p:grpSpPr>
+      <p:sp>
+        <p:nvSpPr>
+          <p:cNvPr id="2" name="Titre 1">
+            <a:extLst>
+              <a:ext uri="{FF2B5EF4-FFF2-40B4-BE49-F238E27FC236}">
+                <a16:creationId xmlns:a16="http://schemas.microsoft.com/office/drawing/2014/main" id="{0241FDBA-865B-2B8B-35F8-270B89A5484F}"/>
+              </a:ext>
+            </a:extLst>
+          </p:cNvPr>
+          <p:cNvSpPr>
+            <a:spLocks noGrp="1"/>
+          </p:cNvSpPr>
+          <p:nvPr>
+            <p:ph type="title"/>
+          </p:nvPr>
+        </p:nvSpPr>
+        <p:spPr>
+          <a:xfrm>
+            <a:off x="1143884" y="729553"/>
+            <a:ext cx="10605663" cy="1325562"/>
+          </a:xfrm>
+        </p:spPr>
+        <p:txBody>
+          <a:bodyPr>
+            <a:normAutofit fontScale="90000"/>
+          </a:bodyPr>
+          <a:lstStyle/>
+          <a:p>
+            <a:r>
+              <a:rPr lang="fr-FR" b="1" dirty="0"/>
+              <a:t>V – Second machine </a:t>
+            </a:r>
+            <a:r>
+              <a:rPr lang="fr-FR" b="1" dirty="0" err="1"/>
+              <a:t>learning</a:t>
+            </a:r>
+            <a:r>
+              <a:rPr lang="fr-FR" b="1" dirty="0"/>
+              <a:t> </a:t>
+            </a:r>
+            <a:r>
+              <a:rPr lang="fr-FR" b="1" dirty="0" err="1"/>
+              <a:t>procedures</a:t>
+            </a:r>
+            <a:br>
+              <a:rPr lang="fr-FR" b="1" dirty="0"/>
+            </a:br>
+            <a:r>
+              <a:rPr lang="fr-FR" dirty="0" err="1"/>
+              <a:t>Tree</a:t>
+            </a:r>
+            <a:r>
+              <a:rPr lang="fr-FR" dirty="0"/>
+              <a:t> </a:t>
+            </a:r>
+            <a:r>
+              <a:rPr lang="fr-FR" dirty="0" err="1"/>
+              <a:t>Based</a:t>
+            </a:r>
+            <a:r>
+              <a:rPr lang="fr-FR" dirty="0"/>
+              <a:t> </a:t>
+            </a:r>
+            <a:r>
+              <a:rPr lang="fr-FR" dirty="0" err="1"/>
+              <a:t>methods</a:t>
+            </a:r>
+            <a:r>
+              <a:rPr lang="fr-FR" dirty="0"/>
+              <a:t> – </a:t>
+            </a:r>
+            <a:r>
+              <a:rPr lang="fr-FR" dirty="0" err="1"/>
+              <a:t>Random</a:t>
+            </a:r>
+            <a:r>
+              <a:rPr lang="fr-FR" dirty="0"/>
+              <a:t> Forest</a:t>
+            </a:r>
+          </a:p>
+        </p:txBody>
+      </p:sp>
+      <p:sp>
+        <p:nvSpPr>
+          <p:cNvPr id="3" name="Espace réservé du contenu 2">
+            <a:extLst>
+              <a:ext uri="{FF2B5EF4-FFF2-40B4-BE49-F238E27FC236}">
+                <a16:creationId xmlns:a16="http://schemas.microsoft.com/office/drawing/2014/main" id="{FD768049-343D-9EB5-B2D9-091FDD70AC44}"/>
+              </a:ext>
+            </a:extLst>
+          </p:cNvPr>
+          <p:cNvSpPr>
+            <a:spLocks noGrp="1"/>
+          </p:cNvSpPr>
+          <p:nvPr>
+            <p:ph idx="1"/>
+          </p:nvPr>
+        </p:nvSpPr>
+        <p:spPr>
+          <a:xfrm>
+            <a:off x="1202878" y="2241755"/>
+            <a:ext cx="8595360" cy="4351337"/>
+          </a:xfrm>
+        </p:spPr>
+        <p:txBody>
+          <a:bodyPr/>
+          <a:lstStyle/>
+          <a:p>
+            <a:r>
+              <a:rPr lang="fr-FR" b="1" dirty="0"/>
+              <a:t>On </a:t>
+            </a:r>
+            <a:r>
+              <a:rPr lang="fr-FR" b="1" dirty="0" err="1"/>
+              <a:t>our</a:t>
+            </a:r>
+            <a:r>
+              <a:rPr lang="fr-FR" b="1" dirty="0"/>
+              <a:t> data</a:t>
+            </a:r>
+          </a:p>
+          <a:p>
+            <a:pPr lvl="1"/>
+            <a:r>
+              <a:rPr lang="fr-FR" dirty="0"/>
+              <a:t>Classification</a:t>
+            </a:r>
+          </a:p>
+          <a:p>
+            <a:pPr lvl="1"/>
+            <a:r>
+              <a:rPr lang="fr-FR" b="1" dirty="0" err="1"/>
+              <a:t>Results</a:t>
+            </a:r>
+            <a:r>
+              <a:rPr lang="fr-FR" b="1" dirty="0"/>
+              <a:t>:</a:t>
+            </a:r>
+          </a:p>
+          <a:p>
+            <a:pPr marL="274320" lvl="1" indent="0">
+              <a:buNone/>
+            </a:pPr>
+            <a:r>
+              <a:rPr lang="fr-FR" b="0" dirty="0"/>
+              <a:t>	</a:t>
+            </a:r>
+          </a:p>
+          <a:p>
+            <a:pPr lvl="1"/>
+            <a:endParaRPr lang="fr-FR" dirty="0"/>
+          </a:p>
+        </p:txBody>
+      </p:sp>
+      <p:sp>
+        <p:nvSpPr>
+          <p:cNvPr id="4" name="Espace réservé du numéro de diapositive 3">
+            <a:extLst>
+              <a:ext uri="{FF2B5EF4-FFF2-40B4-BE49-F238E27FC236}">
+                <a16:creationId xmlns:a16="http://schemas.microsoft.com/office/drawing/2014/main" id="{C2328755-8715-B3C4-ADDD-1AA048EC231E}"/>
+              </a:ext>
+            </a:extLst>
+          </p:cNvPr>
+          <p:cNvSpPr>
+            <a:spLocks noGrp="1"/>
+          </p:cNvSpPr>
+          <p:nvPr>
+            <p:ph type="sldNum" sz="quarter" idx="12"/>
+          </p:nvPr>
+        </p:nvSpPr>
+        <p:spPr/>
+        <p:txBody>
+          <a:bodyPr>
+            <a:normAutofit lnSpcReduction="10000"/>
+          </a:bodyPr>
+          <a:lstStyle/>
+          <a:p>
+            <a:fld id="{DC9A08A5-7ACC-4C52-B2B9-9EF3D4E7F5B2}" type="slidenum">
+              <a:rPr lang="fr-FR" smtClean="0"/>
+              <a:t>21</a:t>
+            </a:fld>
+            <a:endParaRPr lang="fr-FR" dirty="0"/>
+          </a:p>
+        </p:txBody>
+      </p:sp>
+      <p:pic>
+        <p:nvPicPr>
+          <p:cNvPr id="6" name="Image 5">
+            <a:extLst>
+              <a:ext uri="{FF2B5EF4-FFF2-40B4-BE49-F238E27FC236}">
+                <a16:creationId xmlns:a16="http://schemas.microsoft.com/office/drawing/2014/main" id="{77D66B8F-2D0D-BEA7-89D8-C23A044E9A02}"/>
+              </a:ext>
+            </a:extLst>
+          </p:cNvPr>
+          <p:cNvPicPr>
+            <a:picLocks noChangeAspect="1"/>
+          </p:cNvPicPr>
+          <p:nvPr/>
+        </p:nvPicPr>
+        <p:blipFill>
+          <a:blip r:embed="rId2"/>
+          <a:stretch>
+            <a:fillRect/>
+          </a:stretch>
+        </p:blipFill>
+        <p:spPr>
+          <a:xfrm>
+            <a:off x="1722759" y="3394504"/>
+            <a:ext cx="8746482" cy="2733943"/>
+          </a:xfrm>
+          <a:prstGeom prst="rect">
+            <a:avLst/>
+          </a:prstGeom>
+        </p:spPr>
+      </p:pic>
+      <p:sp>
+        <p:nvSpPr>
+          <p:cNvPr id="7" name="ZoneTexte 6">
+            <a:extLst>
+              <a:ext uri="{FF2B5EF4-FFF2-40B4-BE49-F238E27FC236}">
+                <a16:creationId xmlns:a16="http://schemas.microsoft.com/office/drawing/2014/main" id="{EB942B7E-47BA-D0AD-22EB-2C6FD92F5AA4}"/>
+              </a:ext>
+            </a:extLst>
+          </p:cNvPr>
+          <p:cNvSpPr txBox="1"/>
+          <p:nvPr/>
+        </p:nvSpPr>
+        <p:spPr>
+          <a:xfrm>
+            <a:off x="6771447" y="2560527"/>
+            <a:ext cx="3026791" cy="369332"/>
+          </a:xfrm>
+          <a:prstGeom prst="rect">
+            <a:avLst/>
+          </a:prstGeom>
+          <a:noFill/>
+        </p:spPr>
+        <p:txBody>
+          <a:bodyPr wrap="none" rtlCol="0">
+            <a:spAutoFit/>
+          </a:bodyPr>
+          <a:lstStyle/>
+          <a:p>
+            <a:r>
+              <a:rPr lang="fr-FR" dirty="0" err="1"/>
+              <a:t>Random</a:t>
+            </a:r>
+            <a:r>
+              <a:rPr lang="fr-FR" dirty="0"/>
+              <a:t> Forest &lt; </a:t>
+            </a:r>
+            <a:r>
+              <a:rPr lang="fr-FR" dirty="0" err="1"/>
+              <a:t>XGBoost</a:t>
+            </a:r>
+            <a:endParaRPr lang="fr-FR" dirty="0"/>
+          </a:p>
+        </p:txBody>
+      </p:sp>
+      <p:sp>
+        <p:nvSpPr>
+          <p:cNvPr id="12" name="Rectangle : coins arrondis 11">
+            <a:extLst>
+              <a:ext uri="{FF2B5EF4-FFF2-40B4-BE49-F238E27FC236}">
+                <a16:creationId xmlns:a16="http://schemas.microsoft.com/office/drawing/2014/main" id="{3A243007-560F-5FF9-0B4E-F55D6E669D33}"/>
+              </a:ext>
+            </a:extLst>
+          </p:cNvPr>
+          <p:cNvSpPr/>
+          <p:nvPr/>
+        </p:nvSpPr>
+        <p:spPr>
+          <a:xfrm>
+            <a:off x="3687096" y="3293807"/>
+            <a:ext cx="2703871" cy="2546554"/>
+          </a:xfrm>
+          <a:prstGeom prst="roundRect">
+            <a:avLst/>
+          </a:prstGeom>
+          <a:noFill/>
+          <a:ln w="19050">
+            <a:solidFill>
+              <a:srgbClr val="FF0000"/>
+            </a:solidFill>
+          </a:ln>
+        </p:spPr>
+        <p:style>
+          <a:lnRef idx="2">
+            <a:schemeClr val="accent1">
+              <a:shade val="50000"/>
+            </a:schemeClr>
+          </a:lnRef>
+          <a:fillRef idx="1">
+            <a:schemeClr val="accent1"/>
+          </a:fillRef>
+          <a:effectRef idx="0">
+            <a:schemeClr val="accent1"/>
+          </a:effectRef>
+          <a:fontRef idx="minor">
+            <a:schemeClr val="lt1"/>
+          </a:fontRef>
+        </p:style>
+        <p:txBody>
+          <a:bodyPr rtlCol="0" anchor="ctr"/>
+          <a:lstStyle/>
+          <a:p>
+            <a:pPr algn="ctr"/>
+            <a:endParaRPr lang="fr-FR"/>
+          </a:p>
+        </p:txBody>
+      </p:sp>
+      <p:cxnSp>
+        <p:nvCxnSpPr>
+          <p:cNvPr id="16" name="Connecteur droit avec flèche 15">
+            <a:extLst>
+              <a:ext uri="{FF2B5EF4-FFF2-40B4-BE49-F238E27FC236}">
+                <a16:creationId xmlns:a16="http://schemas.microsoft.com/office/drawing/2014/main" id="{E9F04BEC-9FA1-7224-A9A5-B90D6C7633AA}"/>
+              </a:ext>
+            </a:extLst>
+          </p:cNvPr>
+          <p:cNvCxnSpPr>
+            <a:cxnSpLocks/>
+          </p:cNvCxnSpPr>
+          <p:nvPr/>
+        </p:nvCxnSpPr>
+        <p:spPr>
+          <a:xfrm flipH="1">
+            <a:off x="6158153" y="2795542"/>
+            <a:ext cx="577124" cy="548614"/>
+          </a:xfrm>
+          <a:prstGeom prst="straightConnector1">
+            <a:avLst/>
+          </a:prstGeom>
+          <a:ln w="12700">
+            <a:tailEnd type="triangle"/>
+          </a:ln>
+        </p:spPr>
+        <p:style>
+          <a:lnRef idx="1">
+            <a:schemeClr val="dk1"/>
+          </a:lnRef>
+          <a:fillRef idx="0">
+            <a:schemeClr val="dk1"/>
+          </a:fillRef>
+          <a:effectRef idx="0">
+            <a:schemeClr val="dk1"/>
+          </a:effectRef>
+          <a:fontRef idx="minor">
+            <a:schemeClr val="tx1"/>
+          </a:fontRef>
+        </p:style>
+      </p:cxnSp>
+    </p:spTree>
+    <p:extLst>
+      <p:ext uri="{BB962C8B-B14F-4D97-AF65-F5344CB8AC3E}">
+        <p14:creationId xmlns:p14="http://schemas.microsoft.com/office/powerpoint/2010/main" val="2787460893"/>
+      </p:ext>
+    </p:extLst>
+  </p:cSld>
+  <p:clrMapOvr>
+    <a:masterClrMapping/>
+  </p:clrMapOvr>
+</p:sld>
+</file>
+
+<file path=ppt/slides/slide22.xml><?xml version="1.0" encoding="utf-8"?>
+<p:sld xmlns:a="http://schemas.openxmlformats.org/drawingml/2006/main" xmlns:r="http://schemas.openxmlformats.org/officeDocument/2006/relationships" xmlns:p="http://schemas.openxmlformats.org/presentationml/2006/main">
+  <p:cSld>
+    <p:spTree>
+      <p:nvGrpSpPr>
+        <p:cNvPr id="1" name=""/>
+        <p:cNvGrpSpPr/>
+        <p:nvPr/>
+      </p:nvGrpSpPr>
+      <p:grpSpPr>
+        <a:xfrm>
+          <a:off x="0" y="0"/>
+          <a:ext cx="0" cy="0"/>
+          <a:chOff x="0" y="0"/>
+          <a:chExt cx="0" cy="0"/>
+        </a:xfrm>
+      </p:grpSpPr>
+      <p:sp>
+        <p:nvSpPr>
+          <p:cNvPr id="2" name="Titre 1">
+            <a:extLst>
+              <a:ext uri="{FF2B5EF4-FFF2-40B4-BE49-F238E27FC236}">
+                <a16:creationId xmlns:a16="http://schemas.microsoft.com/office/drawing/2014/main" id="{6E083F9C-0465-A00D-5493-1BB6D273FFD2}"/>
+              </a:ext>
+            </a:extLst>
+          </p:cNvPr>
+          <p:cNvSpPr>
+            <a:spLocks noGrp="1"/>
+          </p:cNvSpPr>
+          <p:nvPr>
+            <p:ph type="title"/>
+          </p:nvPr>
+        </p:nvSpPr>
+        <p:spPr>
+          <a:xfrm>
+            <a:off x="1141413" y="609600"/>
+            <a:ext cx="9905998" cy="983226"/>
+          </a:xfrm>
+        </p:spPr>
+        <p:txBody>
+          <a:bodyPr/>
+          <a:lstStyle/>
+          <a:p>
+            <a:r>
+              <a:rPr lang="fr-FR" b="1" dirty="0"/>
+              <a:t>VI - Conclusion</a:t>
+            </a:r>
+          </a:p>
+        </p:txBody>
+      </p:sp>
+      <p:sp>
+        <p:nvSpPr>
+          <p:cNvPr id="3" name="Espace réservé du contenu 2">
+            <a:extLst>
+              <a:ext uri="{FF2B5EF4-FFF2-40B4-BE49-F238E27FC236}">
+                <a16:creationId xmlns:a16="http://schemas.microsoft.com/office/drawing/2014/main" id="{2B532F68-EF4E-2C33-FB15-EA643FA46D2B}"/>
+              </a:ext>
+            </a:extLst>
+          </p:cNvPr>
+          <p:cNvSpPr>
+            <a:spLocks noGrp="1"/>
+          </p:cNvSpPr>
+          <p:nvPr>
+            <p:ph idx="1"/>
+          </p:nvPr>
+        </p:nvSpPr>
+        <p:spPr/>
+        <p:txBody>
+          <a:bodyPr/>
+          <a:lstStyle/>
+          <a:p>
+            <a:endParaRPr lang="fr-FR"/>
+          </a:p>
+        </p:txBody>
+      </p:sp>
+      <p:sp>
+        <p:nvSpPr>
+          <p:cNvPr id="4" name="Espace réservé du numéro de diapositive 3">
+            <a:extLst>
+              <a:ext uri="{FF2B5EF4-FFF2-40B4-BE49-F238E27FC236}">
+                <a16:creationId xmlns:a16="http://schemas.microsoft.com/office/drawing/2014/main" id="{FE7C4907-2A3C-6DD8-27C9-1A003A70920B}"/>
+              </a:ext>
+            </a:extLst>
+          </p:cNvPr>
+          <p:cNvSpPr>
+            <a:spLocks noGrp="1"/>
+          </p:cNvSpPr>
+          <p:nvPr>
+            <p:ph type="sldNum" sz="quarter" idx="12"/>
+          </p:nvPr>
+        </p:nvSpPr>
+        <p:spPr/>
+        <p:txBody>
+          <a:bodyPr>
+            <a:normAutofit lnSpcReduction="10000"/>
+          </a:bodyPr>
+          <a:lstStyle/>
+          <a:p>
+            <a:fld id="{DC9A08A5-7ACC-4C52-B2B9-9EF3D4E7F5B2}" type="slidenum">
+              <a:rPr lang="fr-FR" smtClean="0"/>
+              <a:t>22</a:t>
+            </a:fld>
+            <a:endParaRPr lang="fr-FR"/>
+          </a:p>
+        </p:txBody>
+      </p:sp>
+    </p:spTree>
+    <p:extLst>
+      <p:ext uri="{BB962C8B-B14F-4D97-AF65-F5344CB8AC3E}">
+        <p14:creationId xmlns:p14="http://schemas.microsoft.com/office/powerpoint/2010/main" val="1363480817"/>
       </p:ext>
     </p:extLst>
   </p:cSld>

</xml_diff>